<commit_message>
Rechnungen jetzt als Bild
</commit_message>
<xml_diff>
--- a/Text/ERM_Assign2.pptx
+++ b/Text/ERM_Assign2.pptx
@@ -5,8 +5,9 @@
     <p:sldMasterId id="2147483648" r:id="rId1"/>
   </p:sldMasterIdLst>
   <p:sldIdLst>
-    <p:sldId id="256" r:id="rId2"/>
-    <p:sldId id="257" r:id="rId3"/>
+    <p:sldId id="257" r:id="rId2"/>
+    <p:sldId id="258" r:id="rId3"/>
+    <p:sldId id="259" r:id="rId4"/>
   </p:sldIdLst>
   <p:sldSz cx="12192000" cy="6858000"/>
   <p:notesSz cx="6858000" cy="9144000"/>
@@ -3329,58 +3330,1718 @@
       </p:grpSpPr>
       <p:sp>
         <p:nvSpPr>
-          <p:cNvPr id="2" name="Title 1">
-            <a:extLst>
-              <a:ext uri="{FF2B5EF4-FFF2-40B4-BE49-F238E27FC236}">
-                <a16:creationId xmlns:a16="http://schemas.microsoft.com/office/drawing/2014/main" id="{9996E63A-83B6-8B40-9C61-5B1A18989A85}"/>
-              </a:ext>
-            </a:extLst>
-          </p:cNvPr>
-          <p:cNvSpPr>
-            <a:spLocks noGrp="1"/>
-          </p:cNvSpPr>
-          <p:nvPr>
-            <p:ph type="ctrTitle"/>
-          </p:nvPr>
-        </p:nvSpPr>
-        <p:spPr/>
-        <p:txBody>
-          <a:bodyPr/>
-          <a:lstStyle/>
-          <a:p>
-            <a:endParaRPr lang="en-GB"/>
-          </a:p>
-        </p:txBody>
-      </p:sp>
-      <p:sp>
-        <p:nvSpPr>
-          <p:cNvPr id="3" name="Subtitle 2">
-            <a:extLst>
-              <a:ext uri="{FF2B5EF4-FFF2-40B4-BE49-F238E27FC236}">
-                <a16:creationId xmlns:a16="http://schemas.microsoft.com/office/drawing/2014/main" id="{A181C3EF-1684-8645-9563-D951488E083C}"/>
-              </a:ext>
-            </a:extLst>
-          </p:cNvPr>
-          <p:cNvSpPr>
-            <a:spLocks noGrp="1"/>
-          </p:cNvSpPr>
-          <p:nvPr>
-            <p:ph type="subTitle" idx="1"/>
-          </p:nvPr>
-        </p:nvSpPr>
-        <p:spPr/>
-        <p:txBody>
-          <a:bodyPr/>
-          <a:lstStyle/>
-          <a:p>
-            <a:endParaRPr lang="en-GB"/>
-          </a:p>
-        </p:txBody>
-      </p:sp>
+          <p:cNvPr id="2" name="TextBox 1">
+            <a:extLst>
+              <a:ext uri="{FF2B5EF4-FFF2-40B4-BE49-F238E27FC236}">
+                <a16:creationId xmlns:a16="http://schemas.microsoft.com/office/drawing/2014/main" id="{B9186F6B-2000-9C41-8D3C-F08758FD99C2}"/>
+              </a:ext>
+            </a:extLst>
+          </p:cNvPr>
+          <p:cNvSpPr txBox="1"/>
+          <p:nvPr/>
+        </p:nvSpPr>
+        <p:spPr>
+          <a:xfrm>
+            <a:off x="1642363" y="1297603"/>
+            <a:ext cx="703269" cy="369332"/>
+          </a:xfrm>
+          <a:prstGeom prst="rect">
+            <a:avLst/>
+          </a:prstGeom>
+        </p:spPr>
+        <p:style>
+          <a:lnRef idx="2">
+            <a:schemeClr val="dk1"/>
+          </a:lnRef>
+          <a:fillRef idx="1">
+            <a:schemeClr val="lt1"/>
+          </a:fillRef>
+          <a:effectRef idx="0">
+            <a:schemeClr val="dk1"/>
+          </a:effectRef>
+          <a:fontRef idx="minor">
+            <a:schemeClr val="dk1"/>
+          </a:fontRef>
+        </p:style>
+        <p:txBody>
+          <a:bodyPr wrap="square" rtlCol="0">
+            <a:spAutoFit/>
+          </a:bodyPr>
+          <a:lstStyle/>
+          <a:p>
+            <a:r>
+              <a:rPr lang="en-GB" dirty="0"/>
+              <a:t>Users</a:t>
+            </a:r>
+          </a:p>
+        </p:txBody>
+      </p:sp>
+      <p:sp>
+        <p:nvSpPr>
+          <p:cNvPr id="3" name="TextBox 2">
+            <a:extLst>
+              <a:ext uri="{FF2B5EF4-FFF2-40B4-BE49-F238E27FC236}">
+                <a16:creationId xmlns:a16="http://schemas.microsoft.com/office/drawing/2014/main" id="{51914F44-659B-F546-AC5F-F07BFB0D4802}"/>
+              </a:ext>
+            </a:extLst>
+          </p:cNvPr>
+          <p:cNvSpPr txBox="1"/>
+          <p:nvPr/>
+        </p:nvSpPr>
+        <p:spPr>
+          <a:xfrm>
+            <a:off x="5063490" y="1881886"/>
+            <a:ext cx="1200457" cy="369332"/>
+          </a:xfrm>
+          <a:prstGeom prst="rect">
+            <a:avLst/>
+          </a:prstGeom>
+        </p:spPr>
+        <p:style>
+          <a:lnRef idx="2">
+            <a:schemeClr val="dk1"/>
+          </a:lnRef>
+          <a:fillRef idx="1">
+            <a:schemeClr val="lt1"/>
+          </a:fillRef>
+          <a:effectRef idx="0">
+            <a:schemeClr val="dk1"/>
+          </a:effectRef>
+          <a:fontRef idx="minor">
+            <a:schemeClr val="dk1"/>
+          </a:fontRef>
+        </p:style>
+        <p:txBody>
+          <a:bodyPr wrap="none" rtlCol="0">
+            <a:spAutoFit/>
+          </a:bodyPr>
+          <a:lstStyle/>
+          <a:p>
+            <a:r>
+              <a:rPr lang="en-GB" dirty="0"/>
+              <a:t>Comments</a:t>
+            </a:r>
+          </a:p>
+        </p:txBody>
+      </p:sp>
+      <p:sp>
+        <p:nvSpPr>
+          <p:cNvPr id="4" name="TextBox 3">
+            <a:extLst>
+              <a:ext uri="{FF2B5EF4-FFF2-40B4-BE49-F238E27FC236}">
+                <a16:creationId xmlns:a16="http://schemas.microsoft.com/office/drawing/2014/main" id="{3825D2F0-6805-B743-ACAE-89177CA2C0E8}"/>
+              </a:ext>
+            </a:extLst>
+          </p:cNvPr>
+          <p:cNvSpPr txBox="1"/>
+          <p:nvPr/>
+        </p:nvSpPr>
+        <p:spPr>
+          <a:xfrm>
+            <a:off x="9693660" y="1176518"/>
+            <a:ext cx="1242841" cy="369332"/>
+          </a:xfrm>
+          <a:prstGeom prst="rect">
+            <a:avLst/>
+          </a:prstGeom>
+        </p:spPr>
+        <p:style>
+          <a:lnRef idx="2">
+            <a:schemeClr val="dk1"/>
+          </a:lnRef>
+          <a:fillRef idx="1">
+            <a:schemeClr val="lt1"/>
+          </a:fillRef>
+          <a:effectRef idx="0">
+            <a:schemeClr val="dk1"/>
+          </a:effectRef>
+          <a:fontRef idx="minor">
+            <a:schemeClr val="dk1"/>
+          </a:fontRef>
+        </p:style>
+        <p:txBody>
+          <a:bodyPr wrap="none" rtlCol="0">
+            <a:spAutoFit/>
+          </a:bodyPr>
+          <a:lstStyle/>
+          <a:p>
+            <a:r>
+              <a:rPr lang="en-GB" dirty="0"/>
+              <a:t>Subreddits </a:t>
+            </a:r>
+          </a:p>
+        </p:txBody>
+      </p:sp>
+      <p:sp>
+        <p:nvSpPr>
+          <p:cNvPr id="5" name="Oval 4">
+            <a:extLst>
+              <a:ext uri="{FF2B5EF4-FFF2-40B4-BE49-F238E27FC236}">
+                <a16:creationId xmlns:a16="http://schemas.microsoft.com/office/drawing/2014/main" id="{D46D62FB-6578-B442-B3F0-A479CD72CFA7}"/>
+              </a:ext>
+            </a:extLst>
+          </p:cNvPr>
+          <p:cNvSpPr/>
+          <p:nvPr/>
+        </p:nvSpPr>
+        <p:spPr>
+          <a:xfrm>
+            <a:off x="9417838" y="4709768"/>
+            <a:ext cx="1611630" cy="502920"/>
+          </a:xfrm>
+          <a:prstGeom prst="ellipse">
+            <a:avLst/>
+          </a:prstGeom>
+        </p:spPr>
+        <p:style>
+          <a:lnRef idx="2">
+            <a:schemeClr val="dk1"/>
+          </a:lnRef>
+          <a:fillRef idx="1">
+            <a:schemeClr val="lt1"/>
+          </a:fillRef>
+          <a:effectRef idx="0">
+            <a:schemeClr val="dk1"/>
+          </a:effectRef>
+          <a:fontRef idx="minor">
+            <a:schemeClr val="dk1"/>
+          </a:fontRef>
+        </p:style>
+        <p:txBody>
+          <a:bodyPr rtlCol="0" anchor="ctr"/>
+          <a:lstStyle/>
+          <a:p>
+            <a:pPr algn="ctr"/>
+            <a:r>
+              <a:rPr lang="en-GB" dirty="0" err="1"/>
+              <a:t>parentID</a:t>
+            </a:r>
+            <a:endParaRPr lang="en-GB" dirty="0"/>
+          </a:p>
+        </p:txBody>
+      </p:sp>
+      <p:sp>
+        <p:nvSpPr>
+          <p:cNvPr id="6" name="Oval 5">
+            <a:extLst>
+              <a:ext uri="{FF2B5EF4-FFF2-40B4-BE49-F238E27FC236}">
+                <a16:creationId xmlns:a16="http://schemas.microsoft.com/office/drawing/2014/main" id="{E82F4C38-B7CC-EA4F-AA6E-47F6A89824B9}"/>
+              </a:ext>
+            </a:extLst>
+          </p:cNvPr>
+          <p:cNvSpPr/>
+          <p:nvPr/>
+        </p:nvSpPr>
+        <p:spPr>
+          <a:xfrm>
+            <a:off x="148098" y="4110934"/>
+            <a:ext cx="1611630" cy="502920"/>
+          </a:xfrm>
+          <a:prstGeom prst="ellipse">
+            <a:avLst/>
+          </a:prstGeom>
+        </p:spPr>
+        <p:style>
+          <a:lnRef idx="2">
+            <a:schemeClr val="dk1"/>
+          </a:lnRef>
+          <a:fillRef idx="1">
+            <a:schemeClr val="lt1"/>
+          </a:fillRef>
+          <a:effectRef idx="0">
+            <a:schemeClr val="dk1"/>
+          </a:effectRef>
+          <a:fontRef idx="minor">
+            <a:schemeClr val="dk1"/>
+          </a:fontRef>
+        </p:style>
+        <p:txBody>
+          <a:bodyPr rtlCol="0" anchor="ctr"/>
+          <a:lstStyle/>
+          <a:p>
+            <a:pPr algn="ctr"/>
+            <a:r>
+              <a:rPr lang="en-GB" dirty="0"/>
+              <a:t>ups</a:t>
+            </a:r>
+          </a:p>
+        </p:txBody>
+      </p:sp>
+      <p:sp>
+        <p:nvSpPr>
+          <p:cNvPr id="8" name="Oval 7">
+            <a:extLst>
+              <a:ext uri="{FF2B5EF4-FFF2-40B4-BE49-F238E27FC236}">
+                <a16:creationId xmlns:a16="http://schemas.microsoft.com/office/drawing/2014/main" id="{10D85D01-4CDB-1D44-8AE7-D9B75E175FFE}"/>
+              </a:ext>
+            </a:extLst>
+          </p:cNvPr>
+          <p:cNvSpPr/>
+          <p:nvPr/>
+        </p:nvSpPr>
+        <p:spPr>
+          <a:xfrm>
+            <a:off x="156752" y="4705980"/>
+            <a:ext cx="1611630" cy="502920"/>
+          </a:xfrm>
+          <a:prstGeom prst="ellipse">
+            <a:avLst/>
+          </a:prstGeom>
+        </p:spPr>
+        <p:style>
+          <a:lnRef idx="2">
+            <a:schemeClr val="dk1"/>
+          </a:lnRef>
+          <a:fillRef idx="1">
+            <a:schemeClr val="lt1"/>
+          </a:fillRef>
+          <a:effectRef idx="0">
+            <a:schemeClr val="dk1"/>
+          </a:effectRef>
+          <a:fontRef idx="minor">
+            <a:schemeClr val="dk1"/>
+          </a:fontRef>
+        </p:style>
+        <p:txBody>
+          <a:bodyPr rtlCol="0" anchor="ctr"/>
+          <a:lstStyle/>
+          <a:p>
+            <a:pPr algn="ctr"/>
+            <a:r>
+              <a:rPr lang="en-GB" dirty="0"/>
+              <a:t>USER</a:t>
+            </a:r>
+          </a:p>
+        </p:txBody>
+      </p:sp>
+      <p:sp>
+        <p:nvSpPr>
+          <p:cNvPr id="9" name="Oval 8">
+            <a:extLst>
+              <a:ext uri="{FF2B5EF4-FFF2-40B4-BE49-F238E27FC236}">
+                <a16:creationId xmlns:a16="http://schemas.microsoft.com/office/drawing/2014/main" id="{6AE6F24D-036E-6442-A1F7-5E1BE634A52F}"/>
+              </a:ext>
+            </a:extLst>
+          </p:cNvPr>
+          <p:cNvSpPr/>
+          <p:nvPr/>
+        </p:nvSpPr>
+        <p:spPr>
+          <a:xfrm>
+            <a:off x="9173760" y="3510200"/>
+            <a:ext cx="1969770" cy="502920"/>
+          </a:xfrm>
+          <a:prstGeom prst="ellipse">
+            <a:avLst/>
+          </a:prstGeom>
+        </p:spPr>
+        <p:style>
+          <a:lnRef idx="2">
+            <a:schemeClr val="dk1"/>
+          </a:lnRef>
+          <a:fillRef idx="1">
+            <a:schemeClr val="lt1"/>
+          </a:fillRef>
+          <a:effectRef idx="0">
+            <a:schemeClr val="dk1"/>
+          </a:effectRef>
+          <a:fontRef idx="minor">
+            <a:schemeClr val="dk1"/>
+          </a:fontRef>
+        </p:style>
+        <p:txBody>
+          <a:bodyPr rtlCol="0" anchor="ctr"/>
+          <a:lstStyle/>
+          <a:p>
+            <a:pPr algn="ctr"/>
+            <a:r>
+              <a:rPr lang="en-GB" dirty="0"/>
+              <a:t>SUBREDDIT</a:t>
+            </a:r>
+          </a:p>
+        </p:txBody>
+      </p:sp>
+      <p:sp>
+        <p:nvSpPr>
+          <p:cNvPr id="10" name="Oval 9">
+            <a:extLst>
+              <a:ext uri="{FF2B5EF4-FFF2-40B4-BE49-F238E27FC236}">
+                <a16:creationId xmlns:a16="http://schemas.microsoft.com/office/drawing/2014/main" id="{56119434-8014-FF40-ADD0-34B92EEB4B88}"/>
+              </a:ext>
+            </a:extLst>
+          </p:cNvPr>
+          <p:cNvSpPr/>
+          <p:nvPr/>
+        </p:nvSpPr>
+        <p:spPr>
+          <a:xfrm>
+            <a:off x="7595594" y="4110934"/>
+            <a:ext cx="1611630" cy="502920"/>
+          </a:xfrm>
+          <a:prstGeom prst="ellipse">
+            <a:avLst/>
+          </a:prstGeom>
+        </p:spPr>
+        <p:style>
+          <a:lnRef idx="2">
+            <a:schemeClr val="dk1"/>
+          </a:lnRef>
+          <a:fillRef idx="1">
+            <a:schemeClr val="lt1"/>
+          </a:fillRef>
+          <a:effectRef idx="0">
+            <a:schemeClr val="dk1"/>
+          </a:effectRef>
+          <a:fontRef idx="minor">
+            <a:schemeClr val="dk1"/>
+          </a:fontRef>
+        </p:style>
+        <p:txBody>
+          <a:bodyPr rtlCol="0" anchor="ctr"/>
+          <a:lstStyle/>
+          <a:p>
+            <a:pPr algn="ctr"/>
+            <a:r>
+              <a:rPr lang="en-GB" dirty="0" err="1"/>
+              <a:t>LinkID</a:t>
+            </a:r>
+            <a:endParaRPr lang="en-GB" dirty="0"/>
+          </a:p>
+        </p:txBody>
+      </p:sp>
+      <p:sp>
+        <p:nvSpPr>
+          <p:cNvPr id="11" name="Oval 10">
+            <a:extLst>
+              <a:ext uri="{FF2B5EF4-FFF2-40B4-BE49-F238E27FC236}">
+                <a16:creationId xmlns:a16="http://schemas.microsoft.com/office/drawing/2014/main" id="{3CD6AF74-388A-024D-AA1F-5A4605D69628}"/>
+              </a:ext>
+            </a:extLst>
+          </p:cNvPr>
+          <p:cNvSpPr/>
+          <p:nvPr/>
+        </p:nvSpPr>
+        <p:spPr>
+          <a:xfrm>
+            <a:off x="149959" y="251578"/>
+            <a:ext cx="1611630" cy="502920"/>
+          </a:xfrm>
+          <a:prstGeom prst="ellipse">
+            <a:avLst/>
+          </a:prstGeom>
+        </p:spPr>
+        <p:style>
+          <a:lnRef idx="2">
+            <a:schemeClr val="dk1"/>
+          </a:lnRef>
+          <a:fillRef idx="1">
+            <a:schemeClr val="lt1"/>
+          </a:fillRef>
+          <a:effectRef idx="0">
+            <a:schemeClr val="dk1"/>
+          </a:effectRef>
+          <a:fontRef idx="minor">
+            <a:schemeClr val="dk1"/>
+          </a:fontRef>
+        </p:style>
+        <p:txBody>
+          <a:bodyPr rtlCol="0" anchor="ctr"/>
+          <a:lstStyle/>
+          <a:p>
+            <a:pPr algn="ctr"/>
+            <a:r>
+              <a:rPr lang="en-GB" u="sng" dirty="0"/>
+              <a:t>Name</a:t>
+            </a:r>
+          </a:p>
+        </p:txBody>
+      </p:sp>
+      <p:sp>
+        <p:nvSpPr>
+          <p:cNvPr id="12" name="Oval 11">
+            <a:extLst>
+              <a:ext uri="{FF2B5EF4-FFF2-40B4-BE49-F238E27FC236}">
+                <a16:creationId xmlns:a16="http://schemas.microsoft.com/office/drawing/2014/main" id="{064D261F-710C-0844-95EB-DFDAD3F2A147}"/>
+              </a:ext>
+            </a:extLst>
+          </p:cNvPr>
+          <p:cNvSpPr/>
+          <p:nvPr/>
+        </p:nvSpPr>
+        <p:spPr>
+          <a:xfrm>
+            <a:off x="7746654" y="2849996"/>
+            <a:ext cx="1611630" cy="502920"/>
+          </a:xfrm>
+          <a:prstGeom prst="ellipse">
+            <a:avLst/>
+          </a:prstGeom>
+        </p:spPr>
+        <p:style>
+          <a:lnRef idx="2">
+            <a:schemeClr val="dk1"/>
+          </a:lnRef>
+          <a:fillRef idx="1">
+            <a:schemeClr val="lt1"/>
+          </a:fillRef>
+          <a:effectRef idx="0">
+            <a:schemeClr val="dk1"/>
+          </a:effectRef>
+          <a:fontRef idx="minor">
+            <a:schemeClr val="dk1"/>
+          </a:fontRef>
+        </p:style>
+        <p:txBody>
+          <a:bodyPr rtlCol="0" anchor="ctr"/>
+          <a:lstStyle/>
+          <a:p>
+            <a:pPr algn="ctr"/>
+            <a:r>
+              <a:rPr lang="en-GB" u="sng" dirty="0"/>
+              <a:t>ID</a:t>
+            </a:r>
+          </a:p>
+        </p:txBody>
+      </p:sp>
+      <p:sp>
+        <p:nvSpPr>
+          <p:cNvPr id="13" name="Oval 12">
+            <a:extLst>
+              <a:ext uri="{FF2B5EF4-FFF2-40B4-BE49-F238E27FC236}">
+                <a16:creationId xmlns:a16="http://schemas.microsoft.com/office/drawing/2014/main" id="{F6F7C74B-3364-D742-8CB9-B325B8D74D95}"/>
+              </a:ext>
+            </a:extLst>
+          </p:cNvPr>
+          <p:cNvSpPr/>
+          <p:nvPr/>
+        </p:nvSpPr>
+        <p:spPr>
+          <a:xfrm>
+            <a:off x="8618219" y="6059477"/>
+            <a:ext cx="2727959" cy="502920"/>
+          </a:xfrm>
+          <a:prstGeom prst="ellipse">
+            <a:avLst/>
+          </a:prstGeom>
+        </p:spPr>
+        <p:style>
+          <a:lnRef idx="2">
+            <a:schemeClr val="dk1"/>
+          </a:lnRef>
+          <a:fillRef idx="1">
+            <a:schemeClr val="lt1"/>
+          </a:fillRef>
+          <a:effectRef idx="0">
+            <a:schemeClr val="dk1"/>
+          </a:effectRef>
+          <a:fontRef idx="minor">
+            <a:schemeClr val="dk1"/>
+          </a:fontRef>
+        </p:style>
+        <p:txBody>
+          <a:bodyPr rtlCol="0" anchor="ctr"/>
+          <a:lstStyle/>
+          <a:p>
+            <a:pPr algn="ctr"/>
+            <a:r>
+              <a:rPr lang="en-GB" dirty="0" err="1"/>
+              <a:t>conttiversiality</a:t>
+            </a:r>
+            <a:endParaRPr lang="en-GB" dirty="0"/>
+          </a:p>
+        </p:txBody>
+      </p:sp>
+      <p:sp>
+        <p:nvSpPr>
+          <p:cNvPr id="14" name="Oval 13">
+            <a:extLst>
+              <a:ext uri="{FF2B5EF4-FFF2-40B4-BE49-F238E27FC236}">
+                <a16:creationId xmlns:a16="http://schemas.microsoft.com/office/drawing/2014/main" id="{2A108606-647E-314C-8041-98F58968C4BB}"/>
+              </a:ext>
+            </a:extLst>
+          </p:cNvPr>
+          <p:cNvSpPr/>
+          <p:nvPr/>
+        </p:nvSpPr>
+        <p:spPr>
+          <a:xfrm>
+            <a:off x="2156282" y="3103337"/>
+            <a:ext cx="1611630" cy="502920"/>
+          </a:xfrm>
+          <a:prstGeom prst="ellipse">
+            <a:avLst/>
+          </a:prstGeom>
+        </p:spPr>
+        <p:style>
+          <a:lnRef idx="2">
+            <a:schemeClr val="dk1"/>
+          </a:lnRef>
+          <a:fillRef idx="1">
+            <a:schemeClr val="lt1"/>
+          </a:fillRef>
+          <a:effectRef idx="0">
+            <a:schemeClr val="dk1"/>
+          </a:effectRef>
+          <a:fontRef idx="minor">
+            <a:schemeClr val="dk1"/>
+          </a:fontRef>
+        </p:style>
+        <p:txBody>
+          <a:bodyPr rtlCol="0" anchor="ctr"/>
+          <a:lstStyle/>
+          <a:p>
+            <a:pPr algn="ctr"/>
+            <a:r>
+              <a:rPr lang="en-GB" dirty="0"/>
+              <a:t>body</a:t>
+            </a:r>
+          </a:p>
+        </p:txBody>
+      </p:sp>
+      <p:sp>
+        <p:nvSpPr>
+          <p:cNvPr id="15" name="Oval 14">
+            <a:extLst>
+              <a:ext uri="{FF2B5EF4-FFF2-40B4-BE49-F238E27FC236}">
+                <a16:creationId xmlns:a16="http://schemas.microsoft.com/office/drawing/2014/main" id="{2F1D9057-CE3C-9E48-B10B-A6A3A95751F9}"/>
+              </a:ext>
+            </a:extLst>
+          </p:cNvPr>
+          <p:cNvSpPr/>
+          <p:nvPr/>
+        </p:nvSpPr>
+        <p:spPr>
+          <a:xfrm>
+            <a:off x="265348" y="3510141"/>
+            <a:ext cx="1611630" cy="502920"/>
+          </a:xfrm>
+          <a:prstGeom prst="ellipse">
+            <a:avLst/>
+          </a:prstGeom>
+        </p:spPr>
+        <p:style>
+          <a:lnRef idx="2">
+            <a:schemeClr val="dk1"/>
+          </a:lnRef>
+          <a:fillRef idx="1">
+            <a:schemeClr val="lt1"/>
+          </a:fillRef>
+          <a:effectRef idx="0">
+            <a:schemeClr val="dk1"/>
+          </a:effectRef>
+          <a:fontRef idx="minor">
+            <a:schemeClr val="dk1"/>
+          </a:fontRef>
+        </p:style>
+        <p:txBody>
+          <a:bodyPr rtlCol="0" anchor="ctr"/>
+          <a:lstStyle/>
+          <a:p>
+            <a:pPr algn="ctr"/>
+            <a:r>
+              <a:rPr lang="en-GB" dirty="0"/>
+              <a:t>created</a:t>
+            </a:r>
+          </a:p>
+        </p:txBody>
+      </p:sp>
+      <p:sp>
+        <p:nvSpPr>
+          <p:cNvPr id="16" name="Oval 15">
+            <a:extLst>
+              <a:ext uri="{FF2B5EF4-FFF2-40B4-BE49-F238E27FC236}">
+                <a16:creationId xmlns:a16="http://schemas.microsoft.com/office/drawing/2014/main" id="{3665511D-5447-BD4B-A49A-C89C48CD1DEC}"/>
+              </a:ext>
+            </a:extLst>
+          </p:cNvPr>
+          <p:cNvSpPr/>
+          <p:nvPr/>
+        </p:nvSpPr>
+        <p:spPr>
+          <a:xfrm>
+            <a:off x="9990155" y="176512"/>
+            <a:ext cx="2128209" cy="502920"/>
+          </a:xfrm>
+          <a:prstGeom prst="ellipse">
+            <a:avLst/>
+          </a:prstGeom>
+        </p:spPr>
+        <p:style>
+          <a:lnRef idx="2">
+            <a:schemeClr val="dk1"/>
+          </a:lnRef>
+          <a:fillRef idx="1">
+            <a:schemeClr val="lt1"/>
+          </a:fillRef>
+          <a:effectRef idx="0">
+            <a:schemeClr val="dk1"/>
+          </a:effectRef>
+          <a:fontRef idx="minor">
+            <a:schemeClr val="dk1"/>
+          </a:fontRef>
+        </p:style>
+        <p:txBody>
+          <a:bodyPr rtlCol="0" anchor="ctr"/>
+          <a:lstStyle/>
+          <a:p>
+            <a:pPr algn="ctr"/>
+            <a:r>
+              <a:rPr lang="en-GB" u="sng" dirty="0" err="1"/>
+              <a:t>Subreddit_id</a:t>
+            </a:r>
+            <a:endParaRPr lang="en-GB" u="sng" dirty="0"/>
+          </a:p>
+        </p:txBody>
+      </p:sp>
+      <p:sp>
+        <p:nvSpPr>
+          <p:cNvPr id="17" name="Oval 16">
+            <a:extLst>
+              <a:ext uri="{FF2B5EF4-FFF2-40B4-BE49-F238E27FC236}">
+                <a16:creationId xmlns:a16="http://schemas.microsoft.com/office/drawing/2014/main" id="{6C0CB9EB-14E0-6B48-B2D3-F643464D1C7F}"/>
+              </a:ext>
+            </a:extLst>
+          </p:cNvPr>
+          <p:cNvSpPr/>
+          <p:nvPr/>
+        </p:nvSpPr>
+        <p:spPr>
+          <a:xfrm>
+            <a:off x="7901055" y="182346"/>
+            <a:ext cx="1611630" cy="502920"/>
+          </a:xfrm>
+          <a:prstGeom prst="ellipse">
+            <a:avLst/>
+          </a:prstGeom>
+        </p:spPr>
+        <p:style>
+          <a:lnRef idx="2">
+            <a:schemeClr val="dk1"/>
+          </a:lnRef>
+          <a:fillRef idx="1">
+            <a:schemeClr val="lt1"/>
+          </a:fillRef>
+          <a:effectRef idx="0">
+            <a:schemeClr val="dk1"/>
+          </a:effectRef>
+          <a:fontRef idx="minor">
+            <a:schemeClr val="dk1"/>
+          </a:fontRef>
+        </p:style>
+        <p:txBody>
+          <a:bodyPr rtlCol="0" anchor="ctr"/>
+          <a:lstStyle/>
+          <a:p>
+            <a:pPr algn="ctr"/>
+            <a:r>
+              <a:rPr lang="en-GB" dirty="0"/>
+              <a:t>Subreddit</a:t>
+            </a:r>
+          </a:p>
+        </p:txBody>
+      </p:sp>
+      <p:cxnSp>
+        <p:nvCxnSpPr>
+          <p:cNvPr id="35" name="Elbow Connector 34">
+            <a:extLst>
+              <a:ext uri="{FF2B5EF4-FFF2-40B4-BE49-F238E27FC236}">
+                <a16:creationId xmlns:a16="http://schemas.microsoft.com/office/drawing/2014/main" id="{A1BE2472-0CC3-E041-A5EF-BC5ACC178AD7}"/>
+              </a:ext>
+            </a:extLst>
+          </p:cNvPr>
+          <p:cNvCxnSpPr>
+            <a:cxnSpLocks/>
+            <a:stCxn id="11" idx="4"/>
+            <a:endCxn id="2" idx="0"/>
+          </p:cNvCxnSpPr>
+          <p:nvPr/>
+        </p:nvCxnSpPr>
+        <p:spPr>
+          <a:xfrm rot="16200000" flipH="1">
+            <a:off x="1203334" y="506938"/>
+            <a:ext cx="543105" cy="1038224"/>
+          </a:xfrm>
+          <a:prstGeom prst="bentConnector3">
+            <a:avLst/>
+          </a:prstGeom>
+        </p:spPr>
+        <p:style>
+          <a:lnRef idx="1">
+            <a:schemeClr val="dk1"/>
+          </a:lnRef>
+          <a:fillRef idx="0">
+            <a:schemeClr val="dk1"/>
+          </a:fillRef>
+          <a:effectRef idx="0">
+            <a:schemeClr val="dk1"/>
+          </a:effectRef>
+          <a:fontRef idx="minor">
+            <a:schemeClr val="tx1"/>
+          </a:fontRef>
+        </p:style>
+      </p:cxnSp>
+      <p:cxnSp>
+        <p:nvCxnSpPr>
+          <p:cNvPr id="39" name="Elbow Connector 38">
+            <a:extLst>
+              <a:ext uri="{FF2B5EF4-FFF2-40B4-BE49-F238E27FC236}">
+                <a16:creationId xmlns:a16="http://schemas.microsoft.com/office/drawing/2014/main" id="{67D10DD1-1BCE-C647-89BD-50AE666918BA}"/>
+              </a:ext>
+            </a:extLst>
+          </p:cNvPr>
+          <p:cNvCxnSpPr>
+            <a:cxnSpLocks/>
+            <a:stCxn id="15" idx="6"/>
+          </p:cNvCxnSpPr>
+          <p:nvPr/>
+        </p:nvCxnSpPr>
+        <p:spPr>
+          <a:xfrm flipV="1">
+            <a:off x="1876978" y="2314302"/>
+            <a:ext cx="3786740" cy="1447299"/>
+          </a:xfrm>
+          <a:prstGeom prst="bentConnector3">
+            <a:avLst>
+              <a:gd name="adj1" fmla="val 100382"/>
+            </a:avLst>
+          </a:prstGeom>
+        </p:spPr>
+        <p:style>
+          <a:lnRef idx="1">
+            <a:schemeClr val="dk1"/>
+          </a:lnRef>
+          <a:fillRef idx="0">
+            <a:schemeClr val="dk1"/>
+          </a:fillRef>
+          <a:effectRef idx="0">
+            <a:schemeClr val="dk1"/>
+          </a:effectRef>
+          <a:fontRef idx="minor">
+            <a:schemeClr val="tx1"/>
+          </a:fontRef>
+        </p:style>
+      </p:cxnSp>
+      <p:cxnSp>
+        <p:nvCxnSpPr>
+          <p:cNvPr id="41" name="Elbow Connector 40">
+            <a:extLst>
+              <a:ext uri="{FF2B5EF4-FFF2-40B4-BE49-F238E27FC236}">
+                <a16:creationId xmlns:a16="http://schemas.microsoft.com/office/drawing/2014/main" id="{F68AB7DC-6239-2F44-AC64-1849B596291B}"/>
+              </a:ext>
+            </a:extLst>
+          </p:cNvPr>
+          <p:cNvCxnSpPr>
+            <a:cxnSpLocks/>
+            <a:stCxn id="6" idx="6"/>
+            <a:endCxn id="3" idx="2"/>
+          </p:cNvCxnSpPr>
+          <p:nvPr/>
+        </p:nvCxnSpPr>
+        <p:spPr>
+          <a:xfrm flipV="1">
+            <a:off x="1759728" y="2251218"/>
+            <a:ext cx="3903991" cy="2111176"/>
+          </a:xfrm>
+          <a:prstGeom prst="bentConnector2">
+            <a:avLst/>
+          </a:prstGeom>
+        </p:spPr>
+        <p:style>
+          <a:lnRef idx="1">
+            <a:schemeClr val="dk1"/>
+          </a:lnRef>
+          <a:fillRef idx="0">
+            <a:schemeClr val="dk1"/>
+          </a:fillRef>
+          <a:effectRef idx="0">
+            <a:schemeClr val="dk1"/>
+          </a:effectRef>
+          <a:fontRef idx="minor">
+            <a:schemeClr val="tx1"/>
+          </a:fontRef>
+        </p:style>
+      </p:cxnSp>
+      <p:cxnSp>
+        <p:nvCxnSpPr>
+          <p:cNvPr id="46" name="Elbow Connector 45">
+            <a:extLst>
+              <a:ext uri="{FF2B5EF4-FFF2-40B4-BE49-F238E27FC236}">
+                <a16:creationId xmlns:a16="http://schemas.microsoft.com/office/drawing/2014/main" id="{B8D40223-1863-6A43-9E79-594CE9C5A213}"/>
+              </a:ext>
+            </a:extLst>
+          </p:cNvPr>
+          <p:cNvCxnSpPr>
+            <a:cxnSpLocks/>
+            <a:stCxn id="14" idx="6"/>
+            <a:endCxn id="3" idx="2"/>
+          </p:cNvCxnSpPr>
+          <p:nvPr/>
+        </p:nvCxnSpPr>
+        <p:spPr>
+          <a:xfrm flipV="1">
+            <a:off x="3767912" y="2251218"/>
+            <a:ext cx="1895807" cy="1103579"/>
+          </a:xfrm>
+          <a:prstGeom prst="bentConnector2">
+            <a:avLst/>
+          </a:prstGeom>
+        </p:spPr>
+        <p:style>
+          <a:lnRef idx="1">
+            <a:schemeClr val="dk1"/>
+          </a:lnRef>
+          <a:fillRef idx="0">
+            <a:schemeClr val="dk1"/>
+          </a:fillRef>
+          <a:effectRef idx="0">
+            <a:schemeClr val="dk1"/>
+          </a:effectRef>
+          <a:fontRef idx="minor">
+            <a:schemeClr val="tx1"/>
+          </a:fontRef>
+        </p:style>
+      </p:cxnSp>
+      <p:cxnSp>
+        <p:nvCxnSpPr>
+          <p:cNvPr id="48" name="Elbow Connector 47">
+            <a:extLst>
+              <a:ext uri="{FF2B5EF4-FFF2-40B4-BE49-F238E27FC236}">
+                <a16:creationId xmlns:a16="http://schemas.microsoft.com/office/drawing/2014/main" id="{AF5F15A5-A7E1-0F4B-8935-1C2135B96C6B}"/>
+              </a:ext>
+            </a:extLst>
+          </p:cNvPr>
+          <p:cNvCxnSpPr>
+            <a:cxnSpLocks/>
+            <a:stCxn id="8" idx="6"/>
+            <a:endCxn id="3" idx="2"/>
+          </p:cNvCxnSpPr>
+          <p:nvPr/>
+        </p:nvCxnSpPr>
+        <p:spPr>
+          <a:xfrm flipV="1">
+            <a:off x="1768382" y="2251218"/>
+            <a:ext cx="3895337" cy="2706222"/>
+          </a:xfrm>
+          <a:prstGeom prst="bentConnector2">
+            <a:avLst/>
+          </a:prstGeom>
+        </p:spPr>
+        <p:style>
+          <a:lnRef idx="1">
+            <a:schemeClr val="dk1"/>
+          </a:lnRef>
+          <a:fillRef idx="0">
+            <a:schemeClr val="dk1"/>
+          </a:fillRef>
+          <a:effectRef idx="0">
+            <a:schemeClr val="dk1"/>
+          </a:effectRef>
+          <a:fontRef idx="minor">
+            <a:schemeClr val="tx1"/>
+          </a:fontRef>
+        </p:style>
+      </p:cxnSp>
+      <p:cxnSp>
+        <p:nvCxnSpPr>
+          <p:cNvPr id="50" name="Elbow Connector 49">
+            <a:extLst>
+              <a:ext uri="{FF2B5EF4-FFF2-40B4-BE49-F238E27FC236}">
+                <a16:creationId xmlns:a16="http://schemas.microsoft.com/office/drawing/2014/main" id="{5973775A-C383-364E-8AE4-462351EB3FAC}"/>
+              </a:ext>
+            </a:extLst>
+          </p:cNvPr>
+          <p:cNvCxnSpPr>
+            <a:cxnSpLocks/>
+            <a:stCxn id="13" idx="2"/>
+            <a:endCxn id="3" idx="2"/>
+          </p:cNvCxnSpPr>
+          <p:nvPr/>
+        </p:nvCxnSpPr>
+        <p:spPr>
+          <a:xfrm rot="10800000">
+            <a:off x="5663719" y="2251219"/>
+            <a:ext cx="2954500" cy="4059719"/>
+          </a:xfrm>
+          <a:prstGeom prst="bentConnector2">
+            <a:avLst/>
+          </a:prstGeom>
+        </p:spPr>
+        <p:style>
+          <a:lnRef idx="1">
+            <a:schemeClr val="dk1"/>
+          </a:lnRef>
+          <a:fillRef idx="0">
+            <a:schemeClr val="dk1"/>
+          </a:fillRef>
+          <a:effectRef idx="0">
+            <a:schemeClr val="dk1"/>
+          </a:effectRef>
+          <a:fontRef idx="minor">
+            <a:schemeClr val="tx1"/>
+          </a:fontRef>
+        </p:style>
+      </p:cxnSp>
+      <p:cxnSp>
+        <p:nvCxnSpPr>
+          <p:cNvPr id="52" name="Elbow Connector 51">
+            <a:extLst>
+              <a:ext uri="{FF2B5EF4-FFF2-40B4-BE49-F238E27FC236}">
+                <a16:creationId xmlns:a16="http://schemas.microsoft.com/office/drawing/2014/main" id="{6A438F17-AD29-FF43-B5C3-AD27446FFC17}"/>
+              </a:ext>
+            </a:extLst>
+          </p:cNvPr>
+          <p:cNvCxnSpPr>
+            <a:cxnSpLocks/>
+            <a:stCxn id="10" idx="2"/>
+            <a:endCxn id="3" idx="2"/>
+          </p:cNvCxnSpPr>
+          <p:nvPr/>
+        </p:nvCxnSpPr>
+        <p:spPr>
+          <a:xfrm rot="10800000">
+            <a:off x="5663720" y="2251218"/>
+            <a:ext cx="1931875" cy="2111176"/>
+          </a:xfrm>
+          <a:prstGeom prst="bentConnector2">
+            <a:avLst/>
+          </a:prstGeom>
+        </p:spPr>
+        <p:style>
+          <a:lnRef idx="1">
+            <a:schemeClr val="dk1"/>
+          </a:lnRef>
+          <a:fillRef idx="0">
+            <a:schemeClr val="dk1"/>
+          </a:fillRef>
+          <a:effectRef idx="0">
+            <a:schemeClr val="dk1"/>
+          </a:effectRef>
+          <a:fontRef idx="minor">
+            <a:schemeClr val="tx1"/>
+          </a:fontRef>
+        </p:style>
+      </p:cxnSp>
+      <p:cxnSp>
+        <p:nvCxnSpPr>
+          <p:cNvPr id="54" name="Elbow Connector 53">
+            <a:extLst>
+              <a:ext uri="{FF2B5EF4-FFF2-40B4-BE49-F238E27FC236}">
+                <a16:creationId xmlns:a16="http://schemas.microsoft.com/office/drawing/2014/main" id="{7CE53A5D-73DD-9F4D-9018-D133F2E0EE25}"/>
+              </a:ext>
+            </a:extLst>
+          </p:cNvPr>
+          <p:cNvCxnSpPr>
+            <a:cxnSpLocks/>
+            <a:stCxn id="12" idx="2"/>
+            <a:endCxn id="3" idx="2"/>
+          </p:cNvCxnSpPr>
+          <p:nvPr/>
+        </p:nvCxnSpPr>
+        <p:spPr>
+          <a:xfrm rot="10800000">
+            <a:off x="5663720" y="2251218"/>
+            <a:ext cx="2082935" cy="850238"/>
+          </a:xfrm>
+          <a:prstGeom prst="bentConnector2">
+            <a:avLst/>
+          </a:prstGeom>
+        </p:spPr>
+        <p:style>
+          <a:lnRef idx="1">
+            <a:schemeClr val="dk1"/>
+          </a:lnRef>
+          <a:fillRef idx="0">
+            <a:schemeClr val="dk1"/>
+          </a:fillRef>
+          <a:effectRef idx="0">
+            <a:schemeClr val="dk1"/>
+          </a:effectRef>
+          <a:fontRef idx="minor">
+            <a:schemeClr val="tx1"/>
+          </a:fontRef>
+        </p:style>
+      </p:cxnSp>
+      <p:cxnSp>
+        <p:nvCxnSpPr>
+          <p:cNvPr id="56" name="Elbow Connector 55">
+            <a:extLst>
+              <a:ext uri="{FF2B5EF4-FFF2-40B4-BE49-F238E27FC236}">
+                <a16:creationId xmlns:a16="http://schemas.microsoft.com/office/drawing/2014/main" id="{E6BE8AC8-8508-454B-BE42-3C068080BF94}"/>
+              </a:ext>
+            </a:extLst>
+          </p:cNvPr>
+          <p:cNvCxnSpPr>
+            <a:cxnSpLocks/>
+            <a:stCxn id="9" idx="2"/>
+            <a:endCxn id="3" idx="2"/>
+          </p:cNvCxnSpPr>
+          <p:nvPr/>
+        </p:nvCxnSpPr>
+        <p:spPr>
+          <a:xfrm rot="10800000">
+            <a:off x="5663720" y="2251218"/>
+            <a:ext cx="3510041" cy="1510442"/>
+          </a:xfrm>
+          <a:prstGeom prst="bentConnector2">
+            <a:avLst/>
+          </a:prstGeom>
+        </p:spPr>
+        <p:style>
+          <a:lnRef idx="1">
+            <a:schemeClr val="dk1"/>
+          </a:lnRef>
+          <a:fillRef idx="0">
+            <a:schemeClr val="dk1"/>
+          </a:fillRef>
+          <a:effectRef idx="0">
+            <a:schemeClr val="dk1"/>
+          </a:effectRef>
+          <a:fontRef idx="minor">
+            <a:schemeClr val="tx1"/>
+          </a:fontRef>
+        </p:style>
+      </p:cxnSp>
+      <p:cxnSp>
+        <p:nvCxnSpPr>
+          <p:cNvPr id="58" name="Elbow Connector 57">
+            <a:extLst>
+              <a:ext uri="{FF2B5EF4-FFF2-40B4-BE49-F238E27FC236}">
+                <a16:creationId xmlns:a16="http://schemas.microsoft.com/office/drawing/2014/main" id="{89A4A649-6EEB-A047-8E29-618A15DD148F}"/>
+              </a:ext>
+            </a:extLst>
+          </p:cNvPr>
+          <p:cNvCxnSpPr>
+            <a:stCxn id="5" idx="2"/>
+            <a:endCxn id="3" idx="2"/>
+          </p:cNvCxnSpPr>
+          <p:nvPr/>
+        </p:nvCxnSpPr>
+        <p:spPr>
+          <a:xfrm rot="10800000">
+            <a:off x="5663720" y="2251218"/>
+            <a:ext cx="3754119" cy="2710010"/>
+          </a:xfrm>
+          <a:prstGeom prst="bentConnector2">
+            <a:avLst/>
+          </a:prstGeom>
+        </p:spPr>
+        <p:style>
+          <a:lnRef idx="1">
+            <a:schemeClr val="dk1"/>
+          </a:lnRef>
+          <a:fillRef idx="0">
+            <a:schemeClr val="dk1"/>
+          </a:fillRef>
+          <a:effectRef idx="0">
+            <a:schemeClr val="dk1"/>
+          </a:effectRef>
+          <a:fontRef idx="minor">
+            <a:schemeClr val="tx1"/>
+          </a:fontRef>
+        </p:style>
+      </p:cxnSp>
+      <p:cxnSp>
+        <p:nvCxnSpPr>
+          <p:cNvPr id="80" name="Elbow Connector 79">
+            <a:extLst>
+              <a:ext uri="{FF2B5EF4-FFF2-40B4-BE49-F238E27FC236}">
+                <a16:creationId xmlns:a16="http://schemas.microsoft.com/office/drawing/2014/main" id="{9E6A62E6-7D36-C348-A99D-9C27DE288C98}"/>
+              </a:ext>
+            </a:extLst>
+          </p:cNvPr>
+          <p:cNvCxnSpPr>
+            <a:cxnSpLocks/>
+            <a:stCxn id="34" idx="3"/>
+            <a:endCxn id="3" idx="1"/>
+          </p:cNvCxnSpPr>
+          <p:nvPr/>
+        </p:nvCxnSpPr>
+        <p:spPr>
+          <a:xfrm flipV="1">
+            <a:off x="4425149" y="2066552"/>
+            <a:ext cx="638341" cy="14551"/>
+          </a:xfrm>
+          <a:prstGeom prst="bentConnector3">
+            <a:avLst/>
+          </a:prstGeom>
+        </p:spPr>
+        <p:style>
+          <a:lnRef idx="1">
+            <a:schemeClr val="dk1"/>
+          </a:lnRef>
+          <a:fillRef idx="0">
+            <a:schemeClr val="dk1"/>
+          </a:fillRef>
+          <a:effectRef idx="0">
+            <a:schemeClr val="dk1"/>
+          </a:effectRef>
+          <a:fontRef idx="minor">
+            <a:schemeClr val="tx1"/>
+          </a:fontRef>
+        </p:style>
+      </p:cxnSp>
+      <p:cxnSp>
+        <p:nvCxnSpPr>
+          <p:cNvPr id="82" name="Elbow Connector 81">
+            <a:extLst>
+              <a:ext uri="{FF2B5EF4-FFF2-40B4-BE49-F238E27FC236}">
+                <a16:creationId xmlns:a16="http://schemas.microsoft.com/office/drawing/2014/main" id="{DCF679FA-671B-7049-9DD5-CE1C77B08484}"/>
+              </a:ext>
+            </a:extLst>
+          </p:cNvPr>
+          <p:cNvCxnSpPr>
+            <a:cxnSpLocks/>
+            <a:stCxn id="18" idx="1"/>
+            <a:endCxn id="3" idx="3"/>
+          </p:cNvCxnSpPr>
+          <p:nvPr/>
+        </p:nvCxnSpPr>
+        <p:spPr>
+          <a:xfrm rot="10800000">
+            <a:off x="6263947" y="2066552"/>
+            <a:ext cx="1174164" cy="1310"/>
+          </a:xfrm>
+          <a:prstGeom prst="bentConnector3">
+            <a:avLst>
+              <a:gd name="adj1" fmla="val 50000"/>
+            </a:avLst>
+          </a:prstGeom>
+        </p:spPr>
+        <p:style>
+          <a:lnRef idx="1">
+            <a:schemeClr val="dk1"/>
+          </a:lnRef>
+          <a:fillRef idx="0">
+            <a:schemeClr val="dk1"/>
+          </a:fillRef>
+          <a:effectRef idx="0">
+            <a:schemeClr val="dk1"/>
+          </a:effectRef>
+          <a:fontRef idx="minor">
+            <a:schemeClr val="tx1"/>
+          </a:fontRef>
+        </p:style>
+      </p:cxnSp>
+      <p:cxnSp>
+        <p:nvCxnSpPr>
+          <p:cNvPr id="84" name="Elbow Connector 83">
+            <a:extLst>
+              <a:ext uri="{FF2B5EF4-FFF2-40B4-BE49-F238E27FC236}">
+                <a16:creationId xmlns:a16="http://schemas.microsoft.com/office/drawing/2014/main" id="{03DD67F1-8C78-4D40-9F43-3D154FC0A9DB}"/>
+              </a:ext>
+            </a:extLst>
+          </p:cNvPr>
+          <p:cNvCxnSpPr>
+            <a:stCxn id="17" idx="4"/>
+            <a:endCxn id="4" idx="0"/>
+          </p:cNvCxnSpPr>
+          <p:nvPr/>
+        </p:nvCxnSpPr>
+        <p:spPr>
+          <a:xfrm rot="16200000" flipH="1">
+            <a:off x="9265349" y="126786"/>
+            <a:ext cx="491252" cy="1608211"/>
+          </a:xfrm>
+          <a:prstGeom prst="bentConnector3">
+            <a:avLst/>
+          </a:prstGeom>
+        </p:spPr>
+        <p:style>
+          <a:lnRef idx="1">
+            <a:schemeClr val="dk1"/>
+          </a:lnRef>
+          <a:fillRef idx="0">
+            <a:schemeClr val="dk1"/>
+          </a:fillRef>
+          <a:effectRef idx="0">
+            <a:schemeClr val="dk1"/>
+          </a:effectRef>
+          <a:fontRef idx="minor">
+            <a:schemeClr val="tx1"/>
+          </a:fontRef>
+        </p:style>
+      </p:cxnSp>
+      <p:cxnSp>
+        <p:nvCxnSpPr>
+          <p:cNvPr id="86" name="Elbow Connector 85">
+            <a:extLst>
+              <a:ext uri="{FF2B5EF4-FFF2-40B4-BE49-F238E27FC236}">
+                <a16:creationId xmlns:a16="http://schemas.microsoft.com/office/drawing/2014/main" id="{6FB0AA89-C952-404B-91B3-3E1DAE21FA6F}"/>
+              </a:ext>
+            </a:extLst>
+          </p:cNvPr>
+          <p:cNvCxnSpPr>
+            <a:stCxn id="16" idx="4"/>
+            <a:endCxn id="4" idx="0"/>
+          </p:cNvCxnSpPr>
+          <p:nvPr/>
+        </p:nvCxnSpPr>
+        <p:spPr>
+          <a:xfrm rot="5400000">
+            <a:off x="10436128" y="558386"/>
+            <a:ext cx="497086" cy="739179"/>
+          </a:xfrm>
+          <a:prstGeom prst="bentConnector3">
+            <a:avLst/>
+          </a:prstGeom>
+        </p:spPr>
+        <p:style>
+          <a:lnRef idx="1">
+            <a:schemeClr val="dk1"/>
+          </a:lnRef>
+          <a:fillRef idx="0">
+            <a:schemeClr val="dk1"/>
+          </a:fillRef>
+          <a:effectRef idx="0">
+            <a:schemeClr val="dk1"/>
+          </a:effectRef>
+          <a:fontRef idx="minor">
+            <a:schemeClr val="tx1"/>
+          </a:fontRef>
+        </p:style>
+      </p:cxnSp>
+      <p:sp>
+        <p:nvSpPr>
+          <p:cNvPr id="18" name="Diamond 17">
+            <a:extLst>
+              <a:ext uri="{FF2B5EF4-FFF2-40B4-BE49-F238E27FC236}">
+                <a16:creationId xmlns:a16="http://schemas.microsoft.com/office/drawing/2014/main" id="{7D6F2EAA-0907-6945-9BC6-E56AB4DF8B35}"/>
+              </a:ext>
+            </a:extLst>
+          </p:cNvPr>
+          <p:cNvSpPr/>
+          <p:nvPr/>
+        </p:nvSpPr>
+        <p:spPr>
+          <a:xfrm>
+            <a:off x="7438111" y="1737683"/>
+            <a:ext cx="1180108" cy="660358"/>
+          </a:xfrm>
+          <a:prstGeom prst="diamond">
+            <a:avLst/>
+          </a:prstGeom>
+        </p:spPr>
+        <p:style>
+          <a:lnRef idx="2">
+            <a:schemeClr val="dk1"/>
+          </a:lnRef>
+          <a:fillRef idx="1">
+            <a:schemeClr val="lt1"/>
+          </a:fillRef>
+          <a:effectRef idx="0">
+            <a:schemeClr val="dk1"/>
+          </a:effectRef>
+          <a:fontRef idx="minor">
+            <a:schemeClr val="dk1"/>
+          </a:fontRef>
+        </p:style>
+        <p:txBody>
+          <a:bodyPr rtlCol="0" anchor="ctr"/>
+          <a:lstStyle/>
+          <a:p>
+            <a:pPr algn="ctr"/>
+            <a:r>
+              <a:rPr lang="en-GB" dirty="0"/>
+              <a:t>Part of</a:t>
+            </a:r>
+          </a:p>
+        </p:txBody>
+      </p:sp>
+      <p:sp>
+        <p:nvSpPr>
+          <p:cNvPr id="34" name="Diamond 33">
+            <a:extLst>
+              <a:ext uri="{FF2B5EF4-FFF2-40B4-BE49-F238E27FC236}">
+                <a16:creationId xmlns:a16="http://schemas.microsoft.com/office/drawing/2014/main" id="{A11216F5-191C-7B48-A4BF-50B887BCBEB7}"/>
+              </a:ext>
+            </a:extLst>
+          </p:cNvPr>
+          <p:cNvSpPr/>
+          <p:nvPr/>
+        </p:nvSpPr>
+        <p:spPr>
+          <a:xfrm>
+            <a:off x="2902133" y="1595681"/>
+            <a:ext cx="1523016" cy="970844"/>
+          </a:xfrm>
+          <a:prstGeom prst="diamond">
+            <a:avLst/>
+          </a:prstGeom>
+        </p:spPr>
+        <p:style>
+          <a:lnRef idx="2">
+            <a:schemeClr val="dk1"/>
+          </a:lnRef>
+          <a:fillRef idx="1">
+            <a:schemeClr val="lt1"/>
+          </a:fillRef>
+          <a:effectRef idx="0">
+            <a:schemeClr val="dk1"/>
+          </a:effectRef>
+          <a:fontRef idx="minor">
+            <a:schemeClr val="dk1"/>
+          </a:fontRef>
+        </p:style>
+        <p:txBody>
+          <a:bodyPr rtlCol="0" anchor="ctr"/>
+          <a:lstStyle/>
+          <a:p>
+            <a:pPr algn="ctr"/>
+            <a:r>
+              <a:rPr lang="en-GB" dirty="0"/>
+              <a:t>wrote</a:t>
+            </a:r>
+          </a:p>
+        </p:txBody>
+      </p:sp>
+      <p:cxnSp>
+        <p:nvCxnSpPr>
+          <p:cNvPr id="25" name="Elbow Connector 24">
+            <a:extLst>
+              <a:ext uri="{FF2B5EF4-FFF2-40B4-BE49-F238E27FC236}">
+                <a16:creationId xmlns:a16="http://schemas.microsoft.com/office/drawing/2014/main" id="{8E1275BD-817A-1040-8E18-C578A8A7B486}"/>
+              </a:ext>
+            </a:extLst>
+          </p:cNvPr>
+          <p:cNvCxnSpPr>
+            <a:cxnSpLocks/>
+            <a:stCxn id="18" idx="3"/>
+            <a:endCxn id="4" idx="1"/>
+          </p:cNvCxnSpPr>
+          <p:nvPr/>
+        </p:nvCxnSpPr>
+        <p:spPr>
+          <a:xfrm flipV="1">
+            <a:off x="8618219" y="1361184"/>
+            <a:ext cx="1075441" cy="706678"/>
+          </a:xfrm>
+          <a:prstGeom prst="bentConnector3">
+            <a:avLst/>
+          </a:prstGeom>
+          <a:ln>
+            <a:tailEnd type="triangle"/>
+          </a:ln>
+        </p:spPr>
+        <p:style>
+          <a:lnRef idx="1">
+            <a:schemeClr val="dk1"/>
+          </a:lnRef>
+          <a:fillRef idx="0">
+            <a:schemeClr val="dk1"/>
+          </a:fillRef>
+          <a:effectRef idx="0">
+            <a:schemeClr val="dk1"/>
+          </a:effectRef>
+          <a:fontRef idx="minor">
+            <a:schemeClr val="tx1"/>
+          </a:fontRef>
+        </p:style>
+      </p:cxnSp>
+      <p:cxnSp>
+        <p:nvCxnSpPr>
+          <p:cNvPr id="27" name="Elbow Connector 26">
+            <a:extLst>
+              <a:ext uri="{FF2B5EF4-FFF2-40B4-BE49-F238E27FC236}">
+                <a16:creationId xmlns:a16="http://schemas.microsoft.com/office/drawing/2014/main" id="{756D262E-3D8B-0749-854A-24D0ACCCB7A6}"/>
+              </a:ext>
+            </a:extLst>
+          </p:cNvPr>
+          <p:cNvCxnSpPr>
+            <a:cxnSpLocks/>
+            <a:stCxn id="34" idx="1"/>
+            <a:endCxn id="2" idx="2"/>
+          </p:cNvCxnSpPr>
+          <p:nvPr/>
+        </p:nvCxnSpPr>
+        <p:spPr>
+          <a:xfrm rot="10800000">
+            <a:off x="1993999" y="1666935"/>
+            <a:ext cx="908135" cy="414168"/>
+          </a:xfrm>
+          <a:prstGeom prst="bentConnector2">
+            <a:avLst/>
+          </a:prstGeom>
+          <a:ln>
+            <a:tailEnd type="triangle"/>
+          </a:ln>
+        </p:spPr>
+        <p:style>
+          <a:lnRef idx="1">
+            <a:schemeClr val="dk1"/>
+          </a:lnRef>
+          <a:fillRef idx="0">
+            <a:schemeClr val="dk1"/>
+          </a:fillRef>
+          <a:effectRef idx="0">
+            <a:schemeClr val="dk1"/>
+          </a:effectRef>
+          <a:fontRef idx="minor">
+            <a:schemeClr val="tx1"/>
+          </a:fontRef>
+        </p:style>
+      </p:cxnSp>
+      <p:sp>
+        <p:nvSpPr>
+          <p:cNvPr id="44" name="Oval 43">
+            <a:extLst>
+              <a:ext uri="{FF2B5EF4-FFF2-40B4-BE49-F238E27FC236}">
+                <a16:creationId xmlns:a16="http://schemas.microsoft.com/office/drawing/2014/main" id="{1B75DDBE-A0A9-8F4D-A8A6-07661AB1BB1A}"/>
+              </a:ext>
+            </a:extLst>
+          </p:cNvPr>
+          <p:cNvSpPr/>
+          <p:nvPr/>
+        </p:nvSpPr>
+        <p:spPr>
+          <a:xfrm>
+            <a:off x="9321597" y="5373760"/>
+            <a:ext cx="1611630" cy="502920"/>
+          </a:xfrm>
+          <a:prstGeom prst="ellipse">
+            <a:avLst/>
+          </a:prstGeom>
+        </p:spPr>
+        <p:style>
+          <a:lnRef idx="2">
+            <a:schemeClr val="dk1"/>
+          </a:lnRef>
+          <a:fillRef idx="1">
+            <a:schemeClr val="lt1"/>
+          </a:fillRef>
+          <a:effectRef idx="0">
+            <a:schemeClr val="dk1"/>
+          </a:effectRef>
+          <a:fontRef idx="minor">
+            <a:schemeClr val="dk1"/>
+          </a:fontRef>
+        </p:style>
+        <p:txBody>
+          <a:bodyPr rtlCol="0" anchor="ctr"/>
+          <a:lstStyle/>
+          <a:p>
+            <a:pPr algn="ctr"/>
+            <a:r>
+              <a:rPr lang="en-GB" dirty="0"/>
+              <a:t>name</a:t>
+            </a:r>
+          </a:p>
+        </p:txBody>
+      </p:sp>
+      <p:sp>
+        <p:nvSpPr>
+          <p:cNvPr id="45" name="Oval 44">
+            <a:extLst>
+              <a:ext uri="{FF2B5EF4-FFF2-40B4-BE49-F238E27FC236}">
+                <a16:creationId xmlns:a16="http://schemas.microsoft.com/office/drawing/2014/main" id="{D3A727C8-264A-8F4D-9ABE-5CC6DA1D3F7C}"/>
+              </a:ext>
+            </a:extLst>
+          </p:cNvPr>
+          <p:cNvSpPr/>
+          <p:nvPr/>
+        </p:nvSpPr>
+        <p:spPr>
+          <a:xfrm>
+            <a:off x="208614" y="5372305"/>
+            <a:ext cx="1611630" cy="502920"/>
+          </a:xfrm>
+          <a:prstGeom prst="ellipse">
+            <a:avLst/>
+          </a:prstGeom>
+        </p:spPr>
+        <p:style>
+          <a:lnRef idx="2">
+            <a:schemeClr val="dk1"/>
+          </a:lnRef>
+          <a:fillRef idx="1">
+            <a:schemeClr val="lt1"/>
+          </a:fillRef>
+          <a:effectRef idx="0">
+            <a:schemeClr val="dk1"/>
+          </a:effectRef>
+          <a:fontRef idx="minor">
+            <a:schemeClr val="dk1"/>
+          </a:fontRef>
+        </p:style>
+        <p:txBody>
+          <a:bodyPr rtlCol="0" anchor="ctr"/>
+          <a:lstStyle/>
+          <a:p>
+            <a:pPr algn="ctr"/>
+            <a:r>
+              <a:rPr lang="en-GB" dirty="0"/>
+              <a:t>downs</a:t>
+            </a:r>
+          </a:p>
+        </p:txBody>
+      </p:sp>
+      <p:sp>
+        <p:nvSpPr>
+          <p:cNvPr id="47" name="Oval 46">
+            <a:extLst>
+              <a:ext uri="{FF2B5EF4-FFF2-40B4-BE49-F238E27FC236}">
+                <a16:creationId xmlns:a16="http://schemas.microsoft.com/office/drawing/2014/main" id="{2F9EE5EB-D2B0-7F4F-A8FF-229606277B45}"/>
+              </a:ext>
+            </a:extLst>
+          </p:cNvPr>
+          <p:cNvSpPr/>
+          <p:nvPr/>
+        </p:nvSpPr>
+        <p:spPr>
+          <a:xfrm>
+            <a:off x="260476" y="6059477"/>
+            <a:ext cx="1611630" cy="502920"/>
+          </a:xfrm>
+          <a:prstGeom prst="ellipse">
+            <a:avLst/>
+          </a:prstGeom>
+        </p:spPr>
+        <p:style>
+          <a:lnRef idx="2">
+            <a:schemeClr val="dk1"/>
+          </a:lnRef>
+          <a:fillRef idx="1">
+            <a:schemeClr val="lt1"/>
+          </a:fillRef>
+          <a:effectRef idx="0">
+            <a:schemeClr val="dk1"/>
+          </a:effectRef>
+          <a:fontRef idx="minor">
+            <a:schemeClr val="dk1"/>
+          </a:fontRef>
+        </p:style>
+        <p:txBody>
+          <a:bodyPr rtlCol="0" anchor="ctr"/>
+          <a:lstStyle/>
+          <a:p>
+            <a:pPr algn="ctr"/>
+            <a:r>
+              <a:rPr lang="en-GB" dirty="0"/>
+              <a:t>Archived</a:t>
+            </a:r>
+          </a:p>
+        </p:txBody>
+      </p:sp>
+      <p:cxnSp>
+        <p:nvCxnSpPr>
+          <p:cNvPr id="108" name="Elbow Connector 107">
+            <a:extLst>
+              <a:ext uri="{FF2B5EF4-FFF2-40B4-BE49-F238E27FC236}">
+                <a16:creationId xmlns:a16="http://schemas.microsoft.com/office/drawing/2014/main" id="{0389EC49-AF7F-AA43-A7B4-88CEA567B83F}"/>
+              </a:ext>
+            </a:extLst>
+          </p:cNvPr>
+          <p:cNvCxnSpPr>
+            <a:stCxn id="45" idx="6"/>
+            <a:endCxn id="3" idx="2"/>
+          </p:cNvCxnSpPr>
+          <p:nvPr/>
+        </p:nvCxnSpPr>
+        <p:spPr>
+          <a:xfrm flipV="1">
+            <a:off x="1820244" y="2251218"/>
+            <a:ext cx="3843475" cy="3372547"/>
+          </a:xfrm>
+          <a:prstGeom prst="bentConnector2">
+            <a:avLst/>
+          </a:prstGeom>
+        </p:spPr>
+        <p:style>
+          <a:lnRef idx="1">
+            <a:schemeClr val="dk1"/>
+          </a:lnRef>
+          <a:fillRef idx="0">
+            <a:schemeClr val="dk1"/>
+          </a:fillRef>
+          <a:effectRef idx="0">
+            <a:schemeClr val="dk1"/>
+          </a:effectRef>
+          <a:fontRef idx="minor">
+            <a:schemeClr val="tx1"/>
+          </a:fontRef>
+        </p:style>
+      </p:cxnSp>
+      <p:cxnSp>
+        <p:nvCxnSpPr>
+          <p:cNvPr id="110" name="Elbow Connector 109">
+            <a:extLst>
+              <a:ext uri="{FF2B5EF4-FFF2-40B4-BE49-F238E27FC236}">
+                <a16:creationId xmlns:a16="http://schemas.microsoft.com/office/drawing/2014/main" id="{35803F01-B116-604D-A7A9-FEB37442F14B}"/>
+              </a:ext>
+            </a:extLst>
+          </p:cNvPr>
+          <p:cNvCxnSpPr>
+            <a:stCxn id="47" idx="6"/>
+            <a:endCxn id="3" idx="2"/>
+          </p:cNvCxnSpPr>
+          <p:nvPr/>
+        </p:nvCxnSpPr>
+        <p:spPr>
+          <a:xfrm flipV="1">
+            <a:off x="1872106" y="2251218"/>
+            <a:ext cx="3791613" cy="4059719"/>
+          </a:xfrm>
+          <a:prstGeom prst="bentConnector2">
+            <a:avLst/>
+          </a:prstGeom>
+        </p:spPr>
+        <p:style>
+          <a:lnRef idx="1">
+            <a:schemeClr val="dk1"/>
+          </a:lnRef>
+          <a:fillRef idx="0">
+            <a:schemeClr val="dk1"/>
+          </a:fillRef>
+          <a:effectRef idx="0">
+            <a:schemeClr val="dk1"/>
+          </a:effectRef>
+          <a:fontRef idx="minor">
+            <a:schemeClr val="tx1"/>
+          </a:fontRef>
+        </p:style>
+      </p:cxnSp>
+      <p:cxnSp>
+        <p:nvCxnSpPr>
+          <p:cNvPr id="117" name="Elbow Connector 116">
+            <a:extLst>
+              <a:ext uri="{FF2B5EF4-FFF2-40B4-BE49-F238E27FC236}">
+                <a16:creationId xmlns:a16="http://schemas.microsoft.com/office/drawing/2014/main" id="{75C502E1-74EF-124A-8369-218133FE592D}"/>
+              </a:ext>
+            </a:extLst>
+          </p:cNvPr>
+          <p:cNvCxnSpPr>
+            <a:stCxn id="44" idx="2"/>
+            <a:endCxn id="3" idx="2"/>
+          </p:cNvCxnSpPr>
+          <p:nvPr/>
+        </p:nvCxnSpPr>
+        <p:spPr>
+          <a:xfrm rot="10800000">
+            <a:off x="5663719" y="2251218"/>
+            <a:ext cx="3657878" cy="3374002"/>
+          </a:xfrm>
+          <a:prstGeom prst="bentConnector2">
+            <a:avLst/>
+          </a:prstGeom>
+        </p:spPr>
+        <p:style>
+          <a:lnRef idx="1">
+            <a:schemeClr val="dk1"/>
+          </a:lnRef>
+          <a:fillRef idx="0">
+            <a:schemeClr val="dk1"/>
+          </a:fillRef>
+          <a:effectRef idx="0">
+            <a:schemeClr val="dk1"/>
+          </a:effectRef>
+          <a:fontRef idx="minor">
+            <a:schemeClr val="tx1"/>
+          </a:fontRef>
+        </p:style>
+      </p:cxnSp>
     </p:spTree>
     <p:extLst>
       <p:ext uri="{BB962C8B-B14F-4D97-AF65-F5344CB8AC3E}">
-        <p14:creationId xmlns:p14="http://schemas.microsoft.com/office/powerpoint/2010/main" val="470048248"/>
+        <p14:creationId xmlns:p14="http://schemas.microsoft.com/office/powerpoint/2010/main" val="1014063548"/>
       </p:ext>
     </p:extLst>
   </p:cSld>
@@ -3409,10 +5070,146 @@
       </p:grpSpPr>
       <p:sp>
         <p:nvSpPr>
-          <p:cNvPr id="2" name="TextBox 1">
-            <a:extLst>
-              <a:ext uri="{FF2B5EF4-FFF2-40B4-BE49-F238E27FC236}">
-                <a16:creationId xmlns:a16="http://schemas.microsoft.com/office/drawing/2014/main" id="{B9186F6B-2000-9C41-8D3C-F08758FD99C2}"/>
+          <p:cNvPr id="3" name="Rectangle 2">
+            <a:extLst>
+              <a:ext uri="{FF2B5EF4-FFF2-40B4-BE49-F238E27FC236}">
+                <a16:creationId xmlns:a16="http://schemas.microsoft.com/office/drawing/2014/main" id="{A58CA770-A8A8-474E-BB3F-D36C9EFDFE9A}"/>
+              </a:ext>
+            </a:extLst>
+          </p:cNvPr>
+          <p:cNvSpPr/>
+          <p:nvPr/>
+        </p:nvSpPr>
+        <p:spPr>
+          <a:xfrm>
+            <a:off x="651238" y="348735"/>
+            <a:ext cx="1191545" cy="369332"/>
+          </a:xfrm>
+          <a:prstGeom prst="rect">
+            <a:avLst/>
+          </a:prstGeom>
+        </p:spPr>
+        <p:txBody>
+          <a:bodyPr wrap="none">
+            <a:spAutoFit/>
+          </a:bodyPr>
+          <a:lstStyle/>
+          <a:p>
+            <a:r>
+              <a:rPr lang="en-GB" dirty="0"/>
+              <a:t>result := 𝜋 </a:t>
+            </a:r>
+          </a:p>
+        </p:txBody>
+      </p:sp>
+      <p:sp>
+        <p:nvSpPr>
+          <p:cNvPr id="4" name="Rectangle 3">
+            <a:extLst>
+              <a:ext uri="{FF2B5EF4-FFF2-40B4-BE49-F238E27FC236}">
+                <a16:creationId xmlns:a16="http://schemas.microsoft.com/office/drawing/2014/main" id="{A591CC2C-C8AF-1443-9BA3-C665AC6045DC}"/>
+              </a:ext>
+            </a:extLst>
+          </p:cNvPr>
+          <p:cNvSpPr/>
+          <p:nvPr/>
+        </p:nvSpPr>
+        <p:spPr>
+          <a:xfrm>
+            <a:off x="1621315" y="533401"/>
+            <a:ext cx="598241" cy="307777"/>
+          </a:xfrm>
+          <a:prstGeom prst="rect">
+            <a:avLst/>
+          </a:prstGeom>
+        </p:spPr>
+        <p:txBody>
+          <a:bodyPr wrap="none">
+            <a:spAutoFit/>
+          </a:bodyPr>
+          <a:lstStyle/>
+          <a:p>
+            <a:r>
+              <a:rPr lang="en-GB" sz="1400" dirty="0"/>
+              <a:t>name</a:t>
+            </a:r>
+          </a:p>
+        </p:txBody>
+      </p:sp>
+      <p:sp>
+        <p:nvSpPr>
+          <p:cNvPr id="5" name="Rectangle 4">
+            <a:extLst>
+              <a:ext uri="{FF2B5EF4-FFF2-40B4-BE49-F238E27FC236}">
+                <a16:creationId xmlns:a16="http://schemas.microsoft.com/office/drawing/2014/main" id="{12969DFD-3CAF-AB47-9F8B-48782F91FADB}"/>
+              </a:ext>
+            </a:extLst>
+          </p:cNvPr>
+          <p:cNvSpPr/>
+          <p:nvPr/>
+        </p:nvSpPr>
+        <p:spPr>
+          <a:xfrm>
+            <a:off x="2059830" y="348735"/>
+            <a:ext cx="4036170" cy="369332"/>
+          </a:xfrm>
+          <a:prstGeom prst="rect">
+            <a:avLst/>
+          </a:prstGeom>
+        </p:spPr>
+        <p:txBody>
+          <a:bodyPr wrap="none">
+            <a:spAutoFit/>
+          </a:bodyPr>
+          <a:lstStyle/>
+          <a:p>
+            <a:r>
+              <a:rPr lang="en-GB" dirty="0"/>
+              <a:t>(student   	⋈ 	enrolledIn) </a:t>
+            </a:r>
+          </a:p>
+        </p:txBody>
+      </p:sp>
+      <p:sp>
+        <p:nvSpPr>
+          <p:cNvPr id="6" name="Rectangle 5">
+            <a:extLst>
+              <a:ext uri="{FF2B5EF4-FFF2-40B4-BE49-F238E27FC236}">
+                <a16:creationId xmlns:a16="http://schemas.microsoft.com/office/drawing/2014/main" id="{3D7BE66A-1638-D24B-B30C-082C4F833FDC}"/>
+              </a:ext>
+            </a:extLst>
+          </p:cNvPr>
+          <p:cNvSpPr/>
+          <p:nvPr/>
+        </p:nvSpPr>
+        <p:spPr>
+          <a:xfrm>
+            <a:off x="3413246" y="601005"/>
+            <a:ext cx="1329338" cy="307777"/>
+          </a:xfrm>
+          <a:prstGeom prst="rect">
+            <a:avLst/>
+          </a:prstGeom>
+        </p:spPr>
+        <p:txBody>
+          <a:bodyPr wrap="none">
+            <a:spAutoFit/>
+          </a:bodyPr>
+          <a:lstStyle/>
+          <a:p>
+            <a:r>
+              <a:rPr lang="en-GB" sz="1400" dirty="0"/>
+              <a:t>code = '2dv513'</a:t>
+            </a:r>
+          </a:p>
+        </p:txBody>
+      </p:sp>
+      <p:sp>
+        <p:nvSpPr>
+          <p:cNvPr id="9" name="TextBox 8">
+            <a:extLst>
+              <a:ext uri="{FF2B5EF4-FFF2-40B4-BE49-F238E27FC236}">
+                <a16:creationId xmlns:a16="http://schemas.microsoft.com/office/drawing/2014/main" id="{9B595559-A9E3-CB45-9A79-6FC37BBEE5F1}"/>
               </a:ext>
             </a:extLst>
           </p:cNvPr>
@@ -3421,8 +5218,281 @@
         </p:nvSpPr>
         <p:spPr>
           <a:xfrm>
-            <a:off x="1642363" y="1297603"/>
-            <a:ext cx="703269" cy="369332"/>
+            <a:off x="7130143" y="348735"/>
+            <a:ext cx="1048300" cy="369332"/>
+          </a:xfrm>
+          <a:prstGeom prst="rect">
+            <a:avLst/>
+          </a:prstGeom>
+          <a:noFill/>
+        </p:spPr>
+        <p:txBody>
+          <a:bodyPr wrap="none" rtlCol="0">
+            <a:spAutoFit/>
+          </a:bodyPr>
+          <a:lstStyle/>
+          <a:p>
+            <a:r>
+              <a:rPr lang="en-GB" dirty="0"/>
+              <a:t>Task one </a:t>
+            </a:r>
+          </a:p>
+        </p:txBody>
+      </p:sp>
+      <p:sp>
+        <p:nvSpPr>
+          <p:cNvPr id="11" name="Rectangle 10">
+            <a:extLst>
+              <a:ext uri="{FF2B5EF4-FFF2-40B4-BE49-F238E27FC236}">
+                <a16:creationId xmlns:a16="http://schemas.microsoft.com/office/drawing/2014/main" id="{359A960C-2D8F-1D42-B0AE-812729082400}"/>
+              </a:ext>
+            </a:extLst>
+          </p:cNvPr>
+          <p:cNvSpPr/>
+          <p:nvPr/>
+        </p:nvSpPr>
+        <p:spPr>
+          <a:xfrm>
+            <a:off x="455639" y="1161052"/>
+            <a:ext cx="1262077" cy="369332"/>
+          </a:xfrm>
+          <a:prstGeom prst="rect">
+            <a:avLst/>
+          </a:prstGeom>
+        </p:spPr>
+        <p:txBody>
+          <a:bodyPr wrap="none">
+            <a:spAutoFit/>
+          </a:bodyPr>
+          <a:lstStyle/>
+          <a:p>
+            <a:r>
+              <a:rPr lang="en-GB" dirty="0"/>
+              <a:t>result := (𝜋 </a:t>
+            </a:r>
+          </a:p>
+        </p:txBody>
+      </p:sp>
+      <p:sp>
+        <p:nvSpPr>
+          <p:cNvPr id="12" name="Rectangle 11">
+            <a:extLst>
+              <a:ext uri="{FF2B5EF4-FFF2-40B4-BE49-F238E27FC236}">
+                <a16:creationId xmlns:a16="http://schemas.microsoft.com/office/drawing/2014/main" id="{A7821084-EE62-464C-B683-3AF3EAAF702F}"/>
+              </a:ext>
+            </a:extLst>
+          </p:cNvPr>
+          <p:cNvSpPr/>
+          <p:nvPr/>
+        </p:nvSpPr>
+        <p:spPr>
+          <a:xfrm>
+            <a:off x="1478136" y="1345718"/>
+            <a:ext cx="598241" cy="307777"/>
+          </a:xfrm>
+          <a:prstGeom prst="rect">
+            <a:avLst/>
+          </a:prstGeom>
+        </p:spPr>
+        <p:txBody>
+          <a:bodyPr wrap="none">
+            <a:spAutoFit/>
+          </a:bodyPr>
+          <a:lstStyle/>
+          <a:p>
+            <a:r>
+              <a:rPr lang="en-GB" sz="1400" dirty="0"/>
+              <a:t>name</a:t>
+            </a:r>
+          </a:p>
+        </p:txBody>
+      </p:sp>
+      <p:sp>
+        <p:nvSpPr>
+          <p:cNvPr id="13" name="Rectangle 12">
+            <a:extLst>
+              <a:ext uri="{FF2B5EF4-FFF2-40B4-BE49-F238E27FC236}">
+                <a16:creationId xmlns:a16="http://schemas.microsoft.com/office/drawing/2014/main" id="{934199DA-E2A6-004D-8DA6-9181CA8591A7}"/>
+              </a:ext>
+            </a:extLst>
+          </p:cNvPr>
+          <p:cNvSpPr/>
+          <p:nvPr/>
+        </p:nvSpPr>
+        <p:spPr>
+          <a:xfrm>
+            <a:off x="1896544" y="1161052"/>
+            <a:ext cx="4629281" cy="369332"/>
+          </a:xfrm>
+          <a:prstGeom prst="rect">
+            <a:avLst/>
+          </a:prstGeom>
+        </p:spPr>
+        <p:txBody>
+          <a:bodyPr wrap="none">
+            <a:spAutoFit/>
+          </a:bodyPr>
+          <a:lstStyle/>
+          <a:p>
+            <a:r>
+              <a:rPr lang="en-GB" dirty="0"/>
+              <a:t>(student		 ⋈	 enrolledIn)) ∪ (𝜋 </a:t>
+            </a:r>
+          </a:p>
+        </p:txBody>
+      </p:sp>
+      <p:sp>
+        <p:nvSpPr>
+          <p:cNvPr id="14" name="Rectangle 13">
+            <a:extLst>
+              <a:ext uri="{FF2B5EF4-FFF2-40B4-BE49-F238E27FC236}">
+                <a16:creationId xmlns:a16="http://schemas.microsoft.com/office/drawing/2014/main" id="{40C475C2-8691-F449-8978-81243C0BD1F4}"/>
+              </a:ext>
+            </a:extLst>
+          </p:cNvPr>
+          <p:cNvSpPr/>
+          <p:nvPr/>
+        </p:nvSpPr>
+        <p:spPr>
+          <a:xfrm>
+            <a:off x="3291637" y="1530384"/>
+            <a:ext cx="1369414" cy="307777"/>
+          </a:xfrm>
+          <a:prstGeom prst="rect">
+            <a:avLst/>
+          </a:prstGeom>
+        </p:spPr>
+        <p:txBody>
+          <a:bodyPr wrap="none">
+            <a:spAutoFit/>
+          </a:bodyPr>
+          <a:lstStyle/>
+          <a:p>
+            <a:r>
+              <a:rPr lang="en-GB" sz="1400" dirty="0"/>
+              <a:t>code = '2dv513' </a:t>
+            </a:r>
+          </a:p>
+        </p:txBody>
+      </p:sp>
+      <p:sp>
+        <p:nvSpPr>
+          <p:cNvPr id="15" name="Rectangle 14">
+            <a:extLst>
+              <a:ext uri="{FF2B5EF4-FFF2-40B4-BE49-F238E27FC236}">
+                <a16:creationId xmlns:a16="http://schemas.microsoft.com/office/drawing/2014/main" id="{03D5B927-7B8B-D744-B213-F4154A170164}"/>
+              </a:ext>
+            </a:extLst>
+          </p:cNvPr>
+          <p:cNvSpPr/>
+          <p:nvPr/>
+        </p:nvSpPr>
+        <p:spPr>
+          <a:xfrm>
+            <a:off x="6226704" y="1345717"/>
+            <a:ext cx="598241" cy="307777"/>
+          </a:xfrm>
+          <a:prstGeom prst="rect">
+            <a:avLst/>
+          </a:prstGeom>
+        </p:spPr>
+        <p:txBody>
+          <a:bodyPr wrap="none">
+            <a:spAutoFit/>
+          </a:bodyPr>
+          <a:lstStyle/>
+          <a:p>
+            <a:r>
+              <a:rPr lang="en-GB" sz="1400" dirty="0"/>
+              <a:t>name</a:t>
+            </a:r>
+          </a:p>
+        </p:txBody>
+      </p:sp>
+      <p:sp>
+        <p:nvSpPr>
+          <p:cNvPr id="16" name="Rectangle 15">
+            <a:extLst>
+              <a:ext uri="{FF2B5EF4-FFF2-40B4-BE49-F238E27FC236}">
+                <a16:creationId xmlns:a16="http://schemas.microsoft.com/office/drawing/2014/main" id="{AD6BDD32-E080-CB40-8034-00615D0401ED}"/>
+              </a:ext>
+            </a:extLst>
+          </p:cNvPr>
+          <p:cNvSpPr/>
+          <p:nvPr/>
+        </p:nvSpPr>
+        <p:spPr>
+          <a:xfrm>
+            <a:off x="6704653" y="1161052"/>
+            <a:ext cx="4106702" cy="369332"/>
+          </a:xfrm>
+          <a:prstGeom prst="rect">
+            <a:avLst/>
+          </a:prstGeom>
+        </p:spPr>
+        <p:txBody>
+          <a:bodyPr wrap="none">
+            <a:spAutoFit/>
+          </a:bodyPr>
+          <a:lstStyle/>
+          <a:p>
+            <a:r>
+              <a:rPr lang="en-GB" dirty="0"/>
+              <a:t>(student 		⋈ 	enrolledIn)) </a:t>
+            </a:r>
+          </a:p>
+        </p:txBody>
+      </p:sp>
+      <p:sp>
+        <p:nvSpPr>
+          <p:cNvPr id="17" name="Rectangle 16">
+            <a:extLst>
+              <a:ext uri="{FF2B5EF4-FFF2-40B4-BE49-F238E27FC236}">
+                <a16:creationId xmlns:a16="http://schemas.microsoft.com/office/drawing/2014/main" id="{A8884D77-F33A-3048-9BFE-0EFF3279D053}"/>
+              </a:ext>
+            </a:extLst>
+          </p:cNvPr>
+          <p:cNvSpPr/>
+          <p:nvPr/>
+        </p:nvSpPr>
+        <p:spPr>
+          <a:xfrm>
+            <a:off x="7984136" y="1530383"/>
+            <a:ext cx="1369414" cy="307777"/>
+          </a:xfrm>
+          <a:prstGeom prst="rect">
+            <a:avLst/>
+          </a:prstGeom>
+        </p:spPr>
+        <p:txBody>
+          <a:bodyPr wrap="none">
+            <a:spAutoFit/>
+          </a:bodyPr>
+          <a:lstStyle/>
+          <a:p>
+            <a:r>
+              <a:rPr lang="en-GB" sz="1400" dirty="0"/>
+              <a:t>code = '1dv513'</a:t>
+            </a:r>
+          </a:p>
+        </p:txBody>
+      </p:sp>
+      <p:sp>
+        <p:nvSpPr>
+          <p:cNvPr id="18" name="TextBox 17">
+            <a:extLst>
+              <a:ext uri="{FF2B5EF4-FFF2-40B4-BE49-F238E27FC236}">
+                <a16:creationId xmlns:a16="http://schemas.microsoft.com/office/drawing/2014/main" id="{7D2EDDA8-48D0-B44A-A7A6-39CB458245E9}"/>
+              </a:ext>
+            </a:extLst>
+          </p:cNvPr>
+          <p:cNvSpPr txBox="1"/>
+          <p:nvPr/>
+        </p:nvSpPr>
+        <p:spPr>
+          <a:xfrm>
+            <a:off x="185057" y="572108"/>
+            <a:ext cx="301686" cy="369332"/>
           </a:xfrm>
           <a:prstGeom prst="rect">
             <a:avLst/>
@@ -3430,37 +5500,37 @@
         </p:spPr>
         <p:style>
           <a:lnRef idx="2">
-            <a:schemeClr val="dk1"/>
+            <a:schemeClr val="accent1"/>
           </a:lnRef>
           <a:fillRef idx="1">
             <a:schemeClr val="lt1"/>
           </a:fillRef>
           <a:effectRef idx="0">
-            <a:schemeClr val="dk1"/>
+            <a:schemeClr val="accent1"/>
           </a:effectRef>
           <a:fontRef idx="minor">
             <a:schemeClr val="dk1"/>
           </a:fontRef>
         </p:style>
         <p:txBody>
-          <a:bodyPr wrap="square" rtlCol="0">
+          <a:bodyPr wrap="none" rtlCol="0">
             <a:spAutoFit/>
           </a:bodyPr>
           <a:lstStyle/>
           <a:p>
             <a:r>
               <a:rPr lang="en-GB" dirty="0"/>
-              <a:t>Users</a:t>
-            </a:r>
-          </a:p>
-        </p:txBody>
-      </p:sp>
-      <p:sp>
-        <p:nvSpPr>
-          <p:cNvPr id="3" name="TextBox 2">
-            <a:extLst>
-              <a:ext uri="{FF2B5EF4-FFF2-40B4-BE49-F238E27FC236}">
-                <a16:creationId xmlns:a16="http://schemas.microsoft.com/office/drawing/2014/main" id="{51914F44-659B-F546-AC5F-F07BFB0D4802}"/>
+              <a:t>1</a:t>
+            </a:r>
+          </a:p>
+        </p:txBody>
+      </p:sp>
+      <p:sp>
+        <p:nvSpPr>
+          <p:cNvPr id="19" name="TextBox 18">
+            <a:extLst>
+              <a:ext uri="{FF2B5EF4-FFF2-40B4-BE49-F238E27FC236}">
+                <a16:creationId xmlns:a16="http://schemas.microsoft.com/office/drawing/2014/main" id="{81DEC302-9299-EE43-A13B-75C7A81BE6ED}"/>
               </a:ext>
             </a:extLst>
           </p:cNvPr>
@@ -3469,8 +5539,8 @@
         </p:nvSpPr>
         <p:spPr>
           <a:xfrm>
-            <a:off x="5063490" y="1881886"/>
-            <a:ext cx="1200457" cy="369332"/>
+            <a:off x="183271" y="1168170"/>
+            <a:ext cx="295239" cy="369331"/>
           </a:xfrm>
           <a:prstGeom prst="rect">
             <a:avLst/>
@@ -3478,37 +5548,37 @@
         </p:spPr>
         <p:style>
           <a:lnRef idx="2">
-            <a:schemeClr val="dk1"/>
+            <a:schemeClr val="accent1"/>
           </a:lnRef>
           <a:fillRef idx="1">
             <a:schemeClr val="lt1"/>
           </a:fillRef>
           <a:effectRef idx="0">
-            <a:schemeClr val="dk1"/>
+            <a:schemeClr val="accent1"/>
           </a:effectRef>
           <a:fontRef idx="minor">
             <a:schemeClr val="dk1"/>
           </a:fontRef>
         </p:style>
         <p:txBody>
-          <a:bodyPr wrap="none" rtlCol="0">
+          <a:bodyPr wrap="square" rtlCol="0">
             <a:spAutoFit/>
           </a:bodyPr>
           <a:lstStyle/>
           <a:p>
             <a:r>
               <a:rPr lang="en-GB" dirty="0"/>
-              <a:t>Comments</a:t>
-            </a:r>
-          </a:p>
-        </p:txBody>
-      </p:sp>
-      <p:sp>
-        <p:nvSpPr>
-          <p:cNvPr id="4" name="TextBox 3">
-            <a:extLst>
-              <a:ext uri="{FF2B5EF4-FFF2-40B4-BE49-F238E27FC236}">
-                <a16:creationId xmlns:a16="http://schemas.microsoft.com/office/drawing/2014/main" id="{3825D2F0-6805-B743-ACAE-89177CA2C0E8}"/>
+              <a:t>2</a:t>
+            </a:r>
+          </a:p>
+        </p:txBody>
+      </p:sp>
+      <p:sp>
+        <p:nvSpPr>
+          <p:cNvPr id="20" name="TextBox 19">
+            <a:extLst>
+              <a:ext uri="{FF2B5EF4-FFF2-40B4-BE49-F238E27FC236}">
+                <a16:creationId xmlns:a16="http://schemas.microsoft.com/office/drawing/2014/main" id="{C8C53582-8498-4643-B6E7-6FBEB822EA32}"/>
               </a:ext>
             </a:extLst>
           </p:cNvPr>
@@ -3517,8 +5587,8 @@
         </p:nvSpPr>
         <p:spPr>
           <a:xfrm>
-            <a:off x="9693660" y="1176518"/>
-            <a:ext cx="1242841" cy="369332"/>
+            <a:off x="185057" y="2133564"/>
+            <a:ext cx="301686" cy="369332"/>
           </a:xfrm>
           <a:prstGeom prst="rect">
             <a:avLst/>
@@ -3526,13 +5596,13 @@
         </p:spPr>
         <p:style>
           <a:lnRef idx="2">
-            <a:schemeClr val="dk1"/>
+            <a:schemeClr val="accent1"/>
           </a:lnRef>
           <a:fillRef idx="1">
             <a:schemeClr val="lt1"/>
           </a:fillRef>
           <a:effectRef idx="0">
-            <a:schemeClr val="dk1"/>
+            <a:schemeClr val="accent1"/>
           </a:effectRef>
           <a:fontRef idx="minor">
             <a:schemeClr val="dk1"/>
@@ -3546,112 +5616,113 @@
           <a:p>
             <a:r>
               <a:rPr lang="en-GB" dirty="0"/>
-              <a:t>Subreddits </a:t>
-            </a:r>
-          </a:p>
-        </p:txBody>
-      </p:sp>
-      <p:sp>
-        <p:nvSpPr>
-          <p:cNvPr id="5" name="Oval 4">
-            <a:extLst>
-              <a:ext uri="{FF2B5EF4-FFF2-40B4-BE49-F238E27FC236}">
-                <a16:creationId xmlns:a16="http://schemas.microsoft.com/office/drawing/2014/main" id="{D46D62FB-6578-B442-B3F0-A479CD72CFA7}"/>
-              </a:ext>
-            </a:extLst>
-          </p:cNvPr>
-          <p:cNvSpPr/>
-          <p:nvPr/>
-        </p:nvSpPr>
-        <p:spPr>
-          <a:xfrm>
-            <a:off x="9417838" y="4709768"/>
-            <a:ext cx="1611630" cy="502920"/>
-          </a:xfrm>
-          <a:prstGeom prst="ellipse">
+              <a:t>3</a:t>
+            </a:r>
+          </a:p>
+        </p:txBody>
+      </p:sp>
+      <p:sp>
+        <p:nvSpPr>
+          <p:cNvPr id="21" name="TextBox 20">
+            <a:extLst>
+              <a:ext uri="{FF2B5EF4-FFF2-40B4-BE49-F238E27FC236}">
+                <a16:creationId xmlns:a16="http://schemas.microsoft.com/office/drawing/2014/main" id="{CFB69D49-6C82-2A4B-B6B8-AE8B2984D53D}"/>
+              </a:ext>
+            </a:extLst>
+          </p:cNvPr>
+          <p:cNvSpPr txBox="1"/>
+          <p:nvPr/>
+        </p:nvSpPr>
+        <p:spPr>
+          <a:xfrm>
+            <a:off x="185057" y="3244334"/>
+            <a:ext cx="301686" cy="369332"/>
+          </a:xfrm>
+          <a:prstGeom prst="rect">
             <a:avLst/>
           </a:prstGeom>
         </p:spPr>
         <p:style>
           <a:lnRef idx="2">
-            <a:schemeClr val="dk1"/>
+            <a:schemeClr val="accent1"/>
           </a:lnRef>
           <a:fillRef idx="1">
             <a:schemeClr val="lt1"/>
           </a:fillRef>
           <a:effectRef idx="0">
-            <a:schemeClr val="dk1"/>
+            <a:schemeClr val="accent1"/>
           </a:effectRef>
           <a:fontRef idx="minor">
             <a:schemeClr val="dk1"/>
           </a:fontRef>
         </p:style>
         <p:txBody>
-          <a:bodyPr rtlCol="0" anchor="ctr"/>
-          <a:lstStyle/>
-          <a:p>
-            <a:pPr algn="ctr"/>
-            <a:r>
-              <a:rPr lang="en-GB" dirty="0" err="1"/>
-              <a:t>parentID</a:t>
-            </a:r>
-            <a:endParaRPr lang="en-GB" dirty="0"/>
-          </a:p>
-        </p:txBody>
-      </p:sp>
-      <p:sp>
-        <p:nvSpPr>
-          <p:cNvPr id="6" name="Oval 5">
-            <a:extLst>
-              <a:ext uri="{FF2B5EF4-FFF2-40B4-BE49-F238E27FC236}">
-                <a16:creationId xmlns:a16="http://schemas.microsoft.com/office/drawing/2014/main" id="{E82F4C38-B7CC-EA4F-AA6E-47F6A89824B9}"/>
-              </a:ext>
-            </a:extLst>
-          </p:cNvPr>
-          <p:cNvSpPr/>
-          <p:nvPr/>
-        </p:nvSpPr>
-        <p:spPr>
-          <a:xfrm>
-            <a:off x="148098" y="4110934"/>
-            <a:ext cx="1611630" cy="502920"/>
-          </a:xfrm>
-          <a:prstGeom prst="ellipse">
+          <a:bodyPr wrap="none" rtlCol="0">
+            <a:spAutoFit/>
+          </a:bodyPr>
+          <a:lstStyle/>
+          <a:p>
+            <a:r>
+              <a:rPr lang="en-GB" dirty="0"/>
+              <a:t>4</a:t>
+            </a:r>
+          </a:p>
+        </p:txBody>
+      </p:sp>
+      <p:sp>
+        <p:nvSpPr>
+          <p:cNvPr id="22" name="TextBox 21">
+            <a:extLst>
+              <a:ext uri="{FF2B5EF4-FFF2-40B4-BE49-F238E27FC236}">
+                <a16:creationId xmlns:a16="http://schemas.microsoft.com/office/drawing/2014/main" id="{2E213727-9EB3-A94B-9F17-C1ACC2AB49B3}"/>
+              </a:ext>
+            </a:extLst>
+          </p:cNvPr>
+          <p:cNvSpPr txBox="1"/>
+          <p:nvPr/>
+        </p:nvSpPr>
+        <p:spPr>
+          <a:xfrm>
+            <a:off x="230580" y="4470381"/>
+            <a:ext cx="301686" cy="369332"/>
+          </a:xfrm>
+          <a:prstGeom prst="rect">
             <a:avLst/>
           </a:prstGeom>
         </p:spPr>
         <p:style>
           <a:lnRef idx="2">
-            <a:schemeClr val="dk1"/>
+            <a:schemeClr val="accent1"/>
           </a:lnRef>
           <a:fillRef idx="1">
             <a:schemeClr val="lt1"/>
           </a:fillRef>
           <a:effectRef idx="0">
-            <a:schemeClr val="dk1"/>
+            <a:schemeClr val="accent1"/>
           </a:effectRef>
           <a:fontRef idx="minor">
             <a:schemeClr val="dk1"/>
           </a:fontRef>
         </p:style>
         <p:txBody>
-          <a:bodyPr rtlCol="0" anchor="ctr"/>
-          <a:lstStyle/>
-          <a:p>
-            <a:pPr algn="ctr"/>
+          <a:bodyPr wrap="none" rtlCol="0">
+            <a:spAutoFit/>
+          </a:bodyPr>
+          <a:lstStyle/>
+          <a:p>
             <a:r>
               <a:rPr lang="en-GB" dirty="0"/>
-              <a:t>ups</a:t>
-            </a:r>
-          </a:p>
-        </p:txBody>
-      </p:sp>
-      <p:sp>
-        <p:nvSpPr>
-          <p:cNvPr id="8" name="Oval 7">
-            <a:extLst>
-              <a:ext uri="{FF2B5EF4-FFF2-40B4-BE49-F238E27FC236}">
-                <a16:creationId xmlns:a16="http://schemas.microsoft.com/office/drawing/2014/main" id="{10D85D01-4CDB-1D44-8AE7-D9B75E175FFE}"/>
+              <a:t>5</a:t>
+            </a:r>
+          </a:p>
+        </p:txBody>
+      </p:sp>
+      <p:sp>
+        <p:nvSpPr>
+          <p:cNvPr id="24" name="Rectangle 23">
+            <a:extLst>
+              <a:ext uri="{FF2B5EF4-FFF2-40B4-BE49-F238E27FC236}">
+                <a16:creationId xmlns:a16="http://schemas.microsoft.com/office/drawing/2014/main" id="{6BB97EFE-F9FB-454D-A7E8-85E6DFAC492D}"/>
               </a:ext>
             </a:extLst>
           </p:cNvPr>
@@ -3660,1467 +5731,900 @@
         </p:nvSpPr>
         <p:spPr>
           <a:xfrm>
-            <a:off x="156752" y="4705980"/>
-            <a:ext cx="1611630" cy="502920"/>
-          </a:xfrm>
-          <a:prstGeom prst="ellipse">
+            <a:off x="1090857" y="2207493"/>
+            <a:ext cx="1191545" cy="369332"/>
+          </a:xfrm>
+          <a:prstGeom prst="rect">
+            <a:avLst/>
+          </a:prstGeom>
+        </p:spPr>
+        <p:txBody>
+          <a:bodyPr wrap="none">
+            <a:spAutoFit/>
+          </a:bodyPr>
+          <a:lstStyle/>
+          <a:p>
+            <a:r>
+              <a:rPr lang="en-GB" dirty="0"/>
+              <a:t>result := 𝜋 </a:t>
+            </a:r>
+          </a:p>
+        </p:txBody>
+      </p:sp>
+      <p:sp>
+        <p:nvSpPr>
+          <p:cNvPr id="25" name="Rectangle 24">
+            <a:extLst>
+              <a:ext uri="{FF2B5EF4-FFF2-40B4-BE49-F238E27FC236}">
+                <a16:creationId xmlns:a16="http://schemas.microsoft.com/office/drawing/2014/main" id="{B20E083E-A2FC-D844-AC4D-41D635413333}"/>
+              </a:ext>
+            </a:extLst>
+          </p:cNvPr>
+          <p:cNvSpPr/>
+          <p:nvPr/>
+        </p:nvSpPr>
+        <p:spPr>
+          <a:xfrm>
+            <a:off x="2059906" y="2392159"/>
+            <a:ext cx="759375" cy="307777"/>
+          </a:xfrm>
+          <a:prstGeom prst="rect">
+            <a:avLst/>
+          </a:prstGeom>
+        </p:spPr>
+        <p:txBody>
+          <a:bodyPr wrap="none">
+            <a:spAutoFit/>
+          </a:bodyPr>
+          <a:lstStyle/>
+          <a:p>
+            <a:r>
+              <a:rPr lang="en-GB" sz="1400" dirty="0"/>
+              <a:t>lecturer</a:t>
+            </a:r>
+          </a:p>
+        </p:txBody>
+      </p:sp>
+      <p:sp>
+        <p:nvSpPr>
+          <p:cNvPr id="26" name="Rectangle 25">
+            <a:extLst>
+              <a:ext uri="{FF2B5EF4-FFF2-40B4-BE49-F238E27FC236}">
+                <a16:creationId xmlns:a16="http://schemas.microsoft.com/office/drawing/2014/main" id="{59EDE0CD-42A2-7840-81F1-AA67CF6FA412}"/>
+              </a:ext>
+            </a:extLst>
+          </p:cNvPr>
+          <p:cNvSpPr/>
+          <p:nvPr/>
+        </p:nvSpPr>
+        <p:spPr>
+          <a:xfrm>
+            <a:off x="2639031" y="2207493"/>
+            <a:ext cx="2473754" cy="369332"/>
+          </a:xfrm>
+          <a:prstGeom prst="rect">
+            <a:avLst/>
+          </a:prstGeom>
+        </p:spPr>
+        <p:txBody>
+          <a:bodyPr wrap="none">
+            <a:spAutoFit/>
+          </a:bodyPr>
+          <a:lstStyle/>
+          <a:p>
+            <a:r>
+              <a:rPr lang="en-GB" dirty="0"/>
+              <a:t>(𝜎 	         (subject))</a:t>
+            </a:r>
+          </a:p>
+        </p:txBody>
+      </p:sp>
+      <p:sp>
+        <p:nvSpPr>
+          <p:cNvPr id="27" name="Rectangle 26">
+            <a:extLst>
+              <a:ext uri="{FF2B5EF4-FFF2-40B4-BE49-F238E27FC236}">
+                <a16:creationId xmlns:a16="http://schemas.microsoft.com/office/drawing/2014/main" id="{F36A6ED7-E168-2841-94B5-8B5961AE53A0}"/>
+              </a:ext>
+            </a:extLst>
+          </p:cNvPr>
+          <p:cNvSpPr/>
+          <p:nvPr/>
+        </p:nvSpPr>
+        <p:spPr>
+          <a:xfrm>
+            <a:off x="2866242" y="2392159"/>
+            <a:ext cx="1374222" cy="307777"/>
+          </a:xfrm>
+          <a:prstGeom prst="rect">
+            <a:avLst/>
+          </a:prstGeom>
+        </p:spPr>
+        <p:txBody>
+          <a:bodyPr wrap="none">
+            <a:spAutoFit/>
+          </a:bodyPr>
+          <a:lstStyle/>
+          <a:p>
+            <a:r>
+              <a:rPr lang="en-GB" sz="1400" dirty="0"/>
+              <a:t>code = '2dv610’ </a:t>
+            </a:r>
+          </a:p>
+        </p:txBody>
+      </p:sp>
+      <p:sp>
+        <p:nvSpPr>
+          <p:cNvPr id="30" name="Rectangle 29">
+            <a:extLst>
+              <a:ext uri="{FF2B5EF4-FFF2-40B4-BE49-F238E27FC236}">
+                <a16:creationId xmlns:a16="http://schemas.microsoft.com/office/drawing/2014/main" id="{CEDEC388-A3BC-A040-BC53-2DFBCE569228}"/>
+              </a:ext>
+            </a:extLst>
+          </p:cNvPr>
+          <p:cNvSpPr/>
+          <p:nvPr/>
+        </p:nvSpPr>
+        <p:spPr>
+          <a:xfrm>
+            <a:off x="906611" y="3154271"/>
+            <a:ext cx="1262077" cy="369332"/>
+          </a:xfrm>
+          <a:prstGeom prst="rect">
+            <a:avLst/>
+          </a:prstGeom>
+        </p:spPr>
+        <p:txBody>
+          <a:bodyPr wrap="none">
+            <a:spAutoFit/>
+          </a:bodyPr>
+          <a:lstStyle/>
+          <a:p>
+            <a:r>
+              <a:rPr lang="en-GB" dirty="0"/>
+              <a:t>result := (𝜋 </a:t>
+            </a:r>
+          </a:p>
+        </p:txBody>
+      </p:sp>
+      <p:sp>
+        <p:nvSpPr>
+          <p:cNvPr id="31" name="Rectangle 30">
+            <a:extLst>
+              <a:ext uri="{FF2B5EF4-FFF2-40B4-BE49-F238E27FC236}">
+                <a16:creationId xmlns:a16="http://schemas.microsoft.com/office/drawing/2014/main" id="{22E2BE35-3E9E-3A45-8AA8-A5A134AEB718}"/>
+              </a:ext>
+            </a:extLst>
+          </p:cNvPr>
+          <p:cNvSpPr/>
+          <p:nvPr/>
+        </p:nvSpPr>
+        <p:spPr>
+          <a:xfrm>
+            <a:off x="1951641" y="3316309"/>
+            <a:ext cx="759375" cy="307777"/>
+          </a:xfrm>
+          <a:prstGeom prst="rect">
+            <a:avLst/>
+          </a:prstGeom>
+        </p:spPr>
+        <p:txBody>
+          <a:bodyPr wrap="none">
+            <a:spAutoFit/>
+          </a:bodyPr>
+          <a:lstStyle/>
+          <a:p>
+            <a:r>
+              <a:rPr lang="en-GB" sz="1400" dirty="0"/>
+              <a:t>lecturer</a:t>
+            </a:r>
+          </a:p>
+        </p:txBody>
+      </p:sp>
+      <p:sp>
+        <p:nvSpPr>
+          <p:cNvPr id="32" name="Rectangle 31">
+            <a:extLst>
+              <a:ext uri="{FF2B5EF4-FFF2-40B4-BE49-F238E27FC236}">
+                <a16:creationId xmlns:a16="http://schemas.microsoft.com/office/drawing/2014/main" id="{32F0D01E-5F7C-7F4B-8B37-F18EA3047BE9}"/>
+              </a:ext>
+            </a:extLst>
+          </p:cNvPr>
+          <p:cNvSpPr/>
+          <p:nvPr/>
+        </p:nvSpPr>
+        <p:spPr>
+          <a:xfrm>
+            <a:off x="2595489" y="3130824"/>
+            <a:ext cx="3119765" cy="369332"/>
+          </a:xfrm>
+          <a:prstGeom prst="rect">
+            <a:avLst/>
+          </a:prstGeom>
+        </p:spPr>
+        <p:txBody>
+          <a:bodyPr wrap="none">
+            <a:spAutoFit/>
+          </a:bodyPr>
+          <a:lstStyle/>
+          <a:p>
+            <a:r>
+              <a:rPr lang="en-GB" dirty="0"/>
+              <a:t>(𝜎 	         (subject))) ∪ (𝜋  </a:t>
+            </a:r>
+          </a:p>
+        </p:txBody>
+      </p:sp>
+      <p:sp>
+        <p:nvSpPr>
+          <p:cNvPr id="33" name="Rectangle 32">
+            <a:extLst>
+              <a:ext uri="{FF2B5EF4-FFF2-40B4-BE49-F238E27FC236}">
+                <a16:creationId xmlns:a16="http://schemas.microsoft.com/office/drawing/2014/main" id="{E70E3138-0F99-8D42-96F6-DE98D010A5F5}"/>
+              </a:ext>
+            </a:extLst>
+          </p:cNvPr>
+          <p:cNvSpPr/>
+          <p:nvPr/>
+        </p:nvSpPr>
+        <p:spPr>
+          <a:xfrm>
+            <a:off x="2822700" y="3315490"/>
+            <a:ext cx="1374222" cy="307777"/>
+          </a:xfrm>
+          <a:prstGeom prst="rect">
+            <a:avLst/>
+          </a:prstGeom>
+        </p:spPr>
+        <p:txBody>
+          <a:bodyPr wrap="none">
+            <a:spAutoFit/>
+          </a:bodyPr>
+          <a:lstStyle/>
+          <a:p>
+            <a:r>
+              <a:rPr lang="en-GB" sz="1400" dirty="0"/>
+              <a:t>code = '2dv610’ </a:t>
+            </a:r>
+          </a:p>
+        </p:txBody>
+      </p:sp>
+      <p:sp>
+        <p:nvSpPr>
+          <p:cNvPr id="36" name="Rectangle 35">
+            <a:extLst>
+              <a:ext uri="{FF2B5EF4-FFF2-40B4-BE49-F238E27FC236}">
+                <a16:creationId xmlns:a16="http://schemas.microsoft.com/office/drawing/2014/main" id="{24F7E832-04C2-6043-8C76-30E3D5F1B6E0}"/>
+              </a:ext>
+            </a:extLst>
+          </p:cNvPr>
+          <p:cNvSpPr/>
+          <p:nvPr/>
+        </p:nvSpPr>
+        <p:spPr>
+          <a:xfrm>
+            <a:off x="5445483" y="3315489"/>
+            <a:ext cx="759375" cy="307777"/>
+          </a:xfrm>
+          <a:prstGeom prst="rect">
+            <a:avLst/>
+          </a:prstGeom>
+        </p:spPr>
+        <p:txBody>
+          <a:bodyPr wrap="none">
+            <a:spAutoFit/>
+          </a:bodyPr>
+          <a:lstStyle/>
+          <a:p>
+            <a:r>
+              <a:rPr lang="en-GB" sz="1400" dirty="0"/>
+              <a:t>lecturer</a:t>
+            </a:r>
+          </a:p>
+        </p:txBody>
+      </p:sp>
+      <p:sp>
+        <p:nvSpPr>
+          <p:cNvPr id="37" name="Rectangle 36">
+            <a:extLst>
+              <a:ext uri="{FF2B5EF4-FFF2-40B4-BE49-F238E27FC236}">
+                <a16:creationId xmlns:a16="http://schemas.microsoft.com/office/drawing/2014/main" id="{F3F892E6-E924-B440-8181-E9FFE52C235E}"/>
+              </a:ext>
+            </a:extLst>
+          </p:cNvPr>
+          <p:cNvSpPr/>
+          <p:nvPr/>
+        </p:nvSpPr>
+        <p:spPr>
+          <a:xfrm>
+            <a:off x="6015525" y="3130823"/>
+            <a:ext cx="2544286" cy="369332"/>
+          </a:xfrm>
+          <a:prstGeom prst="rect">
+            <a:avLst/>
+          </a:prstGeom>
+        </p:spPr>
+        <p:txBody>
+          <a:bodyPr wrap="none">
+            <a:spAutoFit/>
+          </a:bodyPr>
+          <a:lstStyle/>
+          <a:p>
+            <a:r>
+              <a:rPr lang="en-GB" dirty="0"/>
+              <a:t>(𝜎 	         (subject)))</a:t>
+            </a:r>
+          </a:p>
+        </p:txBody>
+      </p:sp>
+      <p:sp>
+        <p:nvSpPr>
+          <p:cNvPr id="38" name="Rectangle 37">
+            <a:extLst>
+              <a:ext uri="{FF2B5EF4-FFF2-40B4-BE49-F238E27FC236}">
+                <a16:creationId xmlns:a16="http://schemas.microsoft.com/office/drawing/2014/main" id="{B162A404-1D3B-0F44-AF84-1788807F00E6}"/>
+              </a:ext>
+            </a:extLst>
+          </p:cNvPr>
+          <p:cNvSpPr/>
+          <p:nvPr/>
+        </p:nvSpPr>
+        <p:spPr>
+          <a:xfrm>
+            <a:off x="6206170" y="3315488"/>
+            <a:ext cx="1374222" cy="307777"/>
+          </a:xfrm>
+          <a:prstGeom prst="rect">
+            <a:avLst/>
+          </a:prstGeom>
+        </p:spPr>
+        <p:txBody>
+          <a:bodyPr wrap="none">
+            <a:spAutoFit/>
+          </a:bodyPr>
+          <a:lstStyle/>
+          <a:p>
+            <a:r>
+              <a:rPr lang="en-GB" sz="1400" dirty="0"/>
+              <a:t>code = '1dv513’ </a:t>
+            </a:r>
+          </a:p>
+        </p:txBody>
+      </p:sp>
+      <p:sp>
+        <p:nvSpPr>
+          <p:cNvPr id="40" name="Rectangle 39">
+            <a:extLst>
+              <a:ext uri="{FF2B5EF4-FFF2-40B4-BE49-F238E27FC236}">
+                <a16:creationId xmlns:a16="http://schemas.microsoft.com/office/drawing/2014/main" id="{CFF887CE-E2D0-5744-83E0-E512C477E5A9}"/>
+              </a:ext>
+            </a:extLst>
+          </p:cNvPr>
+          <p:cNvSpPr/>
+          <p:nvPr/>
+        </p:nvSpPr>
+        <p:spPr>
+          <a:xfrm>
+            <a:off x="1184759" y="4519582"/>
+            <a:ext cx="1262077" cy="369332"/>
+          </a:xfrm>
+          <a:prstGeom prst="rect">
+            <a:avLst/>
+          </a:prstGeom>
+        </p:spPr>
+        <p:txBody>
+          <a:bodyPr wrap="none">
+            <a:spAutoFit/>
+          </a:bodyPr>
+          <a:lstStyle/>
+          <a:p>
+            <a:r>
+              <a:rPr lang="en-GB" dirty="0"/>
+              <a:t>result := (𝜋 </a:t>
+            </a:r>
+          </a:p>
+        </p:txBody>
+      </p:sp>
+      <p:sp>
+        <p:nvSpPr>
+          <p:cNvPr id="41" name="Rectangle 40">
+            <a:extLst>
+              <a:ext uri="{FF2B5EF4-FFF2-40B4-BE49-F238E27FC236}">
+                <a16:creationId xmlns:a16="http://schemas.microsoft.com/office/drawing/2014/main" id="{8194DB70-06D3-C244-ACDB-55B1C83A8C7B}"/>
+              </a:ext>
+            </a:extLst>
+          </p:cNvPr>
+          <p:cNvSpPr/>
+          <p:nvPr/>
+        </p:nvSpPr>
+        <p:spPr>
+          <a:xfrm>
+            <a:off x="2188059" y="4642693"/>
+            <a:ext cx="598241" cy="307777"/>
+          </a:xfrm>
+          <a:prstGeom prst="rect">
+            <a:avLst/>
+          </a:prstGeom>
+        </p:spPr>
+        <p:txBody>
+          <a:bodyPr wrap="none">
+            <a:spAutoFit/>
+          </a:bodyPr>
+          <a:lstStyle/>
+          <a:p>
+            <a:r>
+              <a:rPr lang="en-GB" sz="1400" dirty="0"/>
+              <a:t>name</a:t>
+            </a:r>
+          </a:p>
+        </p:txBody>
+      </p:sp>
+      <p:sp>
+        <p:nvSpPr>
+          <p:cNvPr id="42" name="Rectangle 41">
+            <a:extLst>
+              <a:ext uri="{FF2B5EF4-FFF2-40B4-BE49-F238E27FC236}">
+                <a16:creationId xmlns:a16="http://schemas.microsoft.com/office/drawing/2014/main" id="{0D02ADEE-1706-E846-B744-32ABE7FE30D0}"/>
+              </a:ext>
+            </a:extLst>
+          </p:cNvPr>
+          <p:cNvSpPr/>
+          <p:nvPr/>
+        </p:nvSpPr>
+        <p:spPr>
+          <a:xfrm>
+            <a:off x="2639031" y="4519582"/>
+            <a:ext cx="4626588" cy="369332"/>
+          </a:xfrm>
+          <a:prstGeom prst="rect">
+            <a:avLst/>
+          </a:prstGeom>
+        </p:spPr>
+        <p:txBody>
+          <a:bodyPr wrap="none">
+            <a:spAutoFit/>
+          </a:bodyPr>
+          <a:lstStyle/>
+          <a:p>
+            <a:r>
+              <a:rPr lang="en-GB" dirty="0"/>
+              <a:t>(student ⋈ enrolledIn 	⋈	subject)</a:t>
+            </a:r>
+          </a:p>
+        </p:txBody>
+      </p:sp>
+      <p:sp>
+        <p:nvSpPr>
+          <p:cNvPr id="44" name="Rectangle 43">
+            <a:extLst>
+              <a:ext uri="{FF2B5EF4-FFF2-40B4-BE49-F238E27FC236}">
+                <a16:creationId xmlns:a16="http://schemas.microsoft.com/office/drawing/2014/main" id="{947B36E3-637E-C547-9A48-FAF1FB7BFE43}"/>
+              </a:ext>
+            </a:extLst>
+          </p:cNvPr>
+          <p:cNvSpPr/>
+          <p:nvPr/>
+        </p:nvSpPr>
+        <p:spPr>
+          <a:xfrm>
+            <a:off x="5000735" y="4839713"/>
+            <a:ext cx="1294778" cy="307777"/>
+          </a:xfrm>
+          <a:prstGeom prst="rect">
+            <a:avLst/>
+          </a:prstGeom>
+        </p:spPr>
+        <p:txBody>
+          <a:bodyPr wrap="none">
+            <a:spAutoFit/>
+          </a:bodyPr>
+          <a:lstStyle/>
+          <a:p>
+            <a:r>
+              <a:rPr lang="en-GB" sz="1400" dirty="0"/>
+              <a:t>lecturer != 'ilir' </a:t>
+            </a:r>
+          </a:p>
+        </p:txBody>
+      </p:sp>
+    </p:spTree>
+    <p:extLst>
+      <p:ext uri="{BB962C8B-B14F-4D97-AF65-F5344CB8AC3E}">
+        <p14:creationId xmlns:p14="http://schemas.microsoft.com/office/powerpoint/2010/main" val="2040586372"/>
+      </p:ext>
+    </p:extLst>
+  </p:cSld>
+  <p:clrMapOvr>
+    <a:masterClrMapping/>
+  </p:clrMapOvr>
+</p:sld>
+</file>
+
+<file path=ppt/slides/slide3.xml><?xml version="1.0" encoding="utf-8"?>
+<p:sld xmlns:a="http://schemas.openxmlformats.org/drawingml/2006/main" xmlns:r="http://schemas.openxmlformats.org/officeDocument/2006/relationships" xmlns:p="http://schemas.openxmlformats.org/presentationml/2006/main">
+  <p:cSld>
+    <p:spTree>
+      <p:nvGrpSpPr>
+        <p:cNvPr id="1" name=""/>
+        <p:cNvGrpSpPr/>
+        <p:nvPr/>
+      </p:nvGrpSpPr>
+      <p:grpSpPr>
+        <a:xfrm>
+          <a:off x="0" y="0"/>
+          <a:ext cx="0" cy="0"/>
+          <a:chOff x="0" y="0"/>
+          <a:chExt cx="0" cy="0"/>
+        </a:xfrm>
+      </p:grpSpPr>
+      <p:pic>
+        <p:nvPicPr>
+          <p:cNvPr id="2" name="Picture 1">
+            <a:extLst>
+              <a:ext uri="{FF2B5EF4-FFF2-40B4-BE49-F238E27FC236}">
+                <a16:creationId xmlns:a16="http://schemas.microsoft.com/office/drawing/2014/main" id="{E85465FF-E8FB-7D41-BA9B-AB8B5FD4DDFC}"/>
+              </a:ext>
+            </a:extLst>
+          </p:cNvPr>
+          <p:cNvPicPr>
+            <a:picLocks noChangeAspect="1"/>
+          </p:cNvPicPr>
+          <p:nvPr/>
+        </p:nvPicPr>
+        <p:blipFill>
+          <a:blip r:embed="rId2"/>
+          <a:stretch>
+            <a:fillRect/>
+          </a:stretch>
+        </p:blipFill>
+        <p:spPr>
+          <a:xfrm>
+            <a:off x="628650" y="434522"/>
+            <a:ext cx="6667500" cy="850900"/>
+          </a:xfrm>
+          <a:prstGeom prst="rect">
+            <a:avLst/>
+          </a:prstGeom>
+        </p:spPr>
+      </p:pic>
+      <p:sp>
+        <p:nvSpPr>
+          <p:cNvPr id="3" name="TextBox 2">
+            <a:extLst>
+              <a:ext uri="{FF2B5EF4-FFF2-40B4-BE49-F238E27FC236}">
+                <a16:creationId xmlns:a16="http://schemas.microsoft.com/office/drawing/2014/main" id="{021120E9-5ED0-6C4B-A5B3-2C5E921E262B}"/>
+              </a:ext>
+            </a:extLst>
+          </p:cNvPr>
+          <p:cNvSpPr txBox="1"/>
+          <p:nvPr/>
+        </p:nvSpPr>
+        <p:spPr>
+          <a:xfrm>
+            <a:off x="5127171" y="152400"/>
+            <a:ext cx="753348" cy="369332"/>
+          </a:xfrm>
+          <a:prstGeom prst="rect">
+            <a:avLst/>
+          </a:prstGeom>
+          <a:noFill/>
+        </p:spPr>
+        <p:txBody>
+          <a:bodyPr wrap="none" rtlCol="0">
+            <a:spAutoFit/>
+          </a:bodyPr>
+          <a:lstStyle/>
+          <a:p>
+            <a:r>
+              <a:rPr lang="en-GB" dirty="0"/>
+              <a:t>Task 1</a:t>
+            </a:r>
+          </a:p>
+        </p:txBody>
+      </p:sp>
+      <p:pic>
+        <p:nvPicPr>
+          <p:cNvPr id="4" name="Picture 3">
+            <a:extLst>
+              <a:ext uri="{FF2B5EF4-FFF2-40B4-BE49-F238E27FC236}">
+                <a16:creationId xmlns:a16="http://schemas.microsoft.com/office/drawing/2014/main" id="{90976B28-1C00-D94A-B9BD-0BB480607F4C}"/>
+              </a:ext>
+            </a:extLst>
+          </p:cNvPr>
+          <p:cNvPicPr>
+            <a:picLocks noChangeAspect="1"/>
+          </p:cNvPicPr>
+          <p:nvPr/>
+        </p:nvPicPr>
+        <p:blipFill>
+          <a:blip r:embed="rId3"/>
+          <a:stretch>
+            <a:fillRect/>
+          </a:stretch>
+        </p:blipFill>
+        <p:spPr>
+          <a:xfrm>
+            <a:off x="139700" y="1690914"/>
+            <a:ext cx="12052300" cy="1016000"/>
+          </a:xfrm>
+          <a:prstGeom prst="rect">
+            <a:avLst/>
+          </a:prstGeom>
+        </p:spPr>
+      </p:pic>
+      <p:sp>
+        <p:nvSpPr>
+          <p:cNvPr id="5" name="TextBox 4">
+            <a:extLst>
+              <a:ext uri="{FF2B5EF4-FFF2-40B4-BE49-F238E27FC236}">
+                <a16:creationId xmlns:a16="http://schemas.microsoft.com/office/drawing/2014/main" id="{E6C5FAFC-B573-B84B-BC15-ECE4379CB225}"/>
+              </a:ext>
+            </a:extLst>
+          </p:cNvPr>
+          <p:cNvSpPr txBox="1"/>
+          <p:nvPr/>
+        </p:nvSpPr>
+        <p:spPr>
+          <a:xfrm>
+            <a:off x="5606143" y="1285422"/>
+            <a:ext cx="753348" cy="369332"/>
+          </a:xfrm>
+          <a:prstGeom prst="rect">
+            <a:avLst/>
+          </a:prstGeom>
+          <a:noFill/>
+        </p:spPr>
+        <p:txBody>
+          <a:bodyPr wrap="none" rtlCol="0">
+            <a:spAutoFit/>
+          </a:bodyPr>
+          <a:lstStyle/>
+          <a:p>
+            <a:r>
+              <a:rPr lang="en-GB" dirty="0"/>
+              <a:t>Task 2</a:t>
+            </a:r>
+          </a:p>
+        </p:txBody>
+      </p:sp>
+      <p:pic>
+        <p:nvPicPr>
+          <p:cNvPr id="6" name="Picture 5">
+            <a:extLst>
+              <a:ext uri="{FF2B5EF4-FFF2-40B4-BE49-F238E27FC236}">
+                <a16:creationId xmlns:a16="http://schemas.microsoft.com/office/drawing/2014/main" id="{20048922-FD45-7348-8383-7D4722818348}"/>
+              </a:ext>
+            </a:extLst>
+          </p:cNvPr>
+          <p:cNvPicPr>
+            <a:picLocks noChangeAspect="1"/>
+          </p:cNvPicPr>
+          <p:nvPr/>
+        </p:nvPicPr>
+        <p:blipFill>
+          <a:blip r:embed="rId4"/>
+          <a:stretch>
+            <a:fillRect/>
+          </a:stretch>
+        </p:blipFill>
+        <p:spPr>
+          <a:xfrm>
+            <a:off x="1130300" y="3112406"/>
+            <a:ext cx="4965700" cy="800100"/>
+          </a:xfrm>
+          <a:prstGeom prst="rect">
+            <a:avLst/>
+          </a:prstGeom>
+        </p:spPr>
+      </p:pic>
+      <p:sp>
+        <p:nvSpPr>
+          <p:cNvPr id="7" name="TextBox 6">
+            <a:extLst>
+              <a:ext uri="{FF2B5EF4-FFF2-40B4-BE49-F238E27FC236}">
+                <a16:creationId xmlns:a16="http://schemas.microsoft.com/office/drawing/2014/main" id="{4A0E4E85-C2AB-9A47-94F1-A67F6043B938}"/>
+              </a:ext>
+            </a:extLst>
+          </p:cNvPr>
+          <p:cNvSpPr txBox="1"/>
+          <p:nvPr/>
+        </p:nvSpPr>
+        <p:spPr>
+          <a:xfrm>
+            <a:off x="744410" y="3244334"/>
+            <a:ext cx="301686" cy="369332"/>
+          </a:xfrm>
+          <a:prstGeom prst="rect">
             <a:avLst/>
           </a:prstGeom>
         </p:spPr>
         <p:style>
           <a:lnRef idx="2">
-            <a:schemeClr val="dk1"/>
+            <a:schemeClr val="accent1"/>
           </a:lnRef>
           <a:fillRef idx="1">
             <a:schemeClr val="lt1"/>
           </a:fillRef>
           <a:effectRef idx="0">
-            <a:schemeClr val="dk1"/>
+            <a:schemeClr val="accent1"/>
           </a:effectRef>
           <a:fontRef idx="minor">
             <a:schemeClr val="dk1"/>
           </a:fontRef>
         </p:style>
         <p:txBody>
-          <a:bodyPr rtlCol="0" anchor="ctr"/>
-          <a:lstStyle/>
-          <a:p>
-            <a:pPr algn="ctr"/>
+          <a:bodyPr wrap="none" rtlCol="0">
+            <a:spAutoFit/>
+          </a:bodyPr>
+          <a:lstStyle/>
+          <a:p>
             <a:r>
               <a:rPr lang="en-GB" dirty="0"/>
-              <a:t>USER</a:t>
-            </a:r>
-          </a:p>
-        </p:txBody>
-      </p:sp>
-      <p:sp>
-        <p:nvSpPr>
-          <p:cNvPr id="9" name="Oval 8">
-            <a:extLst>
-              <a:ext uri="{FF2B5EF4-FFF2-40B4-BE49-F238E27FC236}">
-                <a16:creationId xmlns:a16="http://schemas.microsoft.com/office/drawing/2014/main" id="{6AE6F24D-036E-6442-A1F7-5E1BE634A52F}"/>
-              </a:ext>
-            </a:extLst>
-          </p:cNvPr>
-          <p:cNvSpPr/>
-          <p:nvPr/>
-        </p:nvSpPr>
-        <p:spPr>
-          <a:xfrm>
-            <a:off x="9173760" y="3510200"/>
-            <a:ext cx="1969770" cy="502920"/>
-          </a:xfrm>
-          <a:prstGeom prst="ellipse">
+              <a:t>3</a:t>
+            </a:r>
+          </a:p>
+        </p:txBody>
+      </p:sp>
+      <p:sp>
+        <p:nvSpPr>
+          <p:cNvPr id="8" name="TextBox 7">
+            <a:extLst>
+              <a:ext uri="{FF2B5EF4-FFF2-40B4-BE49-F238E27FC236}">
+                <a16:creationId xmlns:a16="http://schemas.microsoft.com/office/drawing/2014/main" id="{D0867A0B-8486-D740-8A33-150C4D1A3410}"/>
+              </a:ext>
+            </a:extLst>
+          </p:cNvPr>
+          <p:cNvSpPr txBox="1"/>
+          <p:nvPr/>
+        </p:nvSpPr>
+        <p:spPr>
+          <a:xfrm>
+            <a:off x="699306" y="4518871"/>
+            <a:ext cx="301686" cy="369332"/>
+          </a:xfrm>
+          <a:prstGeom prst="rect">
             <a:avLst/>
           </a:prstGeom>
         </p:spPr>
         <p:style>
           <a:lnRef idx="2">
-            <a:schemeClr val="dk1"/>
+            <a:schemeClr val="accent1"/>
           </a:lnRef>
           <a:fillRef idx="1">
             <a:schemeClr val="lt1"/>
           </a:fillRef>
           <a:effectRef idx="0">
-            <a:schemeClr val="dk1"/>
+            <a:schemeClr val="accent1"/>
           </a:effectRef>
           <a:fontRef idx="minor">
             <a:schemeClr val="dk1"/>
           </a:fontRef>
         </p:style>
         <p:txBody>
-          <a:bodyPr rtlCol="0" anchor="ctr"/>
-          <a:lstStyle/>
-          <a:p>
-            <a:pPr algn="ctr"/>
+          <a:bodyPr wrap="square" rtlCol="0">
+            <a:spAutoFit/>
+          </a:bodyPr>
+          <a:lstStyle/>
+          <a:p>
             <a:r>
               <a:rPr lang="en-GB" dirty="0"/>
-              <a:t>SUBREDDIT</a:t>
-            </a:r>
-          </a:p>
-        </p:txBody>
-      </p:sp>
-      <p:sp>
-        <p:nvSpPr>
-          <p:cNvPr id="10" name="Oval 9">
-            <a:extLst>
-              <a:ext uri="{FF2B5EF4-FFF2-40B4-BE49-F238E27FC236}">
-                <a16:creationId xmlns:a16="http://schemas.microsoft.com/office/drawing/2014/main" id="{56119434-8014-FF40-ADD0-34B92EEB4B88}"/>
-              </a:ext>
-            </a:extLst>
-          </p:cNvPr>
-          <p:cNvSpPr/>
-          <p:nvPr/>
-        </p:nvSpPr>
-        <p:spPr>
-          <a:xfrm>
-            <a:off x="7595594" y="4110934"/>
-            <a:ext cx="1611630" cy="502920"/>
-          </a:xfrm>
-          <a:prstGeom prst="ellipse">
+              <a:t>4</a:t>
+            </a:r>
+          </a:p>
+        </p:txBody>
+      </p:sp>
+      <p:sp>
+        <p:nvSpPr>
+          <p:cNvPr id="9" name="TextBox 8">
+            <a:extLst>
+              <a:ext uri="{FF2B5EF4-FFF2-40B4-BE49-F238E27FC236}">
+                <a16:creationId xmlns:a16="http://schemas.microsoft.com/office/drawing/2014/main" id="{A76B6435-ACEF-C748-A252-69FBCF86CB69}"/>
+              </a:ext>
+            </a:extLst>
+          </p:cNvPr>
+          <p:cNvSpPr txBox="1"/>
+          <p:nvPr/>
+        </p:nvSpPr>
+        <p:spPr>
+          <a:xfrm>
+            <a:off x="628650" y="5825283"/>
+            <a:ext cx="301686" cy="369332"/>
+          </a:xfrm>
+          <a:prstGeom prst="rect">
             <a:avLst/>
           </a:prstGeom>
         </p:spPr>
         <p:style>
           <a:lnRef idx="2">
-            <a:schemeClr val="dk1"/>
+            <a:schemeClr val="accent1"/>
           </a:lnRef>
           <a:fillRef idx="1">
             <a:schemeClr val="lt1"/>
           </a:fillRef>
           <a:effectRef idx="0">
-            <a:schemeClr val="dk1"/>
+            <a:schemeClr val="accent1"/>
           </a:effectRef>
           <a:fontRef idx="minor">
             <a:schemeClr val="dk1"/>
           </a:fontRef>
         </p:style>
         <p:txBody>
-          <a:bodyPr rtlCol="0" anchor="ctr"/>
-          <a:lstStyle/>
-          <a:p>
-            <a:pPr algn="ctr"/>
-            <a:r>
-              <a:rPr lang="en-GB" dirty="0" err="1"/>
-              <a:t>LinkID</a:t>
-            </a:r>
-            <a:endParaRPr lang="en-GB" dirty="0"/>
-          </a:p>
-        </p:txBody>
-      </p:sp>
-      <p:sp>
-        <p:nvSpPr>
-          <p:cNvPr id="11" name="Oval 10">
-            <a:extLst>
-              <a:ext uri="{FF2B5EF4-FFF2-40B4-BE49-F238E27FC236}">
-                <a16:creationId xmlns:a16="http://schemas.microsoft.com/office/drawing/2014/main" id="{3CD6AF74-388A-024D-AA1F-5A4605D69628}"/>
-              </a:ext>
-            </a:extLst>
-          </p:cNvPr>
-          <p:cNvSpPr/>
-          <p:nvPr/>
-        </p:nvSpPr>
-        <p:spPr>
-          <a:xfrm>
-            <a:off x="149959" y="251578"/>
-            <a:ext cx="1611630" cy="502920"/>
-          </a:xfrm>
-          <a:prstGeom prst="ellipse">
-            <a:avLst/>
-          </a:prstGeom>
-        </p:spPr>
-        <p:style>
-          <a:lnRef idx="2">
-            <a:schemeClr val="dk1"/>
-          </a:lnRef>
-          <a:fillRef idx="1">
-            <a:schemeClr val="lt1"/>
-          </a:fillRef>
-          <a:effectRef idx="0">
-            <a:schemeClr val="dk1"/>
-          </a:effectRef>
-          <a:fontRef idx="minor">
-            <a:schemeClr val="dk1"/>
-          </a:fontRef>
-        </p:style>
-        <p:txBody>
-          <a:bodyPr rtlCol="0" anchor="ctr"/>
-          <a:lstStyle/>
-          <a:p>
-            <a:pPr algn="ctr"/>
-            <a:r>
-              <a:rPr lang="en-GB" u="sng" dirty="0"/>
-              <a:t>Name</a:t>
-            </a:r>
-          </a:p>
-        </p:txBody>
-      </p:sp>
-      <p:sp>
-        <p:nvSpPr>
-          <p:cNvPr id="12" name="Oval 11">
-            <a:extLst>
-              <a:ext uri="{FF2B5EF4-FFF2-40B4-BE49-F238E27FC236}">
-                <a16:creationId xmlns:a16="http://schemas.microsoft.com/office/drawing/2014/main" id="{064D261F-710C-0844-95EB-DFDAD3F2A147}"/>
-              </a:ext>
-            </a:extLst>
-          </p:cNvPr>
-          <p:cNvSpPr/>
-          <p:nvPr/>
-        </p:nvSpPr>
-        <p:spPr>
-          <a:xfrm>
-            <a:off x="7746654" y="2849996"/>
-            <a:ext cx="1611630" cy="502920"/>
-          </a:xfrm>
-          <a:prstGeom prst="ellipse">
-            <a:avLst/>
-          </a:prstGeom>
-        </p:spPr>
-        <p:style>
-          <a:lnRef idx="2">
-            <a:schemeClr val="dk1"/>
-          </a:lnRef>
-          <a:fillRef idx="1">
-            <a:schemeClr val="lt1"/>
-          </a:fillRef>
-          <a:effectRef idx="0">
-            <a:schemeClr val="dk1"/>
-          </a:effectRef>
-          <a:fontRef idx="minor">
-            <a:schemeClr val="dk1"/>
-          </a:fontRef>
-        </p:style>
-        <p:txBody>
-          <a:bodyPr rtlCol="0" anchor="ctr"/>
-          <a:lstStyle/>
-          <a:p>
-            <a:pPr algn="ctr"/>
-            <a:r>
-              <a:rPr lang="en-GB" u="sng" dirty="0"/>
-              <a:t>ID</a:t>
-            </a:r>
-          </a:p>
-        </p:txBody>
-      </p:sp>
-      <p:sp>
-        <p:nvSpPr>
-          <p:cNvPr id="13" name="Oval 12">
-            <a:extLst>
-              <a:ext uri="{FF2B5EF4-FFF2-40B4-BE49-F238E27FC236}">
-                <a16:creationId xmlns:a16="http://schemas.microsoft.com/office/drawing/2014/main" id="{F6F7C74B-3364-D742-8CB9-B325B8D74D95}"/>
-              </a:ext>
-            </a:extLst>
-          </p:cNvPr>
-          <p:cNvSpPr/>
-          <p:nvPr/>
-        </p:nvSpPr>
-        <p:spPr>
-          <a:xfrm>
-            <a:off x="8618219" y="6059477"/>
-            <a:ext cx="2727959" cy="502920"/>
-          </a:xfrm>
-          <a:prstGeom prst="ellipse">
-            <a:avLst/>
-          </a:prstGeom>
-        </p:spPr>
-        <p:style>
-          <a:lnRef idx="2">
-            <a:schemeClr val="dk1"/>
-          </a:lnRef>
-          <a:fillRef idx="1">
-            <a:schemeClr val="lt1"/>
-          </a:fillRef>
-          <a:effectRef idx="0">
-            <a:schemeClr val="dk1"/>
-          </a:effectRef>
-          <a:fontRef idx="minor">
-            <a:schemeClr val="dk1"/>
-          </a:fontRef>
-        </p:style>
-        <p:txBody>
-          <a:bodyPr rtlCol="0" anchor="ctr"/>
-          <a:lstStyle/>
-          <a:p>
-            <a:pPr algn="ctr"/>
-            <a:r>
-              <a:rPr lang="en-GB" dirty="0" err="1"/>
-              <a:t>conttiversiality</a:t>
-            </a:r>
-            <a:endParaRPr lang="en-GB" dirty="0"/>
-          </a:p>
-        </p:txBody>
-      </p:sp>
-      <p:sp>
-        <p:nvSpPr>
-          <p:cNvPr id="14" name="Oval 13">
-            <a:extLst>
-              <a:ext uri="{FF2B5EF4-FFF2-40B4-BE49-F238E27FC236}">
-                <a16:creationId xmlns:a16="http://schemas.microsoft.com/office/drawing/2014/main" id="{2A108606-647E-314C-8041-98F58968C4BB}"/>
-              </a:ext>
-            </a:extLst>
-          </p:cNvPr>
-          <p:cNvSpPr/>
-          <p:nvPr/>
-        </p:nvSpPr>
-        <p:spPr>
-          <a:xfrm>
-            <a:off x="2156282" y="3103337"/>
-            <a:ext cx="1611630" cy="502920"/>
-          </a:xfrm>
-          <a:prstGeom prst="ellipse">
-            <a:avLst/>
-          </a:prstGeom>
-        </p:spPr>
-        <p:style>
-          <a:lnRef idx="2">
-            <a:schemeClr val="dk1"/>
-          </a:lnRef>
-          <a:fillRef idx="1">
-            <a:schemeClr val="lt1"/>
-          </a:fillRef>
-          <a:effectRef idx="0">
-            <a:schemeClr val="dk1"/>
-          </a:effectRef>
-          <a:fontRef idx="minor">
-            <a:schemeClr val="dk1"/>
-          </a:fontRef>
-        </p:style>
-        <p:txBody>
-          <a:bodyPr rtlCol="0" anchor="ctr"/>
-          <a:lstStyle/>
-          <a:p>
-            <a:pPr algn="ctr"/>
+          <a:bodyPr wrap="none" rtlCol="0">
+            <a:spAutoFit/>
+          </a:bodyPr>
+          <a:lstStyle/>
+          <a:p>
             <a:r>
               <a:rPr lang="en-GB" dirty="0"/>
-              <a:t>body</a:t>
-            </a:r>
-          </a:p>
-        </p:txBody>
-      </p:sp>
-      <p:sp>
-        <p:nvSpPr>
-          <p:cNvPr id="15" name="Oval 14">
-            <a:extLst>
-              <a:ext uri="{FF2B5EF4-FFF2-40B4-BE49-F238E27FC236}">
-                <a16:creationId xmlns:a16="http://schemas.microsoft.com/office/drawing/2014/main" id="{2F1D9057-CE3C-9E48-B10B-A6A3A95751F9}"/>
-              </a:ext>
-            </a:extLst>
-          </p:cNvPr>
-          <p:cNvSpPr/>
-          <p:nvPr/>
-        </p:nvSpPr>
-        <p:spPr>
-          <a:xfrm>
-            <a:off x="265348" y="3510141"/>
-            <a:ext cx="1611630" cy="502920"/>
-          </a:xfrm>
-          <a:prstGeom prst="ellipse">
-            <a:avLst/>
-          </a:prstGeom>
-        </p:spPr>
-        <p:style>
-          <a:lnRef idx="2">
-            <a:schemeClr val="dk1"/>
-          </a:lnRef>
-          <a:fillRef idx="1">
-            <a:schemeClr val="lt1"/>
-          </a:fillRef>
-          <a:effectRef idx="0">
-            <a:schemeClr val="dk1"/>
-          </a:effectRef>
-          <a:fontRef idx="minor">
-            <a:schemeClr val="dk1"/>
-          </a:fontRef>
-        </p:style>
-        <p:txBody>
-          <a:bodyPr rtlCol="0" anchor="ctr"/>
-          <a:lstStyle/>
-          <a:p>
-            <a:pPr algn="ctr"/>
-            <a:r>
-              <a:rPr lang="en-GB" dirty="0"/>
-              <a:t>created</a:t>
-            </a:r>
-          </a:p>
-        </p:txBody>
-      </p:sp>
-      <p:sp>
-        <p:nvSpPr>
-          <p:cNvPr id="16" name="Oval 15">
-            <a:extLst>
-              <a:ext uri="{FF2B5EF4-FFF2-40B4-BE49-F238E27FC236}">
-                <a16:creationId xmlns:a16="http://schemas.microsoft.com/office/drawing/2014/main" id="{3665511D-5447-BD4B-A49A-C89C48CD1DEC}"/>
-              </a:ext>
-            </a:extLst>
-          </p:cNvPr>
-          <p:cNvSpPr/>
-          <p:nvPr/>
-        </p:nvSpPr>
-        <p:spPr>
-          <a:xfrm>
-            <a:off x="9990155" y="176512"/>
-            <a:ext cx="2128209" cy="502920"/>
-          </a:xfrm>
-          <a:prstGeom prst="ellipse">
-            <a:avLst/>
-          </a:prstGeom>
-        </p:spPr>
-        <p:style>
-          <a:lnRef idx="2">
-            <a:schemeClr val="dk1"/>
-          </a:lnRef>
-          <a:fillRef idx="1">
-            <a:schemeClr val="lt1"/>
-          </a:fillRef>
-          <a:effectRef idx="0">
-            <a:schemeClr val="dk1"/>
-          </a:effectRef>
-          <a:fontRef idx="minor">
-            <a:schemeClr val="dk1"/>
-          </a:fontRef>
-        </p:style>
-        <p:txBody>
-          <a:bodyPr rtlCol="0" anchor="ctr"/>
-          <a:lstStyle/>
-          <a:p>
-            <a:pPr algn="ctr"/>
-            <a:r>
-              <a:rPr lang="en-GB" u="sng" dirty="0" err="1"/>
-              <a:t>Subreddit_id</a:t>
-            </a:r>
-            <a:endParaRPr lang="en-GB" u="sng" dirty="0"/>
-          </a:p>
-        </p:txBody>
-      </p:sp>
-      <p:sp>
-        <p:nvSpPr>
-          <p:cNvPr id="17" name="Oval 16">
-            <a:extLst>
-              <a:ext uri="{FF2B5EF4-FFF2-40B4-BE49-F238E27FC236}">
-                <a16:creationId xmlns:a16="http://schemas.microsoft.com/office/drawing/2014/main" id="{6C0CB9EB-14E0-6B48-B2D3-F643464D1C7F}"/>
-              </a:ext>
-            </a:extLst>
-          </p:cNvPr>
-          <p:cNvSpPr/>
-          <p:nvPr/>
-        </p:nvSpPr>
-        <p:spPr>
-          <a:xfrm>
-            <a:off x="7901055" y="182346"/>
-            <a:ext cx="1611630" cy="502920"/>
-          </a:xfrm>
-          <a:prstGeom prst="ellipse">
-            <a:avLst/>
-          </a:prstGeom>
-        </p:spPr>
-        <p:style>
-          <a:lnRef idx="2">
-            <a:schemeClr val="dk1"/>
-          </a:lnRef>
-          <a:fillRef idx="1">
-            <a:schemeClr val="lt1"/>
-          </a:fillRef>
-          <a:effectRef idx="0">
-            <a:schemeClr val="dk1"/>
-          </a:effectRef>
-          <a:fontRef idx="minor">
-            <a:schemeClr val="dk1"/>
-          </a:fontRef>
-        </p:style>
-        <p:txBody>
-          <a:bodyPr rtlCol="0" anchor="ctr"/>
-          <a:lstStyle/>
-          <a:p>
-            <a:pPr algn="ctr"/>
-            <a:r>
-              <a:rPr lang="en-GB" dirty="0"/>
-              <a:t>Subreddit</a:t>
-            </a:r>
-          </a:p>
-        </p:txBody>
-      </p:sp>
-      <p:cxnSp>
-        <p:nvCxnSpPr>
-          <p:cNvPr id="35" name="Elbow Connector 34">
-            <a:extLst>
-              <a:ext uri="{FF2B5EF4-FFF2-40B4-BE49-F238E27FC236}">
-                <a16:creationId xmlns:a16="http://schemas.microsoft.com/office/drawing/2014/main" id="{A1BE2472-0CC3-E041-A5EF-BC5ACC178AD7}"/>
-              </a:ext>
-            </a:extLst>
-          </p:cNvPr>
-          <p:cNvCxnSpPr>
-            <a:cxnSpLocks/>
-            <a:stCxn id="11" idx="4"/>
-            <a:endCxn id="2" idx="0"/>
-          </p:cNvCxnSpPr>
-          <p:nvPr/>
-        </p:nvCxnSpPr>
-        <p:spPr>
-          <a:xfrm rot="16200000" flipH="1">
-            <a:off x="1203334" y="506938"/>
-            <a:ext cx="543105" cy="1038224"/>
-          </a:xfrm>
-          <a:prstGeom prst="bentConnector3">
-            <a:avLst/>
-          </a:prstGeom>
-        </p:spPr>
-        <p:style>
-          <a:lnRef idx="1">
-            <a:schemeClr val="dk1"/>
-          </a:lnRef>
-          <a:fillRef idx="0">
-            <a:schemeClr val="dk1"/>
-          </a:fillRef>
-          <a:effectRef idx="0">
-            <a:schemeClr val="dk1"/>
-          </a:effectRef>
-          <a:fontRef idx="minor">
-            <a:schemeClr val="tx1"/>
-          </a:fontRef>
-        </p:style>
-      </p:cxnSp>
-      <p:cxnSp>
-        <p:nvCxnSpPr>
-          <p:cNvPr id="39" name="Elbow Connector 38">
-            <a:extLst>
-              <a:ext uri="{FF2B5EF4-FFF2-40B4-BE49-F238E27FC236}">
-                <a16:creationId xmlns:a16="http://schemas.microsoft.com/office/drawing/2014/main" id="{67D10DD1-1BCE-C647-89BD-50AE666918BA}"/>
-              </a:ext>
-            </a:extLst>
-          </p:cNvPr>
-          <p:cNvCxnSpPr>
-            <a:cxnSpLocks/>
-            <a:stCxn id="15" idx="6"/>
-          </p:cNvCxnSpPr>
-          <p:nvPr/>
-        </p:nvCxnSpPr>
-        <p:spPr>
-          <a:xfrm flipV="1">
-            <a:off x="1876978" y="2314302"/>
-            <a:ext cx="3786740" cy="1447299"/>
-          </a:xfrm>
-          <a:prstGeom prst="bentConnector3">
-            <a:avLst>
-              <a:gd name="adj1" fmla="val 100382"/>
-            </a:avLst>
-          </a:prstGeom>
-        </p:spPr>
-        <p:style>
-          <a:lnRef idx="1">
-            <a:schemeClr val="dk1"/>
-          </a:lnRef>
-          <a:fillRef idx="0">
-            <a:schemeClr val="dk1"/>
-          </a:fillRef>
-          <a:effectRef idx="0">
-            <a:schemeClr val="dk1"/>
-          </a:effectRef>
-          <a:fontRef idx="minor">
-            <a:schemeClr val="tx1"/>
-          </a:fontRef>
-        </p:style>
-      </p:cxnSp>
-      <p:cxnSp>
-        <p:nvCxnSpPr>
-          <p:cNvPr id="41" name="Elbow Connector 40">
-            <a:extLst>
-              <a:ext uri="{FF2B5EF4-FFF2-40B4-BE49-F238E27FC236}">
-                <a16:creationId xmlns:a16="http://schemas.microsoft.com/office/drawing/2014/main" id="{F68AB7DC-6239-2F44-AC64-1849B596291B}"/>
-              </a:ext>
-            </a:extLst>
-          </p:cNvPr>
-          <p:cNvCxnSpPr>
-            <a:cxnSpLocks/>
-            <a:stCxn id="6" idx="6"/>
-            <a:endCxn id="3" idx="2"/>
-          </p:cNvCxnSpPr>
-          <p:nvPr/>
-        </p:nvCxnSpPr>
-        <p:spPr>
-          <a:xfrm flipV="1">
-            <a:off x="1759728" y="2251218"/>
-            <a:ext cx="3903991" cy="2111176"/>
-          </a:xfrm>
-          <a:prstGeom prst="bentConnector2">
-            <a:avLst/>
-          </a:prstGeom>
-        </p:spPr>
-        <p:style>
-          <a:lnRef idx="1">
-            <a:schemeClr val="dk1"/>
-          </a:lnRef>
-          <a:fillRef idx="0">
-            <a:schemeClr val="dk1"/>
-          </a:fillRef>
-          <a:effectRef idx="0">
-            <a:schemeClr val="dk1"/>
-          </a:effectRef>
-          <a:fontRef idx="minor">
-            <a:schemeClr val="tx1"/>
-          </a:fontRef>
-        </p:style>
-      </p:cxnSp>
-      <p:cxnSp>
-        <p:nvCxnSpPr>
-          <p:cNvPr id="46" name="Elbow Connector 45">
-            <a:extLst>
-              <a:ext uri="{FF2B5EF4-FFF2-40B4-BE49-F238E27FC236}">
-                <a16:creationId xmlns:a16="http://schemas.microsoft.com/office/drawing/2014/main" id="{B8D40223-1863-6A43-9E79-594CE9C5A213}"/>
-              </a:ext>
-            </a:extLst>
-          </p:cNvPr>
-          <p:cNvCxnSpPr>
-            <a:cxnSpLocks/>
-            <a:stCxn id="14" idx="6"/>
-            <a:endCxn id="3" idx="2"/>
-          </p:cNvCxnSpPr>
-          <p:nvPr/>
-        </p:nvCxnSpPr>
-        <p:spPr>
-          <a:xfrm flipV="1">
-            <a:off x="3767912" y="2251218"/>
-            <a:ext cx="1895807" cy="1103579"/>
-          </a:xfrm>
-          <a:prstGeom prst="bentConnector2">
-            <a:avLst/>
-          </a:prstGeom>
-        </p:spPr>
-        <p:style>
-          <a:lnRef idx="1">
-            <a:schemeClr val="dk1"/>
-          </a:lnRef>
-          <a:fillRef idx="0">
-            <a:schemeClr val="dk1"/>
-          </a:fillRef>
-          <a:effectRef idx="0">
-            <a:schemeClr val="dk1"/>
-          </a:effectRef>
-          <a:fontRef idx="minor">
-            <a:schemeClr val="tx1"/>
-          </a:fontRef>
-        </p:style>
-      </p:cxnSp>
-      <p:cxnSp>
-        <p:nvCxnSpPr>
-          <p:cNvPr id="48" name="Elbow Connector 47">
-            <a:extLst>
-              <a:ext uri="{FF2B5EF4-FFF2-40B4-BE49-F238E27FC236}">
-                <a16:creationId xmlns:a16="http://schemas.microsoft.com/office/drawing/2014/main" id="{AF5F15A5-A7E1-0F4B-8935-1C2135B96C6B}"/>
-              </a:ext>
-            </a:extLst>
-          </p:cNvPr>
-          <p:cNvCxnSpPr>
-            <a:cxnSpLocks/>
-            <a:stCxn id="8" idx="6"/>
-            <a:endCxn id="3" idx="2"/>
-          </p:cNvCxnSpPr>
-          <p:nvPr/>
-        </p:nvCxnSpPr>
-        <p:spPr>
-          <a:xfrm flipV="1">
-            <a:off x="1768382" y="2251218"/>
-            <a:ext cx="3895337" cy="2706222"/>
-          </a:xfrm>
-          <a:prstGeom prst="bentConnector2">
-            <a:avLst/>
-          </a:prstGeom>
-        </p:spPr>
-        <p:style>
-          <a:lnRef idx="1">
-            <a:schemeClr val="dk1"/>
-          </a:lnRef>
-          <a:fillRef idx="0">
-            <a:schemeClr val="dk1"/>
-          </a:fillRef>
-          <a:effectRef idx="0">
-            <a:schemeClr val="dk1"/>
-          </a:effectRef>
-          <a:fontRef idx="minor">
-            <a:schemeClr val="tx1"/>
-          </a:fontRef>
-        </p:style>
-      </p:cxnSp>
-      <p:cxnSp>
-        <p:nvCxnSpPr>
-          <p:cNvPr id="50" name="Elbow Connector 49">
-            <a:extLst>
-              <a:ext uri="{FF2B5EF4-FFF2-40B4-BE49-F238E27FC236}">
-                <a16:creationId xmlns:a16="http://schemas.microsoft.com/office/drawing/2014/main" id="{5973775A-C383-364E-8AE4-462351EB3FAC}"/>
-              </a:ext>
-            </a:extLst>
-          </p:cNvPr>
-          <p:cNvCxnSpPr>
-            <a:cxnSpLocks/>
-            <a:stCxn id="13" idx="2"/>
-            <a:endCxn id="3" idx="2"/>
-          </p:cNvCxnSpPr>
-          <p:nvPr/>
-        </p:nvCxnSpPr>
-        <p:spPr>
-          <a:xfrm rot="10800000">
-            <a:off x="5663719" y="2251219"/>
-            <a:ext cx="2954500" cy="4059719"/>
-          </a:xfrm>
-          <a:prstGeom prst="bentConnector2">
-            <a:avLst/>
-          </a:prstGeom>
-        </p:spPr>
-        <p:style>
-          <a:lnRef idx="1">
-            <a:schemeClr val="dk1"/>
-          </a:lnRef>
-          <a:fillRef idx="0">
-            <a:schemeClr val="dk1"/>
-          </a:fillRef>
-          <a:effectRef idx="0">
-            <a:schemeClr val="dk1"/>
-          </a:effectRef>
-          <a:fontRef idx="minor">
-            <a:schemeClr val="tx1"/>
-          </a:fontRef>
-        </p:style>
-      </p:cxnSp>
-      <p:cxnSp>
-        <p:nvCxnSpPr>
-          <p:cNvPr id="52" name="Elbow Connector 51">
-            <a:extLst>
-              <a:ext uri="{FF2B5EF4-FFF2-40B4-BE49-F238E27FC236}">
-                <a16:creationId xmlns:a16="http://schemas.microsoft.com/office/drawing/2014/main" id="{6A438F17-AD29-FF43-B5C3-AD27446FFC17}"/>
-              </a:ext>
-            </a:extLst>
-          </p:cNvPr>
-          <p:cNvCxnSpPr>
-            <a:cxnSpLocks/>
-            <a:stCxn id="10" idx="2"/>
-            <a:endCxn id="3" idx="2"/>
-          </p:cNvCxnSpPr>
-          <p:nvPr/>
-        </p:nvCxnSpPr>
-        <p:spPr>
-          <a:xfrm rot="10800000">
-            <a:off x="5663720" y="2251218"/>
-            <a:ext cx="1931875" cy="2111176"/>
-          </a:xfrm>
-          <a:prstGeom prst="bentConnector2">
-            <a:avLst/>
-          </a:prstGeom>
-        </p:spPr>
-        <p:style>
-          <a:lnRef idx="1">
-            <a:schemeClr val="dk1"/>
-          </a:lnRef>
-          <a:fillRef idx="0">
-            <a:schemeClr val="dk1"/>
-          </a:fillRef>
-          <a:effectRef idx="0">
-            <a:schemeClr val="dk1"/>
-          </a:effectRef>
-          <a:fontRef idx="minor">
-            <a:schemeClr val="tx1"/>
-          </a:fontRef>
-        </p:style>
-      </p:cxnSp>
-      <p:cxnSp>
-        <p:nvCxnSpPr>
-          <p:cNvPr id="54" name="Elbow Connector 53">
-            <a:extLst>
-              <a:ext uri="{FF2B5EF4-FFF2-40B4-BE49-F238E27FC236}">
-                <a16:creationId xmlns:a16="http://schemas.microsoft.com/office/drawing/2014/main" id="{7CE53A5D-73DD-9F4D-9018-D133F2E0EE25}"/>
-              </a:ext>
-            </a:extLst>
-          </p:cNvPr>
-          <p:cNvCxnSpPr>
-            <a:cxnSpLocks/>
-            <a:stCxn id="12" idx="2"/>
-            <a:endCxn id="3" idx="2"/>
-          </p:cNvCxnSpPr>
-          <p:nvPr/>
-        </p:nvCxnSpPr>
-        <p:spPr>
-          <a:xfrm rot="10800000">
-            <a:off x="5663720" y="2251218"/>
-            <a:ext cx="2082935" cy="850238"/>
-          </a:xfrm>
-          <a:prstGeom prst="bentConnector2">
-            <a:avLst/>
-          </a:prstGeom>
-        </p:spPr>
-        <p:style>
-          <a:lnRef idx="1">
-            <a:schemeClr val="dk1"/>
-          </a:lnRef>
-          <a:fillRef idx="0">
-            <a:schemeClr val="dk1"/>
-          </a:fillRef>
-          <a:effectRef idx="0">
-            <a:schemeClr val="dk1"/>
-          </a:effectRef>
-          <a:fontRef idx="minor">
-            <a:schemeClr val="tx1"/>
-          </a:fontRef>
-        </p:style>
-      </p:cxnSp>
-      <p:cxnSp>
-        <p:nvCxnSpPr>
-          <p:cNvPr id="56" name="Elbow Connector 55">
-            <a:extLst>
-              <a:ext uri="{FF2B5EF4-FFF2-40B4-BE49-F238E27FC236}">
-                <a16:creationId xmlns:a16="http://schemas.microsoft.com/office/drawing/2014/main" id="{E6BE8AC8-8508-454B-BE42-3C068080BF94}"/>
-              </a:ext>
-            </a:extLst>
-          </p:cNvPr>
-          <p:cNvCxnSpPr>
-            <a:cxnSpLocks/>
-            <a:stCxn id="9" idx="2"/>
-            <a:endCxn id="3" idx="2"/>
-          </p:cNvCxnSpPr>
-          <p:nvPr/>
-        </p:nvCxnSpPr>
-        <p:spPr>
-          <a:xfrm rot="10800000">
-            <a:off x="5663720" y="2251218"/>
-            <a:ext cx="3510041" cy="1510442"/>
-          </a:xfrm>
-          <a:prstGeom prst="bentConnector2">
-            <a:avLst/>
-          </a:prstGeom>
-        </p:spPr>
-        <p:style>
-          <a:lnRef idx="1">
-            <a:schemeClr val="dk1"/>
-          </a:lnRef>
-          <a:fillRef idx="0">
-            <a:schemeClr val="dk1"/>
-          </a:fillRef>
-          <a:effectRef idx="0">
-            <a:schemeClr val="dk1"/>
-          </a:effectRef>
-          <a:fontRef idx="minor">
-            <a:schemeClr val="tx1"/>
-          </a:fontRef>
-        </p:style>
-      </p:cxnSp>
-      <p:cxnSp>
-        <p:nvCxnSpPr>
-          <p:cNvPr id="58" name="Elbow Connector 57">
-            <a:extLst>
-              <a:ext uri="{FF2B5EF4-FFF2-40B4-BE49-F238E27FC236}">
-                <a16:creationId xmlns:a16="http://schemas.microsoft.com/office/drawing/2014/main" id="{89A4A649-6EEB-A047-8E29-618A15DD148F}"/>
-              </a:ext>
-            </a:extLst>
-          </p:cNvPr>
-          <p:cNvCxnSpPr>
-            <a:stCxn id="5" idx="2"/>
-            <a:endCxn id="3" idx="2"/>
-          </p:cNvCxnSpPr>
-          <p:nvPr/>
-        </p:nvCxnSpPr>
-        <p:spPr>
-          <a:xfrm rot="10800000">
-            <a:off x="5663720" y="2251218"/>
-            <a:ext cx="3754119" cy="2710010"/>
-          </a:xfrm>
-          <a:prstGeom prst="bentConnector2">
-            <a:avLst/>
-          </a:prstGeom>
-        </p:spPr>
-        <p:style>
-          <a:lnRef idx="1">
-            <a:schemeClr val="dk1"/>
-          </a:lnRef>
-          <a:fillRef idx="0">
-            <a:schemeClr val="dk1"/>
-          </a:fillRef>
-          <a:effectRef idx="0">
-            <a:schemeClr val="dk1"/>
-          </a:effectRef>
-          <a:fontRef idx="minor">
-            <a:schemeClr val="tx1"/>
-          </a:fontRef>
-        </p:style>
-      </p:cxnSp>
-      <p:cxnSp>
-        <p:nvCxnSpPr>
-          <p:cNvPr id="80" name="Elbow Connector 79">
-            <a:extLst>
-              <a:ext uri="{FF2B5EF4-FFF2-40B4-BE49-F238E27FC236}">
-                <a16:creationId xmlns:a16="http://schemas.microsoft.com/office/drawing/2014/main" id="{9E6A62E6-7D36-C348-A99D-9C27DE288C98}"/>
-              </a:ext>
-            </a:extLst>
-          </p:cNvPr>
-          <p:cNvCxnSpPr>
-            <a:cxnSpLocks/>
-            <a:stCxn id="34" idx="3"/>
-            <a:endCxn id="3" idx="1"/>
-          </p:cNvCxnSpPr>
-          <p:nvPr/>
-        </p:nvCxnSpPr>
-        <p:spPr>
-          <a:xfrm flipV="1">
-            <a:off x="4425149" y="2066552"/>
-            <a:ext cx="638341" cy="14551"/>
-          </a:xfrm>
-          <a:prstGeom prst="bentConnector3">
-            <a:avLst/>
-          </a:prstGeom>
-        </p:spPr>
-        <p:style>
-          <a:lnRef idx="1">
-            <a:schemeClr val="dk1"/>
-          </a:lnRef>
-          <a:fillRef idx="0">
-            <a:schemeClr val="dk1"/>
-          </a:fillRef>
-          <a:effectRef idx="0">
-            <a:schemeClr val="dk1"/>
-          </a:effectRef>
-          <a:fontRef idx="minor">
-            <a:schemeClr val="tx1"/>
-          </a:fontRef>
-        </p:style>
-      </p:cxnSp>
-      <p:cxnSp>
-        <p:nvCxnSpPr>
-          <p:cNvPr id="82" name="Elbow Connector 81">
-            <a:extLst>
-              <a:ext uri="{FF2B5EF4-FFF2-40B4-BE49-F238E27FC236}">
-                <a16:creationId xmlns:a16="http://schemas.microsoft.com/office/drawing/2014/main" id="{DCF679FA-671B-7049-9DD5-CE1C77B08484}"/>
-              </a:ext>
-            </a:extLst>
-          </p:cNvPr>
-          <p:cNvCxnSpPr>
-            <a:cxnSpLocks/>
-            <a:stCxn id="18" idx="1"/>
-            <a:endCxn id="3" idx="3"/>
-          </p:cNvCxnSpPr>
-          <p:nvPr/>
-        </p:nvCxnSpPr>
-        <p:spPr>
-          <a:xfrm rot="10800000">
-            <a:off x="6263947" y="2066552"/>
-            <a:ext cx="1174164" cy="1310"/>
-          </a:xfrm>
-          <a:prstGeom prst="bentConnector3">
-            <a:avLst>
-              <a:gd name="adj1" fmla="val 50000"/>
-            </a:avLst>
-          </a:prstGeom>
-        </p:spPr>
-        <p:style>
-          <a:lnRef idx="1">
-            <a:schemeClr val="dk1"/>
-          </a:lnRef>
-          <a:fillRef idx="0">
-            <a:schemeClr val="dk1"/>
-          </a:fillRef>
-          <a:effectRef idx="0">
-            <a:schemeClr val="dk1"/>
-          </a:effectRef>
-          <a:fontRef idx="minor">
-            <a:schemeClr val="tx1"/>
-          </a:fontRef>
-        </p:style>
-      </p:cxnSp>
-      <p:cxnSp>
-        <p:nvCxnSpPr>
-          <p:cNvPr id="84" name="Elbow Connector 83">
-            <a:extLst>
-              <a:ext uri="{FF2B5EF4-FFF2-40B4-BE49-F238E27FC236}">
-                <a16:creationId xmlns:a16="http://schemas.microsoft.com/office/drawing/2014/main" id="{03DD67F1-8C78-4D40-9F43-3D154FC0A9DB}"/>
-              </a:ext>
-            </a:extLst>
-          </p:cNvPr>
-          <p:cNvCxnSpPr>
-            <a:stCxn id="17" idx="4"/>
-            <a:endCxn id="4" idx="0"/>
-          </p:cNvCxnSpPr>
-          <p:nvPr/>
-        </p:nvCxnSpPr>
-        <p:spPr>
-          <a:xfrm rot="16200000" flipH="1">
-            <a:off x="9265349" y="126786"/>
-            <a:ext cx="491252" cy="1608211"/>
-          </a:xfrm>
-          <a:prstGeom prst="bentConnector3">
-            <a:avLst/>
-          </a:prstGeom>
-        </p:spPr>
-        <p:style>
-          <a:lnRef idx="1">
-            <a:schemeClr val="dk1"/>
-          </a:lnRef>
-          <a:fillRef idx="0">
-            <a:schemeClr val="dk1"/>
-          </a:fillRef>
-          <a:effectRef idx="0">
-            <a:schemeClr val="dk1"/>
-          </a:effectRef>
-          <a:fontRef idx="minor">
-            <a:schemeClr val="tx1"/>
-          </a:fontRef>
-        </p:style>
-      </p:cxnSp>
-      <p:cxnSp>
-        <p:nvCxnSpPr>
-          <p:cNvPr id="86" name="Elbow Connector 85">
-            <a:extLst>
-              <a:ext uri="{FF2B5EF4-FFF2-40B4-BE49-F238E27FC236}">
-                <a16:creationId xmlns:a16="http://schemas.microsoft.com/office/drawing/2014/main" id="{6FB0AA89-C952-404B-91B3-3E1DAE21FA6F}"/>
-              </a:ext>
-            </a:extLst>
-          </p:cNvPr>
-          <p:cNvCxnSpPr>
-            <a:stCxn id="16" idx="4"/>
-            <a:endCxn id="4" idx="0"/>
-          </p:cNvCxnSpPr>
-          <p:nvPr/>
-        </p:nvCxnSpPr>
-        <p:spPr>
-          <a:xfrm rot="5400000">
-            <a:off x="10436128" y="558386"/>
-            <a:ext cx="497086" cy="739179"/>
-          </a:xfrm>
-          <a:prstGeom prst="bentConnector3">
-            <a:avLst/>
-          </a:prstGeom>
-        </p:spPr>
-        <p:style>
-          <a:lnRef idx="1">
-            <a:schemeClr val="dk1"/>
-          </a:lnRef>
-          <a:fillRef idx="0">
-            <a:schemeClr val="dk1"/>
-          </a:fillRef>
-          <a:effectRef idx="0">
-            <a:schemeClr val="dk1"/>
-          </a:effectRef>
-          <a:fontRef idx="minor">
-            <a:schemeClr val="tx1"/>
-          </a:fontRef>
-        </p:style>
-      </p:cxnSp>
-      <p:sp>
-        <p:nvSpPr>
-          <p:cNvPr id="18" name="Diamond 17">
-            <a:extLst>
-              <a:ext uri="{FF2B5EF4-FFF2-40B4-BE49-F238E27FC236}">
-                <a16:creationId xmlns:a16="http://schemas.microsoft.com/office/drawing/2014/main" id="{7D6F2EAA-0907-6945-9BC6-E56AB4DF8B35}"/>
-              </a:ext>
-            </a:extLst>
-          </p:cNvPr>
-          <p:cNvSpPr/>
-          <p:nvPr/>
-        </p:nvSpPr>
-        <p:spPr>
-          <a:xfrm>
-            <a:off x="7438111" y="1737683"/>
-            <a:ext cx="1180108" cy="660358"/>
-          </a:xfrm>
-          <a:prstGeom prst="diamond">
-            <a:avLst/>
-          </a:prstGeom>
-        </p:spPr>
-        <p:style>
-          <a:lnRef idx="2">
-            <a:schemeClr val="dk1"/>
-          </a:lnRef>
-          <a:fillRef idx="1">
-            <a:schemeClr val="lt1"/>
-          </a:fillRef>
-          <a:effectRef idx="0">
-            <a:schemeClr val="dk1"/>
-          </a:effectRef>
-          <a:fontRef idx="minor">
-            <a:schemeClr val="dk1"/>
-          </a:fontRef>
-        </p:style>
-        <p:txBody>
-          <a:bodyPr rtlCol="0" anchor="ctr"/>
-          <a:lstStyle/>
-          <a:p>
-            <a:pPr algn="ctr"/>
-            <a:r>
-              <a:rPr lang="en-GB" dirty="0"/>
-              <a:t>Part of</a:t>
-            </a:r>
-          </a:p>
-        </p:txBody>
-      </p:sp>
-      <p:sp>
-        <p:nvSpPr>
-          <p:cNvPr id="34" name="Diamond 33">
-            <a:extLst>
-              <a:ext uri="{FF2B5EF4-FFF2-40B4-BE49-F238E27FC236}">
-                <a16:creationId xmlns:a16="http://schemas.microsoft.com/office/drawing/2014/main" id="{A11216F5-191C-7B48-A4BF-50B887BCBEB7}"/>
-              </a:ext>
-            </a:extLst>
-          </p:cNvPr>
-          <p:cNvSpPr/>
-          <p:nvPr/>
-        </p:nvSpPr>
-        <p:spPr>
-          <a:xfrm>
-            <a:off x="2902133" y="1595681"/>
-            <a:ext cx="1523016" cy="970844"/>
-          </a:xfrm>
-          <a:prstGeom prst="diamond">
-            <a:avLst/>
-          </a:prstGeom>
-        </p:spPr>
-        <p:style>
-          <a:lnRef idx="2">
-            <a:schemeClr val="dk1"/>
-          </a:lnRef>
-          <a:fillRef idx="1">
-            <a:schemeClr val="lt1"/>
-          </a:fillRef>
-          <a:effectRef idx="0">
-            <a:schemeClr val="dk1"/>
-          </a:effectRef>
-          <a:fontRef idx="minor">
-            <a:schemeClr val="dk1"/>
-          </a:fontRef>
-        </p:style>
-        <p:txBody>
-          <a:bodyPr rtlCol="0" anchor="ctr"/>
-          <a:lstStyle/>
-          <a:p>
-            <a:pPr algn="ctr"/>
-            <a:r>
-              <a:rPr lang="en-GB" dirty="0"/>
-              <a:t>wrote</a:t>
-            </a:r>
-          </a:p>
-        </p:txBody>
-      </p:sp>
-      <p:cxnSp>
-        <p:nvCxnSpPr>
-          <p:cNvPr id="25" name="Elbow Connector 24">
-            <a:extLst>
-              <a:ext uri="{FF2B5EF4-FFF2-40B4-BE49-F238E27FC236}">
-                <a16:creationId xmlns:a16="http://schemas.microsoft.com/office/drawing/2014/main" id="{8E1275BD-817A-1040-8E18-C578A8A7B486}"/>
-              </a:ext>
-            </a:extLst>
-          </p:cNvPr>
-          <p:cNvCxnSpPr>
-            <a:cxnSpLocks/>
-            <a:stCxn id="18" idx="3"/>
-            <a:endCxn id="4" idx="1"/>
-          </p:cNvCxnSpPr>
-          <p:nvPr/>
-        </p:nvCxnSpPr>
-        <p:spPr>
-          <a:xfrm flipV="1">
-            <a:off x="8618219" y="1361184"/>
-            <a:ext cx="1075441" cy="706678"/>
-          </a:xfrm>
-          <a:prstGeom prst="bentConnector3">
-            <a:avLst/>
-          </a:prstGeom>
-          <a:ln>
-            <a:tailEnd type="triangle"/>
-          </a:ln>
-        </p:spPr>
-        <p:style>
-          <a:lnRef idx="1">
-            <a:schemeClr val="dk1"/>
-          </a:lnRef>
-          <a:fillRef idx="0">
-            <a:schemeClr val="dk1"/>
-          </a:fillRef>
-          <a:effectRef idx="0">
-            <a:schemeClr val="dk1"/>
-          </a:effectRef>
-          <a:fontRef idx="minor">
-            <a:schemeClr val="tx1"/>
-          </a:fontRef>
-        </p:style>
-      </p:cxnSp>
-      <p:cxnSp>
-        <p:nvCxnSpPr>
-          <p:cNvPr id="27" name="Elbow Connector 26">
-            <a:extLst>
-              <a:ext uri="{FF2B5EF4-FFF2-40B4-BE49-F238E27FC236}">
-                <a16:creationId xmlns:a16="http://schemas.microsoft.com/office/drawing/2014/main" id="{756D262E-3D8B-0749-854A-24D0ACCCB7A6}"/>
-              </a:ext>
-            </a:extLst>
-          </p:cNvPr>
-          <p:cNvCxnSpPr>
-            <a:cxnSpLocks/>
-            <a:stCxn id="34" idx="1"/>
-            <a:endCxn id="2" idx="2"/>
-          </p:cNvCxnSpPr>
-          <p:nvPr/>
-        </p:nvCxnSpPr>
-        <p:spPr>
-          <a:xfrm rot="10800000">
-            <a:off x="1993999" y="1666935"/>
-            <a:ext cx="908135" cy="414168"/>
-          </a:xfrm>
-          <a:prstGeom prst="bentConnector2">
-            <a:avLst/>
-          </a:prstGeom>
-          <a:ln>
-            <a:tailEnd type="triangle"/>
-          </a:ln>
-        </p:spPr>
-        <p:style>
-          <a:lnRef idx="1">
-            <a:schemeClr val="dk1"/>
-          </a:lnRef>
-          <a:fillRef idx="0">
-            <a:schemeClr val="dk1"/>
-          </a:fillRef>
-          <a:effectRef idx="0">
-            <a:schemeClr val="dk1"/>
-          </a:effectRef>
-          <a:fontRef idx="minor">
-            <a:schemeClr val="tx1"/>
-          </a:fontRef>
-        </p:style>
-      </p:cxnSp>
-      <p:sp>
-        <p:nvSpPr>
-          <p:cNvPr id="44" name="Oval 43">
-            <a:extLst>
-              <a:ext uri="{FF2B5EF4-FFF2-40B4-BE49-F238E27FC236}">
-                <a16:creationId xmlns:a16="http://schemas.microsoft.com/office/drawing/2014/main" id="{1B75DDBE-A0A9-8F4D-A8A6-07661AB1BB1A}"/>
-              </a:ext>
-            </a:extLst>
-          </p:cNvPr>
-          <p:cNvSpPr/>
-          <p:nvPr/>
-        </p:nvSpPr>
-        <p:spPr>
-          <a:xfrm>
-            <a:off x="9321597" y="5373760"/>
-            <a:ext cx="1611630" cy="502920"/>
-          </a:xfrm>
-          <a:prstGeom prst="ellipse">
-            <a:avLst/>
-          </a:prstGeom>
-        </p:spPr>
-        <p:style>
-          <a:lnRef idx="2">
-            <a:schemeClr val="dk1"/>
-          </a:lnRef>
-          <a:fillRef idx="1">
-            <a:schemeClr val="lt1"/>
-          </a:fillRef>
-          <a:effectRef idx="0">
-            <a:schemeClr val="dk1"/>
-          </a:effectRef>
-          <a:fontRef idx="minor">
-            <a:schemeClr val="dk1"/>
-          </a:fontRef>
-        </p:style>
-        <p:txBody>
-          <a:bodyPr rtlCol="0" anchor="ctr"/>
-          <a:lstStyle/>
-          <a:p>
-            <a:pPr algn="ctr"/>
-            <a:r>
-              <a:rPr lang="en-GB" dirty="0"/>
-              <a:t>name</a:t>
-            </a:r>
-          </a:p>
-        </p:txBody>
-      </p:sp>
-      <p:sp>
-        <p:nvSpPr>
-          <p:cNvPr id="45" name="Oval 44">
-            <a:extLst>
-              <a:ext uri="{FF2B5EF4-FFF2-40B4-BE49-F238E27FC236}">
-                <a16:creationId xmlns:a16="http://schemas.microsoft.com/office/drawing/2014/main" id="{D3A727C8-264A-8F4D-9ABE-5CC6DA1D3F7C}"/>
-              </a:ext>
-            </a:extLst>
-          </p:cNvPr>
-          <p:cNvSpPr/>
-          <p:nvPr/>
-        </p:nvSpPr>
-        <p:spPr>
-          <a:xfrm>
-            <a:off x="208614" y="5372305"/>
-            <a:ext cx="1611630" cy="502920"/>
-          </a:xfrm>
-          <a:prstGeom prst="ellipse">
-            <a:avLst/>
-          </a:prstGeom>
-        </p:spPr>
-        <p:style>
-          <a:lnRef idx="2">
-            <a:schemeClr val="dk1"/>
-          </a:lnRef>
-          <a:fillRef idx="1">
-            <a:schemeClr val="lt1"/>
-          </a:fillRef>
-          <a:effectRef idx="0">
-            <a:schemeClr val="dk1"/>
-          </a:effectRef>
-          <a:fontRef idx="minor">
-            <a:schemeClr val="dk1"/>
-          </a:fontRef>
-        </p:style>
-        <p:txBody>
-          <a:bodyPr rtlCol="0" anchor="ctr"/>
-          <a:lstStyle/>
-          <a:p>
-            <a:pPr algn="ctr"/>
-            <a:r>
-              <a:rPr lang="en-GB" dirty="0"/>
-              <a:t>downs</a:t>
-            </a:r>
-          </a:p>
-        </p:txBody>
-      </p:sp>
-      <p:sp>
-        <p:nvSpPr>
-          <p:cNvPr id="47" name="Oval 46">
-            <a:extLst>
-              <a:ext uri="{FF2B5EF4-FFF2-40B4-BE49-F238E27FC236}">
-                <a16:creationId xmlns:a16="http://schemas.microsoft.com/office/drawing/2014/main" id="{2F9EE5EB-D2B0-7F4F-A8FF-229606277B45}"/>
-              </a:ext>
-            </a:extLst>
-          </p:cNvPr>
-          <p:cNvSpPr/>
-          <p:nvPr/>
-        </p:nvSpPr>
-        <p:spPr>
-          <a:xfrm>
-            <a:off x="260476" y="6059477"/>
-            <a:ext cx="1611630" cy="502920"/>
-          </a:xfrm>
-          <a:prstGeom prst="ellipse">
-            <a:avLst/>
-          </a:prstGeom>
-        </p:spPr>
-        <p:style>
-          <a:lnRef idx="2">
-            <a:schemeClr val="dk1"/>
-          </a:lnRef>
-          <a:fillRef idx="1">
-            <a:schemeClr val="lt1"/>
-          </a:fillRef>
-          <a:effectRef idx="0">
-            <a:schemeClr val="dk1"/>
-          </a:effectRef>
-          <a:fontRef idx="minor">
-            <a:schemeClr val="dk1"/>
-          </a:fontRef>
-        </p:style>
-        <p:txBody>
-          <a:bodyPr rtlCol="0" anchor="ctr"/>
-          <a:lstStyle/>
-          <a:p>
-            <a:pPr algn="ctr"/>
-            <a:r>
-              <a:rPr lang="en-GB" dirty="0"/>
-              <a:t>Archived</a:t>
-            </a:r>
-          </a:p>
-        </p:txBody>
-      </p:sp>
-      <p:cxnSp>
-        <p:nvCxnSpPr>
-          <p:cNvPr id="108" name="Elbow Connector 107">
-            <a:extLst>
-              <a:ext uri="{FF2B5EF4-FFF2-40B4-BE49-F238E27FC236}">
-                <a16:creationId xmlns:a16="http://schemas.microsoft.com/office/drawing/2014/main" id="{0389EC49-AF7F-AA43-A7B4-88CEA567B83F}"/>
-              </a:ext>
-            </a:extLst>
-          </p:cNvPr>
-          <p:cNvCxnSpPr>
-            <a:stCxn id="45" idx="6"/>
-            <a:endCxn id="3" idx="2"/>
-          </p:cNvCxnSpPr>
-          <p:nvPr/>
-        </p:nvCxnSpPr>
-        <p:spPr>
-          <a:xfrm flipV="1">
-            <a:off x="1820244" y="2251218"/>
-            <a:ext cx="3843475" cy="3372547"/>
-          </a:xfrm>
-          <a:prstGeom prst="bentConnector2">
-            <a:avLst/>
-          </a:prstGeom>
-        </p:spPr>
-        <p:style>
-          <a:lnRef idx="1">
-            <a:schemeClr val="dk1"/>
-          </a:lnRef>
-          <a:fillRef idx="0">
-            <a:schemeClr val="dk1"/>
-          </a:fillRef>
-          <a:effectRef idx="0">
-            <a:schemeClr val="dk1"/>
-          </a:effectRef>
-          <a:fontRef idx="minor">
-            <a:schemeClr val="tx1"/>
-          </a:fontRef>
-        </p:style>
-      </p:cxnSp>
-      <p:cxnSp>
-        <p:nvCxnSpPr>
-          <p:cNvPr id="110" name="Elbow Connector 109">
-            <a:extLst>
-              <a:ext uri="{FF2B5EF4-FFF2-40B4-BE49-F238E27FC236}">
-                <a16:creationId xmlns:a16="http://schemas.microsoft.com/office/drawing/2014/main" id="{35803F01-B116-604D-A7A9-FEB37442F14B}"/>
-              </a:ext>
-            </a:extLst>
-          </p:cNvPr>
-          <p:cNvCxnSpPr>
-            <a:stCxn id="47" idx="6"/>
-            <a:endCxn id="3" idx="2"/>
-          </p:cNvCxnSpPr>
-          <p:nvPr/>
-        </p:nvCxnSpPr>
-        <p:spPr>
-          <a:xfrm flipV="1">
-            <a:off x="1872106" y="2251218"/>
-            <a:ext cx="3791613" cy="4059719"/>
-          </a:xfrm>
-          <a:prstGeom prst="bentConnector2">
-            <a:avLst/>
-          </a:prstGeom>
-        </p:spPr>
-        <p:style>
-          <a:lnRef idx="1">
-            <a:schemeClr val="dk1"/>
-          </a:lnRef>
-          <a:fillRef idx="0">
-            <a:schemeClr val="dk1"/>
-          </a:fillRef>
-          <a:effectRef idx="0">
-            <a:schemeClr val="dk1"/>
-          </a:effectRef>
-          <a:fontRef idx="minor">
-            <a:schemeClr val="tx1"/>
-          </a:fontRef>
-        </p:style>
-      </p:cxnSp>
-      <p:cxnSp>
-        <p:nvCxnSpPr>
-          <p:cNvPr id="117" name="Elbow Connector 116">
-            <a:extLst>
-              <a:ext uri="{FF2B5EF4-FFF2-40B4-BE49-F238E27FC236}">
-                <a16:creationId xmlns:a16="http://schemas.microsoft.com/office/drawing/2014/main" id="{75C502E1-74EF-124A-8369-218133FE592D}"/>
-              </a:ext>
-            </a:extLst>
-          </p:cNvPr>
-          <p:cNvCxnSpPr>
-            <a:stCxn id="44" idx="2"/>
-            <a:endCxn id="3" idx="2"/>
-          </p:cNvCxnSpPr>
-          <p:nvPr/>
-        </p:nvCxnSpPr>
-        <p:spPr>
-          <a:xfrm rot="10800000">
-            <a:off x="5663719" y="2251218"/>
-            <a:ext cx="3657878" cy="3374002"/>
-          </a:xfrm>
-          <a:prstGeom prst="bentConnector2">
-            <a:avLst/>
-          </a:prstGeom>
-        </p:spPr>
-        <p:style>
-          <a:lnRef idx="1">
-            <a:schemeClr val="dk1"/>
-          </a:lnRef>
-          <a:fillRef idx="0">
-            <a:schemeClr val="dk1"/>
-          </a:fillRef>
-          <a:effectRef idx="0">
-            <a:schemeClr val="dk1"/>
-          </a:effectRef>
-          <a:fontRef idx="minor">
-            <a:schemeClr val="tx1"/>
-          </a:fontRef>
-        </p:style>
-      </p:cxnSp>
+              <a:t>5</a:t>
+            </a:r>
+          </a:p>
+        </p:txBody>
+      </p:sp>
+      <p:pic>
+        <p:nvPicPr>
+          <p:cNvPr id="10" name="Picture 9">
+            <a:extLst>
+              <a:ext uri="{FF2B5EF4-FFF2-40B4-BE49-F238E27FC236}">
+                <a16:creationId xmlns:a16="http://schemas.microsoft.com/office/drawing/2014/main" id="{0304CCAF-55EB-DF4B-A868-A23CB53B2AAE}"/>
+              </a:ext>
+            </a:extLst>
+          </p:cNvPr>
+          <p:cNvPicPr>
+            <a:picLocks noChangeAspect="1"/>
+          </p:cNvPicPr>
+          <p:nvPr/>
+        </p:nvPicPr>
+        <p:blipFill>
+          <a:blip r:embed="rId5"/>
+          <a:stretch>
+            <a:fillRect/>
+          </a:stretch>
+        </p:blipFill>
+        <p:spPr>
+          <a:xfrm>
+            <a:off x="1162856" y="4151087"/>
+            <a:ext cx="9271000" cy="1104900"/>
+          </a:xfrm>
+          <a:prstGeom prst="rect">
+            <a:avLst/>
+          </a:prstGeom>
+        </p:spPr>
+      </p:pic>
+      <p:pic>
+        <p:nvPicPr>
+          <p:cNvPr id="11" name="Picture 10">
+            <a:extLst>
+              <a:ext uri="{FF2B5EF4-FFF2-40B4-BE49-F238E27FC236}">
+                <a16:creationId xmlns:a16="http://schemas.microsoft.com/office/drawing/2014/main" id="{F1DE0C62-539D-8E4E-AD17-03F2A8C496D4}"/>
+              </a:ext>
+            </a:extLst>
+          </p:cNvPr>
+          <p:cNvPicPr>
+            <a:picLocks noChangeAspect="1"/>
+          </p:cNvPicPr>
+          <p:nvPr/>
+        </p:nvPicPr>
+        <p:blipFill>
+          <a:blip r:embed="rId6"/>
+          <a:stretch>
+            <a:fillRect/>
+          </a:stretch>
+        </p:blipFill>
+        <p:spPr>
+          <a:xfrm>
+            <a:off x="1403350" y="5572578"/>
+            <a:ext cx="7251700" cy="1104900"/>
+          </a:xfrm>
+          <a:prstGeom prst="rect">
+            <a:avLst/>
+          </a:prstGeom>
+        </p:spPr>
+      </p:pic>
     </p:spTree>
     <p:extLst>
       <p:ext uri="{BB962C8B-B14F-4D97-AF65-F5344CB8AC3E}">
-        <p14:creationId xmlns:p14="http://schemas.microsoft.com/office/powerpoint/2010/main" val="1014063548"/>
+        <p14:creationId xmlns:p14="http://schemas.microsoft.com/office/powerpoint/2010/main" val="186107553"/>
       </p:ext>
     </p:extLst>
   </p:cSld>

</xml_diff>

<commit_message>
picture E/R diagram task 2
</commit_message>
<xml_diff>
--- a/Text/ERM_Assign2.pptx
+++ b/Text/ERM_Assign2.pptx
@@ -6,8 +6,10 @@
   </p:sldMasterIdLst>
   <p:sldIdLst>
     <p:sldId id="257" r:id="rId2"/>
-    <p:sldId id="258" r:id="rId3"/>
-    <p:sldId id="259" r:id="rId4"/>
+    <p:sldId id="261" r:id="rId3"/>
+    <p:sldId id="260" r:id="rId4"/>
+    <p:sldId id="258" r:id="rId5"/>
+    <p:sldId id="259" r:id="rId6"/>
   </p:sldIdLst>
   <p:sldSz cx="12192000" cy="6858000"/>
   <p:notesSz cx="6858000" cy="9144000"/>
@@ -5070,6 +5072,1075 @@
       </p:grpSpPr>
       <p:sp>
         <p:nvSpPr>
+          <p:cNvPr id="2" name="TextBox 1">
+            <a:extLst>
+              <a:ext uri="{FF2B5EF4-FFF2-40B4-BE49-F238E27FC236}">
+                <a16:creationId xmlns:a16="http://schemas.microsoft.com/office/drawing/2014/main" id="{9710605A-FA11-EF45-AD8E-33B1B2D9A009}"/>
+              </a:ext>
+            </a:extLst>
+          </p:cNvPr>
+          <p:cNvSpPr txBox="1"/>
+          <p:nvPr/>
+        </p:nvSpPr>
+        <p:spPr>
+          <a:xfrm>
+            <a:off x="1019321" y="2502678"/>
+            <a:ext cx="1113318" cy="369332"/>
+          </a:xfrm>
+          <a:prstGeom prst="rect">
+            <a:avLst/>
+          </a:prstGeom>
+        </p:spPr>
+        <p:style>
+          <a:lnRef idx="2">
+            <a:schemeClr val="dk1"/>
+          </a:lnRef>
+          <a:fillRef idx="1">
+            <a:schemeClr val="lt1"/>
+          </a:fillRef>
+          <a:effectRef idx="0">
+            <a:schemeClr val="dk1"/>
+          </a:effectRef>
+          <a:fontRef idx="minor">
+            <a:schemeClr val="dk1"/>
+          </a:fontRef>
+        </p:style>
+        <p:txBody>
+          <a:bodyPr wrap="none" rtlCol="0">
+            <a:spAutoFit/>
+          </a:bodyPr>
+          <a:lstStyle/>
+          <a:p>
+            <a:r>
+              <a:rPr lang="en-GB" dirty="0"/>
+              <a:t>Managers</a:t>
+            </a:r>
+          </a:p>
+        </p:txBody>
+      </p:sp>
+      <p:sp>
+        <p:nvSpPr>
+          <p:cNvPr id="3" name="Oval 2">
+            <a:extLst>
+              <a:ext uri="{FF2B5EF4-FFF2-40B4-BE49-F238E27FC236}">
+                <a16:creationId xmlns:a16="http://schemas.microsoft.com/office/drawing/2014/main" id="{140D8BA8-C4EC-6141-A5A1-D38373D9CEC4}"/>
+              </a:ext>
+            </a:extLst>
+          </p:cNvPr>
+          <p:cNvSpPr/>
+          <p:nvPr/>
+        </p:nvSpPr>
+        <p:spPr>
+          <a:xfrm>
+            <a:off x="2801792" y="1652854"/>
+            <a:ext cx="1611630" cy="502920"/>
+          </a:xfrm>
+          <a:prstGeom prst="ellipse">
+            <a:avLst/>
+          </a:prstGeom>
+        </p:spPr>
+        <p:style>
+          <a:lnRef idx="2">
+            <a:schemeClr val="dk1"/>
+          </a:lnRef>
+          <a:fillRef idx="1">
+            <a:schemeClr val="lt1"/>
+          </a:fillRef>
+          <a:effectRef idx="0">
+            <a:schemeClr val="dk1"/>
+          </a:effectRef>
+          <a:fontRef idx="minor">
+            <a:schemeClr val="dk1"/>
+          </a:fontRef>
+        </p:style>
+        <p:txBody>
+          <a:bodyPr rtlCol="0" anchor="ctr"/>
+          <a:lstStyle/>
+          <a:p>
+            <a:pPr algn="ctr"/>
+            <a:r>
+              <a:rPr lang="en-GB" dirty="0"/>
+              <a:t>Name</a:t>
+            </a:r>
+          </a:p>
+        </p:txBody>
+      </p:sp>
+      <p:sp>
+        <p:nvSpPr>
+          <p:cNvPr id="5" name="TextBox 4">
+            <a:extLst>
+              <a:ext uri="{FF2B5EF4-FFF2-40B4-BE49-F238E27FC236}">
+                <a16:creationId xmlns:a16="http://schemas.microsoft.com/office/drawing/2014/main" id="{A0750E26-21CD-A24B-89FD-3A634F5EBCF2}"/>
+              </a:ext>
+            </a:extLst>
+          </p:cNvPr>
+          <p:cNvSpPr txBox="1"/>
+          <p:nvPr/>
+        </p:nvSpPr>
+        <p:spPr>
+          <a:xfrm>
+            <a:off x="5003463" y="3778764"/>
+            <a:ext cx="1158394" cy="369332"/>
+          </a:xfrm>
+          <a:prstGeom prst="rect">
+            <a:avLst/>
+          </a:prstGeom>
+        </p:spPr>
+        <p:style>
+          <a:lnRef idx="2">
+            <a:schemeClr val="dk1"/>
+          </a:lnRef>
+          <a:fillRef idx="1">
+            <a:schemeClr val="lt1"/>
+          </a:fillRef>
+          <a:effectRef idx="0">
+            <a:schemeClr val="dk1"/>
+          </a:effectRef>
+          <a:fontRef idx="minor">
+            <a:schemeClr val="dk1"/>
+          </a:fontRef>
+        </p:style>
+        <p:txBody>
+          <a:bodyPr wrap="none" rtlCol="0">
+            <a:spAutoFit/>
+          </a:bodyPr>
+          <a:lstStyle/>
+          <a:p>
+            <a:r>
+              <a:rPr lang="en-GB" dirty="0"/>
+              <a:t>Interviews</a:t>
+            </a:r>
+          </a:p>
+        </p:txBody>
+      </p:sp>
+      <p:sp>
+        <p:nvSpPr>
+          <p:cNvPr id="6" name="Oval 5">
+            <a:extLst>
+              <a:ext uri="{FF2B5EF4-FFF2-40B4-BE49-F238E27FC236}">
+                <a16:creationId xmlns:a16="http://schemas.microsoft.com/office/drawing/2014/main" id="{9F0BBD5D-7332-4248-AADE-1E63045B523E}"/>
+              </a:ext>
+            </a:extLst>
+          </p:cNvPr>
+          <p:cNvSpPr/>
+          <p:nvPr/>
+        </p:nvSpPr>
+        <p:spPr>
+          <a:xfrm>
+            <a:off x="9311818" y="1347328"/>
+            <a:ext cx="1611630" cy="502920"/>
+          </a:xfrm>
+          <a:prstGeom prst="ellipse">
+            <a:avLst/>
+          </a:prstGeom>
+        </p:spPr>
+        <p:style>
+          <a:lnRef idx="2">
+            <a:schemeClr val="dk1"/>
+          </a:lnRef>
+          <a:fillRef idx="1">
+            <a:schemeClr val="lt1"/>
+          </a:fillRef>
+          <a:effectRef idx="0">
+            <a:schemeClr val="dk1"/>
+          </a:effectRef>
+          <a:fontRef idx="minor">
+            <a:schemeClr val="dk1"/>
+          </a:fontRef>
+        </p:style>
+        <p:txBody>
+          <a:bodyPr rtlCol="0" anchor="ctr"/>
+          <a:lstStyle/>
+          <a:p>
+            <a:pPr algn="ctr"/>
+            <a:r>
+              <a:rPr lang="en-GB" u="sng" dirty="0"/>
+              <a:t>ID</a:t>
+            </a:r>
+          </a:p>
+        </p:txBody>
+      </p:sp>
+      <p:sp>
+        <p:nvSpPr>
+          <p:cNvPr id="7" name="Diamond 6">
+            <a:extLst>
+              <a:ext uri="{FF2B5EF4-FFF2-40B4-BE49-F238E27FC236}">
+                <a16:creationId xmlns:a16="http://schemas.microsoft.com/office/drawing/2014/main" id="{2DCEC75C-A044-054D-9138-A8A46713B51B}"/>
+              </a:ext>
+            </a:extLst>
+          </p:cNvPr>
+          <p:cNvSpPr/>
+          <p:nvPr/>
+        </p:nvSpPr>
+        <p:spPr>
+          <a:xfrm>
+            <a:off x="2040284" y="3478008"/>
+            <a:ext cx="1523016" cy="970844"/>
+          </a:xfrm>
+          <a:prstGeom prst="diamond">
+            <a:avLst/>
+          </a:prstGeom>
+        </p:spPr>
+        <p:style>
+          <a:lnRef idx="2">
+            <a:schemeClr val="dk1"/>
+          </a:lnRef>
+          <a:fillRef idx="1">
+            <a:schemeClr val="lt1"/>
+          </a:fillRef>
+          <a:effectRef idx="0">
+            <a:schemeClr val="dk1"/>
+          </a:effectRef>
+          <a:fontRef idx="minor">
+            <a:schemeClr val="dk1"/>
+          </a:fontRef>
+        </p:style>
+        <p:txBody>
+          <a:bodyPr rtlCol="0" anchor="ctr"/>
+          <a:lstStyle/>
+          <a:p>
+            <a:pPr algn="ctr"/>
+            <a:r>
+              <a:rPr lang="en-GB" dirty="0"/>
+              <a:t>has</a:t>
+            </a:r>
+          </a:p>
+        </p:txBody>
+      </p:sp>
+      <p:sp>
+        <p:nvSpPr>
+          <p:cNvPr id="8" name="TextBox 7">
+            <a:extLst>
+              <a:ext uri="{FF2B5EF4-FFF2-40B4-BE49-F238E27FC236}">
+                <a16:creationId xmlns:a16="http://schemas.microsoft.com/office/drawing/2014/main" id="{49F55A72-EF83-7E4E-9387-B222A78CF384}"/>
+              </a:ext>
+            </a:extLst>
+          </p:cNvPr>
+          <p:cNvSpPr txBox="1"/>
+          <p:nvPr/>
+        </p:nvSpPr>
+        <p:spPr>
+          <a:xfrm>
+            <a:off x="8957572" y="2502678"/>
+            <a:ext cx="1160061" cy="369332"/>
+          </a:xfrm>
+          <a:prstGeom prst="rect">
+            <a:avLst/>
+          </a:prstGeom>
+        </p:spPr>
+        <p:style>
+          <a:lnRef idx="2">
+            <a:schemeClr val="dk1"/>
+          </a:lnRef>
+          <a:fillRef idx="1">
+            <a:schemeClr val="lt1"/>
+          </a:fillRef>
+          <a:effectRef idx="0">
+            <a:schemeClr val="dk1"/>
+          </a:effectRef>
+          <a:fontRef idx="minor">
+            <a:schemeClr val="dk1"/>
+          </a:fontRef>
+        </p:style>
+        <p:txBody>
+          <a:bodyPr wrap="none" rtlCol="0">
+            <a:spAutoFit/>
+          </a:bodyPr>
+          <a:lstStyle/>
+          <a:p>
+            <a:r>
+              <a:rPr lang="en-GB" dirty="0"/>
+              <a:t>Applicants</a:t>
+            </a:r>
+          </a:p>
+        </p:txBody>
+      </p:sp>
+      <p:sp>
+        <p:nvSpPr>
+          <p:cNvPr id="9" name="Oval 8">
+            <a:extLst>
+              <a:ext uri="{FF2B5EF4-FFF2-40B4-BE49-F238E27FC236}">
+                <a16:creationId xmlns:a16="http://schemas.microsoft.com/office/drawing/2014/main" id="{FE418D0B-C2E9-BB4E-A40D-44F42190E685}"/>
+              </a:ext>
+            </a:extLst>
+          </p:cNvPr>
+          <p:cNvSpPr/>
+          <p:nvPr/>
+        </p:nvSpPr>
+        <p:spPr>
+          <a:xfrm>
+            <a:off x="1019321" y="803029"/>
+            <a:ext cx="1611630" cy="502920"/>
+          </a:xfrm>
+          <a:prstGeom prst="ellipse">
+            <a:avLst/>
+          </a:prstGeom>
+        </p:spPr>
+        <p:style>
+          <a:lnRef idx="2">
+            <a:schemeClr val="dk1"/>
+          </a:lnRef>
+          <a:fillRef idx="1">
+            <a:schemeClr val="lt1"/>
+          </a:fillRef>
+          <a:effectRef idx="0">
+            <a:schemeClr val="dk1"/>
+          </a:effectRef>
+          <a:fontRef idx="minor">
+            <a:schemeClr val="dk1"/>
+          </a:fontRef>
+        </p:style>
+        <p:txBody>
+          <a:bodyPr rtlCol="0" anchor="ctr"/>
+          <a:lstStyle/>
+          <a:p>
+            <a:pPr algn="ctr"/>
+            <a:r>
+              <a:rPr lang="en-GB" u="sng" dirty="0"/>
+              <a:t>ID</a:t>
+            </a:r>
+          </a:p>
+        </p:txBody>
+      </p:sp>
+      <p:sp>
+        <p:nvSpPr>
+          <p:cNvPr id="10" name="Diamond 9">
+            <a:extLst>
+              <a:ext uri="{FF2B5EF4-FFF2-40B4-BE49-F238E27FC236}">
+                <a16:creationId xmlns:a16="http://schemas.microsoft.com/office/drawing/2014/main" id="{1C4937A7-F965-4940-A101-F252AE1429EA}"/>
+              </a:ext>
+            </a:extLst>
+          </p:cNvPr>
+          <p:cNvSpPr/>
+          <p:nvPr/>
+        </p:nvSpPr>
+        <p:spPr>
+          <a:xfrm>
+            <a:off x="7580016" y="3484358"/>
+            <a:ext cx="1523016" cy="970844"/>
+          </a:xfrm>
+          <a:prstGeom prst="diamond">
+            <a:avLst/>
+          </a:prstGeom>
+        </p:spPr>
+        <p:style>
+          <a:lnRef idx="2">
+            <a:schemeClr val="dk1"/>
+          </a:lnRef>
+          <a:fillRef idx="1">
+            <a:schemeClr val="lt1"/>
+          </a:fillRef>
+          <a:effectRef idx="0">
+            <a:schemeClr val="dk1"/>
+          </a:effectRef>
+          <a:fontRef idx="minor">
+            <a:schemeClr val="dk1"/>
+          </a:fontRef>
+        </p:style>
+        <p:txBody>
+          <a:bodyPr rtlCol="0" anchor="ctr"/>
+          <a:lstStyle/>
+          <a:p>
+            <a:pPr algn="ctr"/>
+            <a:r>
+              <a:rPr lang="en-GB" dirty="0"/>
+              <a:t>has</a:t>
+            </a:r>
+          </a:p>
+        </p:txBody>
+      </p:sp>
+      <p:sp>
+        <p:nvSpPr>
+          <p:cNvPr id="11" name="Oval 10">
+            <a:extLst>
+              <a:ext uri="{FF2B5EF4-FFF2-40B4-BE49-F238E27FC236}">
+                <a16:creationId xmlns:a16="http://schemas.microsoft.com/office/drawing/2014/main" id="{933EFB59-BCE5-D44D-AD1E-B4E2363E0E63}"/>
+              </a:ext>
+            </a:extLst>
+          </p:cNvPr>
+          <p:cNvSpPr/>
+          <p:nvPr/>
+        </p:nvSpPr>
+        <p:spPr>
+          <a:xfrm>
+            <a:off x="6892677" y="1347328"/>
+            <a:ext cx="1611630" cy="502920"/>
+          </a:xfrm>
+          <a:prstGeom prst="ellipse">
+            <a:avLst/>
+          </a:prstGeom>
+        </p:spPr>
+        <p:style>
+          <a:lnRef idx="2">
+            <a:schemeClr val="dk1"/>
+          </a:lnRef>
+          <a:fillRef idx="1">
+            <a:schemeClr val="lt1"/>
+          </a:fillRef>
+          <a:effectRef idx="0">
+            <a:schemeClr val="dk1"/>
+          </a:effectRef>
+          <a:fontRef idx="minor">
+            <a:schemeClr val="dk1"/>
+          </a:fontRef>
+        </p:style>
+        <p:txBody>
+          <a:bodyPr rtlCol="0" anchor="ctr"/>
+          <a:lstStyle/>
+          <a:p>
+            <a:pPr algn="ctr"/>
+            <a:r>
+              <a:rPr lang="en-GB" dirty="0"/>
+              <a:t>Name</a:t>
+            </a:r>
+          </a:p>
+        </p:txBody>
+      </p:sp>
+      <p:sp>
+        <p:nvSpPr>
+          <p:cNvPr id="12" name="Oval 11">
+            <a:extLst>
+              <a:ext uri="{FF2B5EF4-FFF2-40B4-BE49-F238E27FC236}">
+                <a16:creationId xmlns:a16="http://schemas.microsoft.com/office/drawing/2014/main" id="{460D3B3B-11ED-FC43-8DB8-D474F192980D}"/>
+              </a:ext>
+            </a:extLst>
+          </p:cNvPr>
+          <p:cNvSpPr/>
+          <p:nvPr/>
+        </p:nvSpPr>
+        <p:spPr>
+          <a:xfrm>
+            <a:off x="2938454" y="5577354"/>
+            <a:ext cx="1611630" cy="502920"/>
+          </a:xfrm>
+          <a:prstGeom prst="ellipse">
+            <a:avLst/>
+          </a:prstGeom>
+        </p:spPr>
+        <p:style>
+          <a:lnRef idx="2">
+            <a:schemeClr val="dk1"/>
+          </a:lnRef>
+          <a:fillRef idx="1">
+            <a:schemeClr val="lt1"/>
+          </a:fillRef>
+          <a:effectRef idx="0">
+            <a:schemeClr val="dk1"/>
+          </a:effectRef>
+          <a:fontRef idx="minor">
+            <a:schemeClr val="dk1"/>
+          </a:fontRef>
+        </p:style>
+        <p:txBody>
+          <a:bodyPr rtlCol="0" anchor="ctr"/>
+          <a:lstStyle/>
+          <a:p>
+            <a:pPr algn="ctr"/>
+            <a:r>
+              <a:rPr lang="en-GB" u="sng" dirty="0"/>
+              <a:t>room</a:t>
+            </a:r>
+          </a:p>
+        </p:txBody>
+      </p:sp>
+      <p:sp>
+        <p:nvSpPr>
+          <p:cNvPr id="13" name="Oval 12">
+            <a:extLst>
+              <a:ext uri="{FF2B5EF4-FFF2-40B4-BE49-F238E27FC236}">
+                <a16:creationId xmlns:a16="http://schemas.microsoft.com/office/drawing/2014/main" id="{3A0CE0CC-C34D-BC45-94AE-2CC2732C2BF7}"/>
+              </a:ext>
+            </a:extLst>
+          </p:cNvPr>
+          <p:cNvSpPr/>
+          <p:nvPr/>
+        </p:nvSpPr>
+        <p:spPr>
+          <a:xfrm>
+            <a:off x="5821250" y="5683634"/>
+            <a:ext cx="1611630" cy="502920"/>
+          </a:xfrm>
+          <a:prstGeom prst="ellipse">
+            <a:avLst/>
+          </a:prstGeom>
+        </p:spPr>
+        <p:style>
+          <a:lnRef idx="2">
+            <a:schemeClr val="dk1"/>
+          </a:lnRef>
+          <a:fillRef idx="1">
+            <a:schemeClr val="lt1"/>
+          </a:fillRef>
+          <a:effectRef idx="0">
+            <a:schemeClr val="dk1"/>
+          </a:effectRef>
+          <a:fontRef idx="minor">
+            <a:schemeClr val="dk1"/>
+          </a:fontRef>
+        </p:style>
+        <p:txBody>
+          <a:bodyPr rtlCol="0" anchor="ctr"/>
+          <a:lstStyle/>
+          <a:p>
+            <a:pPr algn="ctr"/>
+            <a:r>
+              <a:rPr lang="en-GB" u="sng" dirty="0"/>
+              <a:t>time</a:t>
+            </a:r>
+          </a:p>
+        </p:txBody>
+      </p:sp>
+      <p:sp>
+        <p:nvSpPr>
+          <p:cNvPr id="14" name="Oval 13">
+            <a:extLst>
+              <a:ext uri="{FF2B5EF4-FFF2-40B4-BE49-F238E27FC236}">
+                <a16:creationId xmlns:a16="http://schemas.microsoft.com/office/drawing/2014/main" id="{A24DE12E-C7D2-B545-B597-6C941BA37839}"/>
+              </a:ext>
+            </a:extLst>
+          </p:cNvPr>
+          <p:cNvSpPr/>
+          <p:nvPr/>
+        </p:nvSpPr>
+        <p:spPr>
+          <a:xfrm>
+            <a:off x="7718020" y="5732935"/>
+            <a:ext cx="1611630" cy="502920"/>
+          </a:xfrm>
+          <a:prstGeom prst="ellipse">
+            <a:avLst/>
+          </a:prstGeom>
+        </p:spPr>
+        <p:style>
+          <a:lnRef idx="2">
+            <a:schemeClr val="dk1"/>
+          </a:lnRef>
+          <a:fillRef idx="1">
+            <a:schemeClr val="lt1"/>
+          </a:fillRef>
+          <a:effectRef idx="0">
+            <a:schemeClr val="dk1"/>
+          </a:effectRef>
+          <a:fontRef idx="minor">
+            <a:schemeClr val="dk1"/>
+          </a:fontRef>
+        </p:style>
+        <p:txBody>
+          <a:bodyPr rtlCol="0" anchor="ctr"/>
+          <a:lstStyle/>
+          <a:p>
+            <a:pPr algn="ctr"/>
+            <a:r>
+              <a:rPr lang="en-GB" u="sng" dirty="0"/>
+              <a:t>day</a:t>
+            </a:r>
+          </a:p>
+        </p:txBody>
+      </p:sp>
+      <p:cxnSp>
+        <p:nvCxnSpPr>
+          <p:cNvPr id="16" name="Elbow Connector 15">
+            <a:extLst>
+              <a:ext uri="{FF2B5EF4-FFF2-40B4-BE49-F238E27FC236}">
+                <a16:creationId xmlns:a16="http://schemas.microsoft.com/office/drawing/2014/main" id="{5508FF39-2B5E-AB43-B57C-D03DB539D47E}"/>
+              </a:ext>
+            </a:extLst>
+          </p:cNvPr>
+          <p:cNvCxnSpPr>
+            <a:stCxn id="10" idx="3"/>
+            <a:endCxn id="8" idx="2"/>
+          </p:cNvCxnSpPr>
+          <p:nvPr/>
+        </p:nvCxnSpPr>
+        <p:spPr>
+          <a:xfrm flipV="1">
+            <a:off x="9103032" y="2872010"/>
+            <a:ext cx="434571" cy="1097770"/>
+          </a:xfrm>
+          <a:prstGeom prst="bentConnector2">
+            <a:avLst/>
+          </a:prstGeom>
+          <a:ln>
+            <a:tailEnd type="triangle"/>
+          </a:ln>
+        </p:spPr>
+        <p:style>
+          <a:lnRef idx="1">
+            <a:schemeClr val="dk1"/>
+          </a:lnRef>
+          <a:fillRef idx="0">
+            <a:schemeClr val="dk1"/>
+          </a:fillRef>
+          <a:effectRef idx="0">
+            <a:schemeClr val="dk1"/>
+          </a:effectRef>
+          <a:fontRef idx="minor">
+            <a:schemeClr val="tx1"/>
+          </a:fontRef>
+        </p:style>
+      </p:cxnSp>
+      <p:cxnSp>
+        <p:nvCxnSpPr>
+          <p:cNvPr id="18" name="Elbow Connector 17">
+            <a:extLst>
+              <a:ext uri="{FF2B5EF4-FFF2-40B4-BE49-F238E27FC236}">
+                <a16:creationId xmlns:a16="http://schemas.microsoft.com/office/drawing/2014/main" id="{E28142C5-6F19-FF4C-AF7D-9388EFA01D30}"/>
+              </a:ext>
+            </a:extLst>
+          </p:cNvPr>
+          <p:cNvCxnSpPr>
+            <a:cxnSpLocks/>
+            <a:stCxn id="7" idx="1"/>
+            <a:endCxn id="2" idx="2"/>
+          </p:cNvCxnSpPr>
+          <p:nvPr/>
+        </p:nvCxnSpPr>
+        <p:spPr>
+          <a:xfrm rot="10800000">
+            <a:off x="1575980" y="2872010"/>
+            <a:ext cx="464304" cy="1091420"/>
+          </a:xfrm>
+          <a:prstGeom prst="bentConnector2">
+            <a:avLst/>
+          </a:prstGeom>
+          <a:ln>
+            <a:tailEnd type="triangle"/>
+          </a:ln>
+        </p:spPr>
+        <p:style>
+          <a:lnRef idx="1">
+            <a:schemeClr val="dk1"/>
+          </a:lnRef>
+          <a:fillRef idx="0">
+            <a:schemeClr val="dk1"/>
+          </a:fillRef>
+          <a:effectRef idx="0">
+            <a:schemeClr val="dk1"/>
+          </a:effectRef>
+          <a:fontRef idx="minor">
+            <a:schemeClr val="tx1"/>
+          </a:fontRef>
+        </p:style>
+      </p:cxnSp>
+      <p:cxnSp>
+        <p:nvCxnSpPr>
+          <p:cNvPr id="21" name="Elbow Connector 20">
+            <a:extLst>
+              <a:ext uri="{FF2B5EF4-FFF2-40B4-BE49-F238E27FC236}">
+                <a16:creationId xmlns:a16="http://schemas.microsoft.com/office/drawing/2014/main" id="{786FD0B8-8AE1-C046-890E-CEE232F1FB4C}"/>
+              </a:ext>
+            </a:extLst>
+          </p:cNvPr>
+          <p:cNvCxnSpPr>
+            <a:stCxn id="5" idx="3"/>
+            <a:endCxn id="10" idx="1"/>
+          </p:cNvCxnSpPr>
+          <p:nvPr/>
+        </p:nvCxnSpPr>
+        <p:spPr>
+          <a:xfrm>
+            <a:off x="6161857" y="3963430"/>
+            <a:ext cx="1418159" cy="6350"/>
+          </a:xfrm>
+          <a:prstGeom prst="bentConnector3">
+            <a:avLst/>
+          </a:prstGeom>
+        </p:spPr>
+        <p:style>
+          <a:lnRef idx="1">
+            <a:schemeClr val="dk1"/>
+          </a:lnRef>
+          <a:fillRef idx="0">
+            <a:schemeClr val="dk1"/>
+          </a:fillRef>
+          <a:effectRef idx="0">
+            <a:schemeClr val="dk1"/>
+          </a:effectRef>
+          <a:fontRef idx="minor">
+            <a:schemeClr val="tx1"/>
+          </a:fontRef>
+        </p:style>
+      </p:cxnSp>
+      <p:cxnSp>
+        <p:nvCxnSpPr>
+          <p:cNvPr id="23" name="Elbow Connector 22">
+            <a:extLst>
+              <a:ext uri="{FF2B5EF4-FFF2-40B4-BE49-F238E27FC236}">
+                <a16:creationId xmlns:a16="http://schemas.microsoft.com/office/drawing/2014/main" id="{5B44A159-4B58-104B-8BE7-BA23086E2C3B}"/>
+              </a:ext>
+            </a:extLst>
+          </p:cNvPr>
+          <p:cNvCxnSpPr>
+            <a:stCxn id="5" idx="1"/>
+            <a:endCxn id="7" idx="3"/>
+          </p:cNvCxnSpPr>
+          <p:nvPr/>
+        </p:nvCxnSpPr>
+        <p:spPr>
+          <a:xfrm rot="10800000">
+            <a:off x="3563301" y="3963430"/>
+            <a:ext cx="1440163" cy="12700"/>
+          </a:xfrm>
+          <a:prstGeom prst="bentConnector3">
+            <a:avLst/>
+          </a:prstGeom>
+        </p:spPr>
+        <p:style>
+          <a:lnRef idx="1">
+            <a:schemeClr val="dk1"/>
+          </a:lnRef>
+          <a:fillRef idx="0">
+            <a:schemeClr val="dk1"/>
+          </a:fillRef>
+          <a:effectRef idx="0">
+            <a:schemeClr val="dk1"/>
+          </a:effectRef>
+          <a:fontRef idx="minor">
+            <a:schemeClr val="tx1"/>
+          </a:fontRef>
+        </p:style>
+      </p:cxnSp>
+      <p:cxnSp>
+        <p:nvCxnSpPr>
+          <p:cNvPr id="27" name="Elbow Connector 26">
+            <a:extLst>
+              <a:ext uri="{FF2B5EF4-FFF2-40B4-BE49-F238E27FC236}">
+                <a16:creationId xmlns:a16="http://schemas.microsoft.com/office/drawing/2014/main" id="{BDF82BC4-1886-3642-9587-2CBCEB096D7A}"/>
+              </a:ext>
+            </a:extLst>
+          </p:cNvPr>
+          <p:cNvCxnSpPr>
+            <a:stCxn id="2" idx="0"/>
+            <a:endCxn id="9" idx="4"/>
+          </p:cNvCxnSpPr>
+          <p:nvPr/>
+        </p:nvCxnSpPr>
+        <p:spPr>
+          <a:xfrm rot="5400000" flipH="1" flipV="1">
+            <a:off x="1102194" y="1779736"/>
+            <a:ext cx="1196729" cy="249156"/>
+          </a:xfrm>
+          <a:prstGeom prst="bentConnector3">
+            <a:avLst/>
+          </a:prstGeom>
+        </p:spPr>
+        <p:style>
+          <a:lnRef idx="1">
+            <a:schemeClr val="dk1"/>
+          </a:lnRef>
+          <a:fillRef idx="0">
+            <a:schemeClr val="dk1"/>
+          </a:fillRef>
+          <a:effectRef idx="0">
+            <a:schemeClr val="dk1"/>
+          </a:effectRef>
+          <a:fontRef idx="minor">
+            <a:schemeClr val="tx1"/>
+          </a:fontRef>
+        </p:style>
+      </p:cxnSp>
+      <p:cxnSp>
+        <p:nvCxnSpPr>
+          <p:cNvPr id="29" name="Elbow Connector 28">
+            <a:extLst>
+              <a:ext uri="{FF2B5EF4-FFF2-40B4-BE49-F238E27FC236}">
+                <a16:creationId xmlns:a16="http://schemas.microsoft.com/office/drawing/2014/main" id="{4F021E92-D558-2F40-9F21-1A638D9171EA}"/>
+              </a:ext>
+            </a:extLst>
+          </p:cNvPr>
+          <p:cNvCxnSpPr>
+            <a:stCxn id="2" idx="0"/>
+            <a:endCxn id="3" idx="2"/>
+          </p:cNvCxnSpPr>
+          <p:nvPr/>
+        </p:nvCxnSpPr>
+        <p:spPr>
+          <a:xfrm rot="5400000" flipH="1" flipV="1">
+            <a:off x="1889704" y="1590590"/>
+            <a:ext cx="598364" cy="1225812"/>
+          </a:xfrm>
+          <a:prstGeom prst="bentConnector2">
+            <a:avLst/>
+          </a:prstGeom>
+        </p:spPr>
+        <p:style>
+          <a:lnRef idx="1">
+            <a:schemeClr val="dk1"/>
+          </a:lnRef>
+          <a:fillRef idx="0">
+            <a:schemeClr val="dk1"/>
+          </a:fillRef>
+          <a:effectRef idx="0">
+            <a:schemeClr val="dk1"/>
+          </a:effectRef>
+          <a:fontRef idx="minor">
+            <a:schemeClr val="tx1"/>
+          </a:fontRef>
+        </p:style>
+      </p:cxnSp>
+      <p:cxnSp>
+        <p:nvCxnSpPr>
+          <p:cNvPr id="33" name="Elbow Connector 32">
+            <a:extLst>
+              <a:ext uri="{FF2B5EF4-FFF2-40B4-BE49-F238E27FC236}">
+                <a16:creationId xmlns:a16="http://schemas.microsoft.com/office/drawing/2014/main" id="{81535893-3691-1C42-B18F-9D72DD30BA56}"/>
+              </a:ext>
+            </a:extLst>
+          </p:cNvPr>
+          <p:cNvCxnSpPr>
+            <a:stCxn id="8" idx="0"/>
+            <a:endCxn id="11" idx="4"/>
+          </p:cNvCxnSpPr>
+          <p:nvPr/>
+        </p:nvCxnSpPr>
+        <p:spPr>
+          <a:xfrm rot="16200000" flipV="1">
+            <a:off x="8291833" y="1256907"/>
+            <a:ext cx="652430" cy="1839111"/>
+          </a:xfrm>
+          <a:prstGeom prst="bentConnector3">
+            <a:avLst/>
+          </a:prstGeom>
+        </p:spPr>
+        <p:style>
+          <a:lnRef idx="1">
+            <a:schemeClr val="dk1"/>
+          </a:lnRef>
+          <a:fillRef idx="0">
+            <a:schemeClr val="dk1"/>
+          </a:fillRef>
+          <a:effectRef idx="0">
+            <a:schemeClr val="dk1"/>
+          </a:effectRef>
+          <a:fontRef idx="minor">
+            <a:schemeClr val="tx1"/>
+          </a:fontRef>
+        </p:style>
+      </p:cxnSp>
+      <p:cxnSp>
+        <p:nvCxnSpPr>
+          <p:cNvPr id="35" name="Elbow Connector 34">
+            <a:extLst>
+              <a:ext uri="{FF2B5EF4-FFF2-40B4-BE49-F238E27FC236}">
+                <a16:creationId xmlns:a16="http://schemas.microsoft.com/office/drawing/2014/main" id="{58F052B8-F8D2-6649-B949-C61BBE36C7F9}"/>
+              </a:ext>
+            </a:extLst>
+          </p:cNvPr>
+          <p:cNvCxnSpPr>
+            <a:stCxn id="8" idx="0"/>
+            <a:endCxn id="6" idx="4"/>
+          </p:cNvCxnSpPr>
+          <p:nvPr/>
+        </p:nvCxnSpPr>
+        <p:spPr>
+          <a:xfrm rot="5400000" flipH="1" flipV="1">
+            <a:off x="9501403" y="1886448"/>
+            <a:ext cx="652430" cy="580030"/>
+          </a:xfrm>
+          <a:prstGeom prst="bentConnector3">
+            <a:avLst/>
+          </a:prstGeom>
+        </p:spPr>
+        <p:style>
+          <a:lnRef idx="1">
+            <a:schemeClr val="dk1"/>
+          </a:lnRef>
+          <a:fillRef idx="0">
+            <a:schemeClr val="dk1"/>
+          </a:fillRef>
+          <a:effectRef idx="0">
+            <a:schemeClr val="dk1"/>
+          </a:effectRef>
+          <a:fontRef idx="minor">
+            <a:schemeClr val="tx1"/>
+          </a:fontRef>
+        </p:style>
+      </p:cxnSp>
+      <p:cxnSp>
+        <p:nvCxnSpPr>
+          <p:cNvPr id="43" name="Elbow Connector 42">
+            <a:extLst>
+              <a:ext uri="{FF2B5EF4-FFF2-40B4-BE49-F238E27FC236}">
+                <a16:creationId xmlns:a16="http://schemas.microsoft.com/office/drawing/2014/main" id="{9DB397C2-353E-B842-B55F-7EB8EFB84CFD}"/>
+              </a:ext>
+            </a:extLst>
+          </p:cNvPr>
+          <p:cNvCxnSpPr>
+            <a:stCxn id="5" idx="2"/>
+            <a:endCxn id="12" idx="0"/>
+          </p:cNvCxnSpPr>
+          <p:nvPr/>
+        </p:nvCxnSpPr>
+        <p:spPr>
+          <a:xfrm rot="5400000">
+            <a:off x="3948836" y="3943530"/>
+            <a:ext cx="1429258" cy="1838391"/>
+          </a:xfrm>
+          <a:prstGeom prst="bentConnector3">
+            <a:avLst>
+              <a:gd name="adj1" fmla="val 55529"/>
+            </a:avLst>
+          </a:prstGeom>
+        </p:spPr>
+        <p:style>
+          <a:lnRef idx="1">
+            <a:schemeClr val="dk1"/>
+          </a:lnRef>
+          <a:fillRef idx="0">
+            <a:schemeClr val="dk1"/>
+          </a:fillRef>
+          <a:effectRef idx="0">
+            <a:schemeClr val="dk1"/>
+          </a:effectRef>
+          <a:fontRef idx="minor">
+            <a:schemeClr val="tx1"/>
+          </a:fontRef>
+        </p:style>
+      </p:cxnSp>
+      <p:cxnSp>
+        <p:nvCxnSpPr>
+          <p:cNvPr id="45" name="Elbow Connector 44">
+            <a:extLst>
+              <a:ext uri="{FF2B5EF4-FFF2-40B4-BE49-F238E27FC236}">
+                <a16:creationId xmlns:a16="http://schemas.microsoft.com/office/drawing/2014/main" id="{C9DBDD45-5CAD-B44E-A0C0-09547901851E}"/>
+              </a:ext>
+            </a:extLst>
+          </p:cNvPr>
+          <p:cNvCxnSpPr>
+            <a:stCxn id="5" idx="2"/>
+            <a:endCxn id="13" idx="0"/>
+          </p:cNvCxnSpPr>
+          <p:nvPr/>
+        </p:nvCxnSpPr>
+        <p:spPr>
+          <a:xfrm rot="16200000" flipH="1">
+            <a:off x="5337093" y="4393662"/>
+            <a:ext cx="1535538" cy="1044405"/>
+          </a:xfrm>
+          <a:prstGeom prst="bentConnector3">
+            <a:avLst>
+              <a:gd name="adj1" fmla="val 52205"/>
+            </a:avLst>
+          </a:prstGeom>
+        </p:spPr>
+        <p:style>
+          <a:lnRef idx="1">
+            <a:schemeClr val="dk1"/>
+          </a:lnRef>
+          <a:fillRef idx="0">
+            <a:schemeClr val="dk1"/>
+          </a:fillRef>
+          <a:effectRef idx="0">
+            <a:schemeClr val="dk1"/>
+          </a:effectRef>
+          <a:fontRef idx="minor">
+            <a:schemeClr val="tx1"/>
+          </a:fontRef>
+        </p:style>
+      </p:cxnSp>
+      <p:cxnSp>
+        <p:nvCxnSpPr>
+          <p:cNvPr id="47" name="Elbow Connector 46">
+            <a:extLst>
+              <a:ext uri="{FF2B5EF4-FFF2-40B4-BE49-F238E27FC236}">
+                <a16:creationId xmlns:a16="http://schemas.microsoft.com/office/drawing/2014/main" id="{EDC32EDB-7B66-5C4F-983D-C8C24038407E}"/>
+              </a:ext>
+            </a:extLst>
+          </p:cNvPr>
+          <p:cNvCxnSpPr>
+            <a:stCxn id="5" idx="2"/>
+            <a:endCxn id="14" idx="0"/>
+          </p:cNvCxnSpPr>
+          <p:nvPr/>
+        </p:nvCxnSpPr>
+        <p:spPr>
+          <a:xfrm rot="16200000" flipH="1">
+            <a:off x="6260828" y="3469927"/>
+            <a:ext cx="1584839" cy="2941175"/>
+          </a:xfrm>
+          <a:prstGeom prst="bentConnector3">
+            <a:avLst>
+              <a:gd name="adj1" fmla="val 50000"/>
+            </a:avLst>
+          </a:prstGeom>
+        </p:spPr>
+        <p:style>
+          <a:lnRef idx="1">
+            <a:schemeClr val="dk1"/>
+          </a:lnRef>
+          <a:fillRef idx="0">
+            <a:schemeClr val="dk1"/>
+          </a:fillRef>
+          <a:effectRef idx="0">
+            <a:schemeClr val="dk1"/>
+          </a:effectRef>
+          <a:fontRef idx="minor">
+            <a:schemeClr val="tx1"/>
+          </a:fontRef>
+        </p:style>
+      </p:cxnSp>
+    </p:spTree>
+    <p:extLst>
+      <p:ext uri="{BB962C8B-B14F-4D97-AF65-F5344CB8AC3E}">
+        <p14:creationId xmlns:p14="http://schemas.microsoft.com/office/powerpoint/2010/main" val="3044205829"/>
+      </p:ext>
+    </p:extLst>
+  </p:cSld>
+  <p:clrMapOvr>
+    <a:masterClrMapping/>
+  </p:clrMapOvr>
+</p:sld>
+</file>
+
+<file path=ppt/slides/slide3.xml><?xml version="1.0" encoding="utf-8"?>
+<p:sld xmlns:a="http://schemas.openxmlformats.org/drawingml/2006/main" xmlns:r="http://schemas.openxmlformats.org/officeDocument/2006/relationships" xmlns:p="http://schemas.openxmlformats.org/presentationml/2006/main">
+  <p:cSld>
+    <p:spTree>
+      <p:nvGrpSpPr>
+        <p:cNvPr id="1" name=""/>
+        <p:cNvGrpSpPr/>
+        <p:nvPr/>
+      </p:nvGrpSpPr>
+      <p:grpSpPr>
+        <a:xfrm>
+          <a:off x="0" y="0"/>
+          <a:ext cx="0" cy="0"/>
+          <a:chOff x="0" y="0"/>
+          <a:chExt cx="0" cy="0"/>
+        </a:xfrm>
+      </p:grpSpPr>
+    </p:spTree>
+    <p:extLst>
+      <p:ext uri="{BB962C8B-B14F-4D97-AF65-F5344CB8AC3E}">
+        <p14:creationId xmlns:p14="http://schemas.microsoft.com/office/powerpoint/2010/main" val="3713056225"/>
+      </p:ext>
+    </p:extLst>
+  </p:cSld>
+  <p:clrMapOvr>
+    <a:masterClrMapping/>
+  </p:clrMapOvr>
+</p:sld>
+</file>
+
+<file path=ppt/slides/slide4.xml><?xml version="1.0" encoding="utf-8"?>
+<p:sld xmlns:a="http://schemas.openxmlformats.org/drawingml/2006/main" xmlns:r="http://schemas.openxmlformats.org/officeDocument/2006/relationships" xmlns:p="http://schemas.openxmlformats.org/presentationml/2006/main">
+  <p:cSld>
+    <p:spTree>
+      <p:nvGrpSpPr>
+        <p:cNvPr id="1" name=""/>
+        <p:cNvGrpSpPr/>
+        <p:nvPr/>
+      </p:nvGrpSpPr>
+      <p:grpSpPr>
+        <a:xfrm>
+          <a:off x="0" y="0"/>
+          <a:ext cx="0" cy="0"/>
+          <a:chOff x="0" y="0"/>
+          <a:chExt cx="0" cy="0"/>
+        </a:xfrm>
+      </p:grpSpPr>
+      <p:sp>
+        <p:nvSpPr>
           <p:cNvPr id="3" name="Rectangle 2">
             <a:extLst>
               <a:ext uri="{FF2B5EF4-FFF2-40B4-BE49-F238E27FC236}">
@@ -6240,7 +7311,7 @@
 </p:sld>
 </file>
 
-<file path=ppt/slides/slide3.xml><?xml version="1.0" encoding="utf-8"?>
+<file path=ppt/slides/slide5.xml><?xml version="1.0" encoding="utf-8"?>
 <p:sld xmlns:a="http://schemas.openxmlformats.org/drawingml/2006/main" xmlns:r="http://schemas.openxmlformats.org/officeDocument/2006/relationships" xmlns:p="http://schemas.openxmlformats.org/presentationml/2006/main">
   <p:cSld>
     <p:spTree>

</xml_diff>